<commit_message>
Updates done on Non_technical Slide
</commit_message>
<xml_diff>
--- a/Presentation.pptx
+++ b/Presentation.pptx
@@ -5,11 +5,15 @@
     <p:sldMasterId id="2147483648" r:id="rId1"/>
   </p:sldMasterIdLst>
   <p:sldIdLst>
-    <p:sldId id="256" r:id="rId2"/>
+    <p:sldId id="265" r:id="rId2"/>
     <p:sldId id="257" r:id="rId3"/>
     <p:sldId id="258" r:id="rId4"/>
     <p:sldId id="259" r:id="rId5"/>
-    <p:sldId id="260" r:id="rId6"/>
+    <p:sldId id="262" r:id="rId6"/>
+    <p:sldId id="261" r:id="rId7"/>
+    <p:sldId id="263" r:id="rId8"/>
+    <p:sldId id="260" r:id="rId9"/>
+    <p:sldId id="264" r:id="rId10"/>
   </p:sldIdLst>
   <p:sldSz cx="12192000" cy="6858000"/>
   <p:notesSz cx="6858000" cy="9144000"/>
@@ -3325,10 +3329,38 @@
           <a:chExt cx="0" cy="0"/>
         </a:xfrm>
       </p:grpSpPr>
+      <p:sp>
+        <p:nvSpPr>
+          <p:cNvPr id="2" name="Title 1">
+            <a:extLst>
+              <a:ext uri="{FF2B5EF4-FFF2-40B4-BE49-F238E27FC236}">
+                <a16:creationId xmlns:a16="http://schemas.microsoft.com/office/drawing/2014/main" id="{96471EFD-300B-8636-23C8-AAB2A4F9BEAC}"/>
+              </a:ext>
+            </a:extLst>
+          </p:cNvPr>
+          <p:cNvSpPr>
+            <a:spLocks noGrp="1"/>
+          </p:cNvSpPr>
+          <p:nvPr>
+            <p:ph type="ctrTitle"/>
+          </p:nvPr>
+        </p:nvSpPr>
+        <p:spPr/>
+        <p:txBody>
+          <a:bodyPr/>
+          <a:lstStyle/>
+          <a:p>
+            <a:r>
+              <a:rPr lang="en-US" b="1" dirty="0"/>
+              <a:t>Understanding Movie Performance Through Data</a:t>
+            </a:r>
+          </a:p>
+        </p:txBody>
+      </p:sp>
     </p:spTree>
     <p:extLst>
       <p:ext uri="{BB962C8B-B14F-4D97-AF65-F5344CB8AC3E}">
-        <p14:creationId xmlns:p14="http://schemas.microsoft.com/office/powerpoint/2010/main" val="1704578877"/>
+        <p14:creationId xmlns:p14="http://schemas.microsoft.com/office/powerpoint/2010/main" val="2859931911"/>
       </p:ext>
     </p:extLst>
   </p:cSld>
@@ -3357,10 +3389,10 @@
       </p:grpSpPr>
       <p:sp>
         <p:nvSpPr>
-          <p:cNvPr id="3" name="TextBox 2">
-            <a:extLst>
-              <a:ext uri="{FF2B5EF4-FFF2-40B4-BE49-F238E27FC236}">
-                <a16:creationId xmlns:a16="http://schemas.microsoft.com/office/drawing/2014/main" id="{DD291527-B417-6E96-C9CF-2F4CB17B4B65}"/>
+          <p:cNvPr id="5" name="TextBox 4">
+            <a:extLst>
+              <a:ext uri="{FF2B5EF4-FFF2-40B4-BE49-F238E27FC236}">
+                <a16:creationId xmlns:a16="http://schemas.microsoft.com/office/drawing/2014/main" id="{C0E38C52-5CFF-77BE-8055-9F0EE808FF38}"/>
               </a:ext>
             </a:extLst>
           </p:cNvPr>
@@ -3369,8 +3401,8 @@
         </p:nvSpPr>
         <p:spPr>
           <a:xfrm>
-            <a:off x="859971" y="609601"/>
-            <a:ext cx="7979229" cy="1051570"/>
+            <a:off x="1447799" y="940752"/>
+            <a:ext cx="9808029" cy="3693319"/>
           </a:xfrm>
           <a:prstGeom prst="rect">
             <a:avLst/>
@@ -3383,61 +3415,61 @@
           </a:bodyPr>
           <a:lstStyle/>
           <a:p>
-            <a:pPr algn="l">
-              <a:spcAft>
-                <a:spcPts val="450"/>
-              </a:spcAft>
-              <a:buFont typeface="+mj-lt"/>
-              <a:buAutoNum type="arabicPeriod"/>
+            <a:pPr>
+              <a:buNone/>
             </a:pPr>
             <a:r>
-              <a:rPr lang="en-US" b="0" i="0" dirty="0">
-                <a:solidFill>
-                  <a:srgbClr val="273540"/>
-                </a:solidFill>
-                <a:effectLst/>
-                <a:latin typeface="Lato Extended"/>
-              </a:rPr>
-              <a:t>Beginning</a:t>
-            </a:r>
-          </a:p>
-          <a:p>
-            <a:pPr marL="742950" lvl="1" indent="-285750" algn="l">
-              <a:spcAft>
-                <a:spcPts val="450"/>
-              </a:spcAft>
-              <a:buFont typeface="+mj-lt"/>
-              <a:buAutoNum type="arabicPeriod"/>
-            </a:pPr>
-            <a:r>
-              <a:rPr lang="en-US" b="0" i="0" dirty="0">
-                <a:solidFill>
-                  <a:srgbClr val="273540"/>
-                </a:solidFill>
-                <a:effectLst/>
-                <a:latin typeface="Lato Extended"/>
-              </a:rPr>
+              <a:rPr lang="en-US" b="1" dirty="0"/>
               <a:t>Overview</a:t>
             </a:r>
           </a:p>
           <a:p>
-            <a:pPr marL="742950" lvl="1" indent="-285750" algn="l">
-              <a:spcAft>
-                <a:spcPts val="450"/>
-              </a:spcAft>
-              <a:buFont typeface="+mj-lt"/>
-              <a:buAutoNum type="arabicPeriod"/>
-            </a:pPr>
-            <a:r>
-              <a:rPr lang="en-US" b="0" i="0" dirty="0">
-                <a:solidFill>
-                  <a:srgbClr val="273540"/>
-                </a:solidFill>
-                <a:effectLst/>
-                <a:latin typeface="Lato Extended"/>
-              </a:rPr>
+            <a:r>
+              <a:rPr lang="en-US" dirty="0"/>
+              <a:t>This project explores the movie industry using data to understand what makes a movie successful in terms of profit and popularity. We used five different movie-related datasets to examine how production budgets, audience opinions, and critic reviews influence box office performance.</a:t>
+            </a:r>
+          </a:p>
+          <a:p>
+            <a:endParaRPr lang="en-US" dirty="0"/>
+          </a:p>
+          <a:p>
+            <a:r>
+              <a:rPr lang="en-US" b="1" dirty="0"/>
               <a:t>Business Understanding</a:t>
             </a:r>
+          </a:p>
+          <a:p>
+            <a:r>
+              <a:rPr lang="en-US" dirty="0"/>
+              <a:t>The entertainment industry invests millions in film production. Our goal was to answer three key questions:</a:t>
+            </a:r>
+          </a:p>
+          <a:p>
+            <a:r>
+              <a:rPr lang="en-US" dirty="0"/>
+              <a:t>What kinds of movies make the most profit?</a:t>
+            </a:r>
+          </a:p>
+          <a:p>
+            <a:r>
+              <a:rPr lang="en-US" dirty="0"/>
+              <a:t>How does a movie's budget relate to its financial return?</a:t>
+            </a:r>
+          </a:p>
+          <a:p>
+            <a:r>
+              <a:rPr lang="en-US" dirty="0"/>
+              <a:t>Do audience and critic reviews impact a movie’s success?</a:t>
+            </a:r>
+          </a:p>
+          <a:p>
+            <a:r>
+              <a:rPr lang="en-US" dirty="0"/>
+              <a:t>This analysis helps studios, investors, and marketing teams make better, data-driven decisions.</a:t>
+            </a:r>
+          </a:p>
+          <a:p>
+            <a:endParaRPr lang="en-US" dirty="0"/>
           </a:p>
         </p:txBody>
       </p:sp>
@@ -3485,8 +3517,8 @@
         </p:nvSpPr>
         <p:spPr>
           <a:xfrm>
-            <a:off x="3048000" y="2903215"/>
-            <a:ext cx="6096000" cy="1051570"/>
+            <a:off x="1099457" y="1226815"/>
+            <a:ext cx="6096000" cy="3416320"/>
           </a:xfrm>
           <a:prstGeom prst="rect">
             <a:avLst/>
@@ -3498,6 +3530,74 @@
             <a:spAutoFit/>
           </a:bodyPr>
           <a:lstStyle/>
+          <a:p>
+            <a:r>
+              <a:rPr lang="en-US" b="1" dirty="0"/>
+              <a:t>Data Understanding</a:t>
+            </a:r>
+          </a:p>
+          <a:p>
+            <a:r>
+              <a:rPr lang="en-US" dirty="0"/>
+              <a:t>We worked with five datasets, each providing different insights:</a:t>
+            </a:r>
+          </a:p>
+          <a:p>
+            <a:r>
+              <a:rPr lang="en-US" b="1" dirty="0"/>
+              <a:t>Box Office Data</a:t>
+            </a:r>
+            <a:r>
+              <a:rPr lang="en-US" dirty="0"/>
+              <a:t>: Revenue from domestic and foreign markets.</a:t>
+            </a:r>
+          </a:p>
+          <a:p>
+            <a:r>
+              <a:rPr lang="en-US" b="1" dirty="0"/>
+              <a:t>Movie Info</a:t>
+            </a:r>
+            <a:r>
+              <a:rPr lang="en-US" dirty="0"/>
+              <a:t>: Genre, release dates, and film ratings.</a:t>
+            </a:r>
+          </a:p>
+          <a:p>
+            <a:r>
+              <a:rPr lang="en-US" b="1" dirty="0"/>
+              <a:t>Critic Reviews</a:t>
+            </a:r>
+            <a:r>
+              <a:rPr lang="en-US" dirty="0"/>
+              <a:t>: What critics said about the movies.</a:t>
+            </a:r>
+          </a:p>
+          <a:p>
+            <a:r>
+              <a:rPr lang="en-US" b="1" dirty="0"/>
+              <a:t>Audience Metrics</a:t>
+            </a:r>
+            <a:r>
+              <a:rPr lang="en-US" dirty="0"/>
+              <a:t>: Popularity scores, vote counts, and language.</a:t>
+            </a:r>
+          </a:p>
+          <a:p>
+            <a:r>
+              <a:rPr lang="en-US" b="1" dirty="0"/>
+              <a:t>Production Budgets</a:t>
+            </a:r>
+            <a:r>
+              <a:rPr lang="en-US" dirty="0"/>
+              <a:t>: How much money was spent to make the movies.</a:t>
+            </a:r>
+          </a:p>
+          <a:p>
+            <a:r>
+              <a:rPr lang="en-US" dirty="0"/>
+              <a:t>We cleaned and merged these datasets to create one large view for analysis.</a:t>
+            </a:r>
+          </a:p>
           <a:p>
             <a:pPr algn="l">
               <a:spcAft>
@@ -3506,54 +3606,13 @@
               <a:buFont typeface="+mj-lt"/>
               <a:buAutoNum type="arabicPeriod"/>
             </a:pPr>
-            <a:r>
-              <a:rPr lang="en-US" b="0" i="0" dirty="0">
-                <a:solidFill>
-                  <a:srgbClr val="273540"/>
-                </a:solidFill>
-                <a:effectLst/>
-                <a:latin typeface="Lato Extended"/>
-              </a:rPr>
-              <a:t>Middle</a:t>
-            </a:r>
-          </a:p>
-          <a:p>
-            <a:pPr marL="742950" lvl="1" indent="-285750" algn="l">
-              <a:spcAft>
-                <a:spcPts val="450"/>
-              </a:spcAft>
-              <a:buFont typeface="+mj-lt"/>
-              <a:buAutoNum type="arabicPeriod"/>
-            </a:pPr>
-            <a:r>
-              <a:rPr lang="en-US" b="0" i="0" dirty="0">
-                <a:solidFill>
-                  <a:srgbClr val="273540"/>
-                </a:solidFill>
-                <a:effectLst/>
-                <a:latin typeface="Lato Extended"/>
-              </a:rPr>
-              <a:t>Data Understanding</a:t>
-            </a:r>
-          </a:p>
-          <a:p>
-            <a:pPr marL="742950" lvl="1" indent="-285750" algn="l">
-              <a:spcAft>
-                <a:spcPts val="450"/>
-              </a:spcAft>
-              <a:buFont typeface="+mj-lt"/>
-              <a:buAutoNum type="arabicPeriod"/>
-            </a:pPr>
-            <a:r>
-              <a:rPr lang="en-US" b="0" i="0" dirty="0">
-                <a:solidFill>
-                  <a:srgbClr val="273540"/>
-                </a:solidFill>
-                <a:effectLst/>
-                <a:latin typeface="Lato Extended"/>
-              </a:rPr>
-              <a:t>Data Analysis</a:t>
-            </a:r>
+            <a:endParaRPr lang="en-US" b="0" i="0" dirty="0">
+              <a:solidFill>
+                <a:srgbClr val="273540"/>
+              </a:solidFill>
+              <a:effectLst/>
+              <a:latin typeface="Lato Extended"/>
+            </a:endParaRPr>
           </a:p>
         </p:txBody>
       </p:sp>
@@ -3601,8 +3660,8 @@
         </p:nvSpPr>
         <p:spPr>
           <a:xfrm>
-            <a:off x="1970314" y="2340771"/>
-            <a:ext cx="6096000" cy="1051570"/>
+            <a:off x="1143000" y="805885"/>
+            <a:ext cx="6096000" cy="4524315"/>
           </a:xfrm>
           <a:prstGeom prst="rect">
             <a:avLst/>
@@ -3614,6 +3673,81 @@
             <a:spAutoFit/>
           </a:bodyPr>
           <a:lstStyle/>
+          <a:p>
+            <a:r>
+              <a:rPr lang="en-US" b="1" dirty="0"/>
+              <a:t>Data Analysis</a:t>
+            </a:r>
+          </a:p>
+          <a:p>
+            <a:r>
+              <a:rPr lang="en-US" dirty="0"/>
+              <a:t>We focused on three main areas:</a:t>
+            </a:r>
+          </a:p>
+          <a:p>
+            <a:r>
+              <a:rPr lang="en-US" b="1" dirty="0"/>
+              <a:t>Profitability</a:t>
+            </a:r>
+            <a:endParaRPr lang="en-US" dirty="0"/>
+          </a:p>
+          <a:p>
+            <a:pPr lvl="1"/>
+            <a:r>
+              <a:rPr lang="en-US" dirty="0"/>
+              <a:t>Identified the most profitable movies and genres.</a:t>
+            </a:r>
+          </a:p>
+          <a:p>
+            <a:pPr lvl="1"/>
+            <a:r>
+              <a:rPr lang="en-US" dirty="0"/>
+              <a:t>Found that some movies made huge profits even with modest budgets.</a:t>
+            </a:r>
+          </a:p>
+          <a:p>
+            <a:r>
+              <a:rPr lang="en-US" b="1" dirty="0"/>
+              <a:t>Budget vs. Revenue</a:t>
+            </a:r>
+            <a:endParaRPr lang="en-US" dirty="0"/>
+          </a:p>
+          <a:p>
+            <a:pPr lvl="1"/>
+            <a:r>
+              <a:rPr lang="en-US" dirty="0"/>
+              <a:t>Generally, movies with bigger budgets earned more—but not always more profit.</a:t>
+            </a:r>
+          </a:p>
+          <a:p>
+            <a:pPr lvl="1"/>
+            <a:r>
+              <a:rPr lang="en-US" dirty="0"/>
+              <a:t>Some low-budget films performed surprisingly well.</a:t>
+            </a:r>
+          </a:p>
+          <a:p>
+            <a:r>
+              <a:rPr lang="en-US" b="1" dirty="0"/>
+              <a:t>Audience &amp; Critic Impact</a:t>
+            </a:r>
+            <a:endParaRPr lang="en-US" dirty="0"/>
+          </a:p>
+          <a:p>
+            <a:pPr lvl="1"/>
+            <a:r>
+              <a:rPr lang="en-US" dirty="0"/>
+              <a:t>Movies with high audience ratings usually did better at the box office.</a:t>
+            </a:r>
+          </a:p>
+          <a:p>
+            <a:pPr lvl="1"/>
+            <a:r>
+              <a:rPr lang="en-US" dirty="0"/>
+              <a:t>Critics had some influence, but audience reviews had a stronger connection to success</a:t>
+            </a:r>
+          </a:p>
           <a:p>
             <a:pPr algn="l">
               <a:spcAft>
@@ -3622,54 +3756,13 @@
               <a:buFont typeface="+mj-lt"/>
               <a:buAutoNum type="arabicPeriod"/>
             </a:pPr>
-            <a:r>
-              <a:rPr lang="en-US" b="0" i="0" dirty="0">
-                <a:solidFill>
-                  <a:srgbClr val="273540"/>
-                </a:solidFill>
-                <a:effectLst/>
-                <a:latin typeface="Lato Extended"/>
-              </a:rPr>
-              <a:t>End</a:t>
-            </a:r>
-          </a:p>
-          <a:p>
-            <a:pPr marL="742950" lvl="1" indent="-285750" algn="l">
-              <a:spcAft>
-                <a:spcPts val="450"/>
-              </a:spcAft>
-              <a:buFont typeface="+mj-lt"/>
-              <a:buAutoNum type="arabicPeriod"/>
-            </a:pPr>
-            <a:r>
-              <a:rPr lang="en-US" b="0" i="0" dirty="0">
-                <a:solidFill>
-                  <a:srgbClr val="273540"/>
-                </a:solidFill>
-                <a:effectLst/>
-                <a:latin typeface="Lato Extended"/>
-              </a:rPr>
-              <a:t>Recommendations</a:t>
-            </a:r>
-          </a:p>
-          <a:p>
-            <a:pPr marL="742950" lvl="1" indent="-285750" algn="l">
-              <a:spcAft>
-                <a:spcPts val="450"/>
-              </a:spcAft>
-              <a:buFont typeface="+mj-lt"/>
-              <a:buAutoNum type="arabicPeriod"/>
-            </a:pPr>
-            <a:r>
-              <a:rPr lang="en-US" b="0" i="0" dirty="0">
-                <a:solidFill>
-                  <a:srgbClr val="273540"/>
-                </a:solidFill>
-                <a:effectLst/>
-                <a:latin typeface="Lato Extended"/>
-              </a:rPr>
-              <a:t>Next Steps</a:t>
-            </a:r>
+            <a:endParaRPr lang="en-US" b="0" i="0" dirty="0">
+              <a:solidFill>
+                <a:srgbClr val="273540"/>
+              </a:solidFill>
+              <a:effectLst/>
+              <a:latin typeface="Lato Extended"/>
+            </a:endParaRPr>
           </a:p>
         </p:txBody>
       </p:sp>
@@ -3703,6 +3796,96 @@
           <a:chExt cx="0" cy="0"/>
         </a:xfrm>
       </p:grpSpPr>
+    </p:spTree>
+    <p:extLst>
+      <p:ext uri="{BB962C8B-B14F-4D97-AF65-F5344CB8AC3E}">
+        <p14:creationId xmlns:p14="http://schemas.microsoft.com/office/powerpoint/2010/main" val="3351738161"/>
+      </p:ext>
+    </p:extLst>
+  </p:cSld>
+  <p:clrMapOvr>
+    <a:masterClrMapping/>
+  </p:clrMapOvr>
+</p:sld>
+</file>
+
+<file path=ppt/slides/slide6.xml><?xml version="1.0" encoding="utf-8"?>
+<p:sld xmlns:a="http://schemas.openxmlformats.org/drawingml/2006/main" xmlns:r="http://schemas.openxmlformats.org/officeDocument/2006/relationships" xmlns:p="http://schemas.openxmlformats.org/presentationml/2006/main">
+  <p:cSld>
+    <p:spTree>
+      <p:nvGrpSpPr>
+        <p:cNvPr id="1" name=""/>
+        <p:cNvGrpSpPr/>
+        <p:nvPr/>
+      </p:nvGrpSpPr>
+      <p:grpSpPr>
+        <a:xfrm>
+          <a:off x="0" y="0"/>
+          <a:ext cx="0" cy="0"/>
+          <a:chOff x="0" y="0"/>
+          <a:chExt cx="0" cy="0"/>
+        </a:xfrm>
+      </p:grpSpPr>
+    </p:spTree>
+    <p:extLst>
+      <p:ext uri="{BB962C8B-B14F-4D97-AF65-F5344CB8AC3E}">
+        <p14:creationId xmlns:p14="http://schemas.microsoft.com/office/powerpoint/2010/main" val="3181800000"/>
+      </p:ext>
+    </p:extLst>
+  </p:cSld>
+  <p:clrMapOvr>
+    <a:masterClrMapping/>
+  </p:clrMapOvr>
+</p:sld>
+</file>
+
+<file path=ppt/slides/slide7.xml><?xml version="1.0" encoding="utf-8"?>
+<p:sld xmlns:a="http://schemas.openxmlformats.org/drawingml/2006/main" xmlns:r="http://schemas.openxmlformats.org/officeDocument/2006/relationships" xmlns:p="http://schemas.openxmlformats.org/presentationml/2006/main">
+  <p:cSld>
+    <p:spTree>
+      <p:nvGrpSpPr>
+        <p:cNvPr id="1" name=""/>
+        <p:cNvGrpSpPr/>
+        <p:nvPr/>
+      </p:nvGrpSpPr>
+      <p:grpSpPr>
+        <a:xfrm>
+          <a:off x="0" y="0"/>
+          <a:ext cx="0" cy="0"/>
+          <a:chOff x="0" y="0"/>
+          <a:chExt cx="0" cy="0"/>
+        </a:xfrm>
+      </p:grpSpPr>
+    </p:spTree>
+    <p:extLst>
+      <p:ext uri="{BB962C8B-B14F-4D97-AF65-F5344CB8AC3E}">
+        <p14:creationId xmlns:p14="http://schemas.microsoft.com/office/powerpoint/2010/main" val="906968116"/>
+      </p:ext>
+    </p:extLst>
+  </p:cSld>
+  <p:clrMapOvr>
+    <a:masterClrMapping/>
+  </p:clrMapOvr>
+</p:sld>
+</file>
+
+<file path=ppt/slides/slide8.xml><?xml version="1.0" encoding="utf-8"?>
+<p:sld xmlns:a="http://schemas.openxmlformats.org/drawingml/2006/main" xmlns:r="http://schemas.openxmlformats.org/officeDocument/2006/relationships" xmlns:p="http://schemas.openxmlformats.org/presentationml/2006/main">
+  <p:cSld>
+    <p:spTree>
+      <p:nvGrpSpPr>
+        <p:cNvPr id="1" name=""/>
+        <p:cNvGrpSpPr/>
+        <p:nvPr/>
+      </p:nvGrpSpPr>
+      <p:grpSpPr>
+        <a:xfrm>
+          <a:off x="0" y="0"/>
+          <a:ext cx="0" cy="0"/>
+          <a:chOff x="0" y="0"/>
+          <a:chExt cx="0" cy="0"/>
+        </a:xfrm>
+      </p:grpSpPr>
       <p:sp>
         <p:nvSpPr>
           <p:cNvPr id="3" name="TextBox 2">
@@ -3717,8 +3900,8 @@
         </p:nvSpPr>
         <p:spPr>
           <a:xfrm>
-            <a:off x="3048000" y="3244334"/>
-            <a:ext cx="6096000" cy="369332"/>
+            <a:off x="751114" y="577334"/>
+            <a:ext cx="11114315" cy="4247317"/>
           </a:xfrm>
           <a:prstGeom prst="rect">
             <a:avLst/>
@@ -3731,22 +3914,91 @@
           </a:bodyPr>
           <a:lstStyle/>
           <a:p>
-            <a:pPr marL="742950" lvl="1" indent="-285750" algn="l">
-              <a:spcAft>
-                <a:spcPts val="450"/>
-              </a:spcAft>
-              <a:buFont typeface="+mj-lt"/>
-              <a:buAutoNum type="arabicPeriod"/>
-            </a:pPr>
-            <a:r>
-              <a:rPr lang="en-US" b="0" i="0" dirty="0">
-                <a:solidFill>
-                  <a:srgbClr val="273540"/>
-                </a:solidFill>
-                <a:effectLst/>
-                <a:latin typeface="Lato Extended"/>
-              </a:rPr>
-              <a:t>Thank You</a:t>
+            <a:r>
+              <a:rPr lang="en-US" b="1" dirty="0"/>
+              <a:t>Recommendations</a:t>
+            </a:r>
+          </a:p>
+          <a:p>
+            <a:r>
+              <a:rPr lang="en-US" dirty="0"/>
+              <a:t>Based on our findings, we suggest the following:</a:t>
+            </a:r>
+          </a:p>
+          <a:p>
+            <a:r>
+              <a:rPr lang="en-US" b="1" dirty="0"/>
+              <a:t>Focus on High-Performing Genres</a:t>
+            </a:r>
+            <a:br>
+              <a:rPr lang="en-US" dirty="0"/>
+            </a:br>
+            <a:r>
+              <a:rPr lang="en-US" dirty="0"/>
+              <a:t>Invest more in action, animation, or adventure genres—they consistently bring good returns.</a:t>
+            </a:r>
+          </a:p>
+          <a:p>
+            <a:r>
+              <a:rPr lang="en-US" b="1" dirty="0"/>
+              <a:t>Control Production Budgets</a:t>
+            </a:r>
+            <a:br>
+              <a:rPr lang="en-US" dirty="0"/>
+            </a:br>
+            <a:r>
+              <a:rPr lang="en-US" dirty="0"/>
+              <a:t>Spending more doesn’t always guarantee profit. Budget planning should be data-informed.</a:t>
+            </a:r>
+          </a:p>
+          <a:p>
+            <a:r>
+              <a:rPr lang="en-US" b="1" dirty="0"/>
+              <a:t>Use Reviews Strategically</a:t>
+            </a:r>
+            <a:br>
+              <a:rPr lang="en-US" dirty="0"/>
+            </a:br>
+            <a:r>
+              <a:rPr lang="en-US" dirty="0"/>
+              <a:t>Early audience feedback should guide marketing. Positive audience buzz boosts revenue more than critic reviews alone.</a:t>
+            </a:r>
+          </a:p>
+          <a:p>
+            <a:r>
+              <a:rPr lang="en-US" b="1" dirty="0"/>
+              <a:t>Make Data-Driven Decisions</a:t>
+            </a:r>
+            <a:br>
+              <a:rPr lang="en-US" dirty="0"/>
+            </a:br>
+            <a:r>
+              <a:rPr lang="en-US" dirty="0"/>
+              <a:t>Use historical data when deciding what movies to greenlight or promote.</a:t>
+            </a:r>
+          </a:p>
+          <a:p>
+            <a:r>
+              <a:rPr lang="en-US" b="1" dirty="0"/>
+              <a:t>Next Steps</a:t>
+            </a:r>
+          </a:p>
+          <a:p>
+            <a:r>
+              <a:rPr lang="en-US" dirty="0"/>
+              <a:t>Incorporate streaming data to understand long-term success.</a:t>
+            </a:r>
+          </a:p>
+          <a:p>
+            <a:r>
+              <a:rPr lang="en-US" dirty="0"/>
+              <a:t>Build interactive dashboards for ongoing business monitoring.</a:t>
+            </a:r>
+          </a:p>
+          <a:p>
+            <a:r>
+              <a:rPr lang="en-US" dirty="0"/>
+              <a:t>Use machine learning to predict future movie success.</a:t>
             </a:r>
           </a:p>
         </p:txBody>
@@ -3755,6 +4007,139 @@
     <p:extLst>
       <p:ext uri="{BB962C8B-B14F-4D97-AF65-F5344CB8AC3E}">
         <p14:creationId xmlns:p14="http://schemas.microsoft.com/office/powerpoint/2010/main" val="2851931304"/>
+      </p:ext>
+    </p:extLst>
+  </p:cSld>
+  <p:clrMapOvr>
+    <a:masterClrMapping/>
+  </p:clrMapOvr>
+</p:sld>
+</file>
+
+<file path=ppt/slides/slide9.xml><?xml version="1.0" encoding="utf-8"?>
+<p:sld xmlns:a="http://schemas.openxmlformats.org/drawingml/2006/main" xmlns:r="http://schemas.openxmlformats.org/officeDocument/2006/relationships" xmlns:p="http://schemas.openxmlformats.org/presentationml/2006/main">
+  <p:cSld>
+    <p:spTree>
+      <p:nvGrpSpPr>
+        <p:cNvPr id="1" name=""/>
+        <p:cNvGrpSpPr/>
+        <p:nvPr/>
+      </p:nvGrpSpPr>
+      <p:grpSpPr>
+        <a:xfrm>
+          <a:off x="0" y="0"/>
+          <a:ext cx="0" cy="0"/>
+          <a:chOff x="0" y="0"/>
+          <a:chExt cx="0" cy="0"/>
+        </a:xfrm>
+      </p:grpSpPr>
+      <p:sp>
+        <p:nvSpPr>
+          <p:cNvPr id="3" name="TextBox 2">
+            <a:extLst>
+              <a:ext uri="{FF2B5EF4-FFF2-40B4-BE49-F238E27FC236}">
+                <a16:creationId xmlns:a16="http://schemas.microsoft.com/office/drawing/2014/main" id="{BDCB8C48-35B0-B1EC-8DB9-49B41BEA925B}"/>
+              </a:ext>
+            </a:extLst>
+          </p:cNvPr>
+          <p:cNvSpPr txBox="1"/>
+          <p:nvPr/>
+        </p:nvSpPr>
+        <p:spPr>
+          <a:xfrm>
+            <a:off x="838200" y="763565"/>
+            <a:ext cx="10885714" cy="4524315"/>
+          </a:xfrm>
+          <a:prstGeom prst="rect">
+            <a:avLst/>
+          </a:prstGeom>
+          <a:noFill/>
+        </p:spPr>
+        <p:txBody>
+          <a:bodyPr wrap="square">
+            <a:spAutoFit/>
+          </a:bodyPr>
+          <a:lstStyle/>
+          <a:p>
+            <a:r>
+              <a:rPr lang="en-US" b="1" dirty="0"/>
+              <a:t>Prompt Questions</a:t>
+            </a:r>
+          </a:p>
+          <a:p>
+            <a:r>
+              <a:rPr lang="en-US" b="1" dirty="0"/>
+              <a:t>"Based on the insights shared, what factors do you think studios should prioritize most when greenlighting new movie projects—budget, genre, or audience feedback?"</a:t>
+            </a:r>
+            <a:endParaRPr lang="en-US" dirty="0"/>
+          </a:p>
+          <a:p>
+            <a:r>
+              <a:rPr lang="en-US" b="1" dirty="0"/>
+              <a:t>"How might these findings change the way we market or promote films to different types of audiences?"</a:t>
+            </a:r>
+            <a:endParaRPr lang="en-US" dirty="0"/>
+          </a:p>
+          <a:p>
+            <a:pPr>
+              <a:buNone/>
+            </a:pPr>
+            <a:endParaRPr lang="en-US" b="1" dirty="0"/>
+          </a:p>
+          <a:p>
+            <a:pPr>
+              <a:buNone/>
+            </a:pPr>
+            <a:endParaRPr lang="en-US" b="1" dirty="0"/>
+          </a:p>
+          <a:p>
+            <a:pPr>
+              <a:buNone/>
+            </a:pPr>
+            <a:endParaRPr lang="en-US" b="1" dirty="0"/>
+          </a:p>
+          <a:p>
+            <a:pPr>
+              <a:buNone/>
+            </a:pPr>
+            <a:r>
+              <a:rPr lang="en-US" b="1" dirty="0"/>
+              <a:t>Thank You</a:t>
+            </a:r>
+          </a:p>
+          <a:p>
+            <a:r>
+              <a:rPr lang="en-US" dirty="0"/>
+              <a:t>Thank you for your time. This project shows how using data can improve decisions in the movie business. We're excited about what comes next and how this can shape smarter film production strategies</a:t>
+            </a:r>
+          </a:p>
+          <a:p>
+            <a:endParaRPr lang="en-US" dirty="0"/>
+          </a:p>
+          <a:p>
+            <a:r>
+              <a:rPr lang="en-US" dirty="0"/>
+              <a:t>LinkedIn: </a:t>
+            </a:r>
+          </a:p>
+          <a:p>
+            <a:endParaRPr lang="en-US" dirty="0"/>
+          </a:p>
+          <a:p>
+            <a:endParaRPr lang="en-US" dirty="0"/>
+          </a:p>
+          <a:p>
+            <a:endParaRPr lang="en-US" dirty="0"/>
+          </a:p>
+          <a:p>
+            <a:endParaRPr lang="en-US" dirty="0"/>
+          </a:p>
+        </p:txBody>
+      </p:sp>
+    </p:spTree>
+    <p:extLst>
+      <p:ext uri="{BB962C8B-B14F-4D97-AF65-F5344CB8AC3E}">
+        <p14:creationId xmlns:p14="http://schemas.microsoft.com/office/powerpoint/2010/main" val="314165935"/>
       </p:ext>
     </p:extLst>
   </p:cSld>

</xml_diff>

<commit_message>
Updates on presentation and code
</commit_message>
<xml_diff>
--- a/Presentation.pptx
+++ b/Presentation.pptx
@@ -2,7 +2,7 @@
 <file path=ppt/presentation.xml><?xml version="1.0" encoding="utf-8"?>
 <p:presentation xmlns:a="http://schemas.openxmlformats.org/drawingml/2006/main" xmlns:r="http://schemas.openxmlformats.org/officeDocument/2006/relationships" xmlns:p="http://schemas.openxmlformats.org/presentationml/2006/main" saveSubsetFonts="1">
   <p:sldMasterIdLst>
-    <p:sldMasterId id="2147483648" r:id="rId1"/>
+    <p:sldMasterId id="2147483690" r:id="rId1"/>
   </p:sldMasterIdLst>
   <p:sldIdLst>
     <p:sldId id="265" r:id="rId2"/>
@@ -21,7 +21,7 @@
     <a:defPPr>
       <a:defRPr lang="en-US"/>
     </a:defPPr>
-    <a:lvl1pPr marL="0" algn="l" defTabSz="914400" rtl="0" eaLnBrk="1" latinLnBrk="0" hangingPunct="1">
+    <a:lvl1pPr marL="0" algn="l" defTabSz="457200" rtl="0" eaLnBrk="1" latinLnBrk="0" hangingPunct="1">
       <a:defRPr sz="1800" kern="1200">
         <a:solidFill>
           <a:schemeClr val="tx1"/>
@@ -31,7 +31,7 @@
         <a:cs typeface="+mn-cs"/>
       </a:defRPr>
     </a:lvl1pPr>
-    <a:lvl2pPr marL="457200" algn="l" defTabSz="914400" rtl="0" eaLnBrk="1" latinLnBrk="0" hangingPunct="1">
+    <a:lvl2pPr marL="457200" algn="l" defTabSz="457200" rtl="0" eaLnBrk="1" latinLnBrk="0" hangingPunct="1">
       <a:defRPr sz="1800" kern="1200">
         <a:solidFill>
           <a:schemeClr val="tx1"/>
@@ -41,7 +41,7 @@
         <a:cs typeface="+mn-cs"/>
       </a:defRPr>
     </a:lvl2pPr>
-    <a:lvl3pPr marL="914400" algn="l" defTabSz="914400" rtl="0" eaLnBrk="1" latinLnBrk="0" hangingPunct="1">
+    <a:lvl3pPr marL="914400" algn="l" defTabSz="457200" rtl="0" eaLnBrk="1" latinLnBrk="0" hangingPunct="1">
       <a:defRPr sz="1800" kern="1200">
         <a:solidFill>
           <a:schemeClr val="tx1"/>
@@ -51,7 +51,7 @@
         <a:cs typeface="+mn-cs"/>
       </a:defRPr>
     </a:lvl3pPr>
-    <a:lvl4pPr marL="1371600" algn="l" defTabSz="914400" rtl="0" eaLnBrk="1" latinLnBrk="0" hangingPunct="1">
+    <a:lvl4pPr marL="1371600" algn="l" defTabSz="457200" rtl="0" eaLnBrk="1" latinLnBrk="0" hangingPunct="1">
       <a:defRPr sz="1800" kern="1200">
         <a:solidFill>
           <a:schemeClr val="tx1"/>
@@ -61,7 +61,7 @@
         <a:cs typeface="+mn-cs"/>
       </a:defRPr>
     </a:lvl4pPr>
-    <a:lvl5pPr marL="1828800" algn="l" defTabSz="914400" rtl="0" eaLnBrk="1" latinLnBrk="0" hangingPunct="1">
+    <a:lvl5pPr marL="1828800" algn="l" defTabSz="457200" rtl="0" eaLnBrk="1" latinLnBrk="0" hangingPunct="1">
       <a:defRPr sz="1800" kern="1200">
         <a:solidFill>
           <a:schemeClr val="tx1"/>
@@ -71,7 +71,7 @@
         <a:cs typeface="+mn-cs"/>
       </a:defRPr>
     </a:lvl5pPr>
-    <a:lvl6pPr marL="2286000" algn="l" defTabSz="914400" rtl="0" eaLnBrk="1" latinLnBrk="0" hangingPunct="1">
+    <a:lvl6pPr marL="2286000" algn="l" defTabSz="457200" rtl="0" eaLnBrk="1" latinLnBrk="0" hangingPunct="1">
       <a:defRPr sz="1800" kern="1200">
         <a:solidFill>
           <a:schemeClr val="tx1"/>
@@ -81,7 +81,7 @@
         <a:cs typeface="+mn-cs"/>
       </a:defRPr>
     </a:lvl6pPr>
-    <a:lvl7pPr marL="2743200" algn="l" defTabSz="914400" rtl="0" eaLnBrk="1" latinLnBrk="0" hangingPunct="1">
+    <a:lvl7pPr marL="2743200" algn="l" defTabSz="457200" rtl="0" eaLnBrk="1" latinLnBrk="0" hangingPunct="1">
       <a:defRPr sz="1800" kern="1200">
         <a:solidFill>
           <a:schemeClr val="tx1"/>
@@ -91,7 +91,7 @@
         <a:cs typeface="+mn-cs"/>
       </a:defRPr>
     </a:lvl7pPr>
-    <a:lvl8pPr marL="3200400" algn="l" defTabSz="914400" rtl="0" eaLnBrk="1" latinLnBrk="0" hangingPunct="1">
+    <a:lvl8pPr marL="3200400" algn="l" defTabSz="457200" rtl="0" eaLnBrk="1" latinLnBrk="0" hangingPunct="1">
       <a:defRPr sz="1800" kern="1200">
         <a:solidFill>
           <a:schemeClr val="tx1"/>
@@ -101,7 +101,7 @@
         <a:cs typeface="+mn-cs"/>
       </a:defRPr>
     </a:lvl8pPr>
-    <a:lvl9pPr marL="3657600" algn="l" defTabSz="914400" rtl="0" eaLnBrk="1" latinLnBrk="0" hangingPunct="1">
+    <a:lvl9pPr marL="3657600" algn="l" defTabSz="457200" rtl="0" eaLnBrk="1" latinLnBrk="0" hangingPunct="1">
       <a:defRPr sz="1800" kern="1200">
         <a:solidFill>
           <a:schemeClr val="tx1"/>
@@ -112,12 +112,27 @@
       </a:defRPr>
     </a:lvl9pPr>
   </p:defaultTextStyle>
+  <p:extLst>
+    <p:ext uri="{EFAFB233-063F-42B5-8137-9DF3F51BA10A}">
+      <p15:sldGuideLst xmlns:p15="http://schemas.microsoft.com/office/powerpoint/2012/main"/>
+    </p:ext>
+  </p:extLst>
 </p:presentation>
 </file>
 
 <file path=ppt/slideLayouts/slideLayout1.xml><?xml version="1.0" encoding="utf-8"?>
-<p:sldLayout xmlns:a="http://schemas.openxmlformats.org/drawingml/2006/main" xmlns:r="http://schemas.openxmlformats.org/officeDocument/2006/relationships" xmlns:p="http://schemas.openxmlformats.org/presentationml/2006/main" type="title" preserve="1">
+<p:sldLayout xmlns:a="http://schemas.openxmlformats.org/drawingml/2006/main" xmlns:r="http://schemas.openxmlformats.org/officeDocument/2006/relationships" xmlns:p="http://schemas.openxmlformats.org/presentationml/2006/main" showMasterSp="0" type="title" preserve="1">
   <p:cSld name="Title Slide">
+    <p:bg>
+      <p:bgPr>
+        <a:solidFill>
+          <a:schemeClr val="bg2">
+            <a:lumMod val="75000"/>
+          </a:schemeClr>
+        </a:solidFill>
+        <a:effectLst/>
+      </p:bgPr>
+    </p:bg>
     <p:spTree>
       <p:nvGrpSpPr>
         <p:cNvPr id="1" name=""/>
@@ -134,13 +149,7 @@
       </p:grpSpPr>
       <p:sp>
         <p:nvSpPr>
-          <p:cNvPr id="2" name="Title 1">
-            <a:extLst>
-              <a:ext uri="{FF2B5EF4-FFF2-40B4-BE49-F238E27FC236}">
-                <a16:creationId xmlns:a16="http://schemas.microsoft.com/office/drawing/2014/main" id="{0F0C1D37-F15F-6DF1-387A-E5A1AC7C53C4}"/>
-              </a:ext>
-            </a:extLst>
-          </p:cNvPr>
+          <p:cNvPr id="2" name="Title 1"/>
           <p:cNvSpPr>
             <a:spLocks noGrp="1"/>
           </p:cNvSpPr>
@@ -150,15 +159,24 @@
         </p:nvSpPr>
         <p:spPr>
           <a:xfrm>
-            <a:off x="1524000" y="1122363"/>
-            <a:ext cx="9144000" cy="2387600"/>
+            <a:off x="1261872" y="758952"/>
+            <a:ext cx="9418320" cy="4041648"/>
           </a:xfrm>
         </p:spPr>
         <p:txBody>
-          <a:bodyPr anchor="b"/>
+          <a:bodyPr anchor="b">
+            <a:normAutofit/>
+          </a:bodyPr>
           <a:lstStyle>
-            <a:lvl1pPr algn="ctr">
-              <a:defRPr sz="6000"/>
+            <a:lvl1pPr algn="l">
+              <a:lnSpc>
+                <a:spcPct val="85000"/>
+              </a:lnSpc>
+              <a:defRPr sz="7200" baseline="0">
+                <a:solidFill>
+                  <a:schemeClr val="tx1"/>
+                </a:solidFill>
+              </a:defRPr>
             </a:lvl1pPr>
           </a:lstStyle>
           <a:p>
@@ -166,18 +184,13 @@
               <a:rPr lang="en-US"/>
               <a:t>Click to edit Master title style</a:t>
             </a:r>
-          </a:p>
-        </p:txBody>
-      </p:sp>
-      <p:sp>
-        <p:nvSpPr>
-          <p:cNvPr id="3" name="Subtitle 2">
-            <a:extLst>
-              <a:ext uri="{FF2B5EF4-FFF2-40B4-BE49-F238E27FC236}">
-                <a16:creationId xmlns:a16="http://schemas.microsoft.com/office/drawing/2014/main" id="{AE39D469-FBFE-6E2F-24D4-2FC809859F94}"/>
-              </a:ext>
-            </a:extLst>
-          </p:cNvPr>
+            <a:endParaRPr lang="en-US" dirty="0"/>
+          </a:p>
+        </p:txBody>
+      </p:sp>
+      <p:sp>
+        <p:nvSpPr>
+          <p:cNvPr id="3" name="Subtitle 2"/>
           <p:cNvSpPr>
             <a:spLocks noGrp="1"/>
           </p:cNvSpPr>
@@ -187,82 +200,95 @@
         </p:nvSpPr>
         <p:spPr>
           <a:xfrm>
-            <a:off x="1524000" y="3602038"/>
-            <a:ext cx="9144000" cy="1655762"/>
+            <a:off x="1261872" y="4800600"/>
+            <a:ext cx="9418320" cy="1691640"/>
           </a:xfrm>
         </p:spPr>
         <p:txBody>
+          <a:bodyPr>
+            <a:normAutofit/>
+          </a:bodyPr>
+          <a:lstStyle>
+            <a:lvl1pPr marL="0" indent="0" algn="l">
+              <a:buNone/>
+              <a:defRPr sz="2200" baseline="0">
+                <a:solidFill>
+                  <a:schemeClr val="tx1">
+                    <a:lumMod val="75000"/>
+                  </a:schemeClr>
+                </a:solidFill>
+              </a:defRPr>
+            </a:lvl1pPr>
+            <a:lvl2pPr marL="457200" indent="0" algn="ctr">
+              <a:buNone/>
+              <a:defRPr sz="2200"/>
+            </a:lvl2pPr>
+            <a:lvl3pPr marL="914400" indent="0" algn="ctr">
+              <a:buNone/>
+              <a:defRPr sz="2200"/>
+            </a:lvl3pPr>
+            <a:lvl4pPr marL="1371600" indent="0" algn="ctr">
+              <a:buNone/>
+              <a:defRPr sz="2000"/>
+            </a:lvl4pPr>
+            <a:lvl5pPr marL="1828800" indent="0" algn="ctr">
+              <a:buNone/>
+              <a:defRPr sz="2000"/>
+            </a:lvl5pPr>
+            <a:lvl6pPr marL="2286000" indent="0" algn="ctr">
+              <a:buNone/>
+              <a:defRPr sz="2000"/>
+            </a:lvl6pPr>
+            <a:lvl7pPr marL="2743200" indent="0" algn="ctr">
+              <a:buNone/>
+              <a:defRPr sz="2000"/>
+            </a:lvl7pPr>
+            <a:lvl8pPr marL="3200400" indent="0" algn="ctr">
+              <a:buNone/>
+              <a:defRPr sz="2000"/>
+            </a:lvl8pPr>
+            <a:lvl9pPr marL="3657600" indent="0" algn="ctr">
+              <a:buNone/>
+              <a:defRPr sz="2000"/>
+            </a:lvl9pPr>
+          </a:lstStyle>
+          <a:p>
+            <a:r>
+              <a:rPr lang="en-US"/>
+              <a:t>Click to edit Master subtitle style</a:t>
+            </a:r>
+            <a:endParaRPr lang="en-US" dirty="0"/>
+          </a:p>
+        </p:txBody>
+      </p:sp>
+      <p:sp>
+        <p:nvSpPr>
+          <p:cNvPr id="4" name="Date Placeholder 3"/>
+          <p:cNvSpPr>
+            <a:spLocks noGrp="1"/>
+          </p:cNvSpPr>
+          <p:nvPr>
+            <p:ph type="dt" sz="half" idx="10"/>
+          </p:nvPr>
+        </p:nvSpPr>
+        <p:spPr/>
+        <p:txBody>
           <a:bodyPr/>
           <a:lstStyle>
-            <a:lvl1pPr marL="0" indent="0" algn="ctr">
-              <a:buNone/>
-              <a:defRPr sz="2400"/>
+            <a:lvl1pPr>
+              <a:defRPr>
+                <a:solidFill>
+                  <a:schemeClr val="tx1">
+                    <a:lumMod val="50000"/>
+                  </a:schemeClr>
+                </a:solidFill>
+              </a:defRPr>
             </a:lvl1pPr>
-            <a:lvl2pPr marL="457200" indent="0" algn="ctr">
-              <a:buNone/>
-              <a:defRPr sz="2000"/>
-            </a:lvl2pPr>
-            <a:lvl3pPr marL="914400" indent="0" algn="ctr">
-              <a:buNone/>
-              <a:defRPr sz="1800"/>
-            </a:lvl3pPr>
-            <a:lvl4pPr marL="1371600" indent="0" algn="ctr">
-              <a:buNone/>
-              <a:defRPr sz="1600"/>
-            </a:lvl4pPr>
-            <a:lvl5pPr marL="1828800" indent="0" algn="ctr">
-              <a:buNone/>
-              <a:defRPr sz="1600"/>
-            </a:lvl5pPr>
-            <a:lvl6pPr marL="2286000" indent="0" algn="ctr">
-              <a:buNone/>
-              <a:defRPr sz="1600"/>
-            </a:lvl6pPr>
-            <a:lvl7pPr marL="2743200" indent="0" algn="ctr">
-              <a:buNone/>
-              <a:defRPr sz="1600"/>
-            </a:lvl7pPr>
-            <a:lvl8pPr marL="3200400" indent="0" algn="ctr">
-              <a:buNone/>
-              <a:defRPr sz="1600"/>
-            </a:lvl8pPr>
-            <a:lvl9pPr marL="3657600" indent="0" algn="ctr">
-              <a:buNone/>
-              <a:defRPr sz="1600"/>
-            </a:lvl9pPr>
           </a:lstStyle>
-          <a:p>
-            <a:r>
-              <a:rPr lang="en-US"/>
-              <a:t>Click to edit Master subtitle style</a:t>
-            </a:r>
-          </a:p>
-        </p:txBody>
-      </p:sp>
-      <p:sp>
-        <p:nvSpPr>
-          <p:cNvPr id="4" name="Date Placeholder 3">
-            <a:extLst>
-              <a:ext uri="{FF2B5EF4-FFF2-40B4-BE49-F238E27FC236}">
-                <a16:creationId xmlns:a16="http://schemas.microsoft.com/office/drawing/2014/main" id="{16BAEBAF-6CE6-E270-256D-2694F9C98530}"/>
-              </a:ext>
-            </a:extLst>
-          </p:cNvPr>
-          <p:cNvSpPr>
-            <a:spLocks noGrp="1"/>
-          </p:cNvSpPr>
-          <p:nvPr>
-            <p:ph type="dt" sz="half" idx="10"/>
-          </p:nvPr>
-        </p:nvSpPr>
-        <p:spPr/>
-        <p:txBody>
-          <a:bodyPr/>
-          <a:lstStyle/>
           <a:p>
             <a:fld id="{DC95CDE6-62DB-428F-99F2-652E4EED0446}" type="datetimeFigureOut">
               <a:rPr lang="en-US" smtClean="0"/>
-              <a:t>6/11/2025</a:t>
+              <a:t>6/12/2025</a:t>
             </a:fld>
             <a:endParaRPr lang="en-US"/>
           </a:p>
@@ -270,13 +296,7 @@
       </p:sp>
       <p:sp>
         <p:nvSpPr>
-          <p:cNvPr id="5" name="Footer Placeholder 4">
-            <a:extLst>
-              <a:ext uri="{FF2B5EF4-FFF2-40B4-BE49-F238E27FC236}">
-                <a16:creationId xmlns:a16="http://schemas.microsoft.com/office/drawing/2014/main" id="{7AE2075A-7E91-FFB1-5895-217BE7D295D7}"/>
-              </a:ext>
-            </a:extLst>
-          </p:cNvPr>
+          <p:cNvPr id="5" name="Footer Placeholder 4"/>
           <p:cNvSpPr>
             <a:spLocks noGrp="1"/>
           </p:cNvSpPr>
@@ -287,7 +307,17 @@
         <p:spPr/>
         <p:txBody>
           <a:bodyPr/>
-          <a:lstStyle/>
+          <a:lstStyle>
+            <a:lvl1pPr>
+              <a:defRPr>
+                <a:solidFill>
+                  <a:schemeClr val="tx1">
+                    <a:lumMod val="65000"/>
+                  </a:schemeClr>
+                </a:solidFill>
+              </a:defRPr>
+            </a:lvl1pPr>
+          </a:lstStyle>
           <a:p>
             <a:endParaRPr lang="en-US"/>
           </a:p>
@@ -295,13 +325,7 @@
       </p:sp>
       <p:sp>
         <p:nvSpPr>
-          <p:cNvPr id="6" name="Slide Number Placeholder 5">
-            <a:extLst>
-              <a:ext uri="{FF2B5EF4-FFF2-40B4-BE49-F238E27FC236}">
-                <a16:creationId xmlns:a16="http://schemas.microsoft.com/office/drawing/2014/main" id="{EA87DB46-953C-AF49-ECA3-3C0EF9746501}"/>
-              </a:ext>
-            </a:extLst>
-          </p:cNvPr>
+          <p:cNvPr id="6" name="Slide Number Placeholder 5"/>
           <p:cNvSpPr>
             <a:spLocks noGrp="1"/>
           </p:cNvSpPr>
@@ -312,7 +336,17 @@
         <p:spPr/>
         <p:txBody>
           <a:bodyPr/>
-          <a:lstStyle/>
+          <a:lstStyle>
+            <a:lvl1pPr>
+              <a:defRPr>
+                <a:solidFill>
+                  <a:schemeClr val="tx1">
+                    <a:lumMod val="65000"/>
+                  </a:schemeClr>
+                </a:solidFill>
+              </a:defRPr>
+            </a:lvl1pPr>
+          </a:lstStyle>
           <a:p>
             <a:fld id="{4406B8F6-8A2C-4637-819C-1D5AE2E3E1FA}" type="slidenum">
               <a:rPr lang="en-US" smtClean="0"/>
@@ -322,15 +356,53 @@
           </a:p>
         </p:txBody>
       </p:sp>
+      <p:sp>
+        <p:nvSpPr>
+          <p:cNvPr id="7" name="Rectangle 6"/>
+          <p:cNvSpPr/>
+          <p:nvPr/>
+        </p:nvSpPr>
+        <p:spPr>
+          <a:xfrm>
+            <a:off x="0" y="0"/>
+            <a:ext cx="457200" cy="6858000"/>
+          </a:xfrm>
+          <a:prstGeom prst="rect">
+            <a:avLst/>
+          </a:prstGeom>
+          <a:solidFill>
+            <a:schemeClr val="accent1"/>
+          </a:solidFill>
+          <a:ln>
+            <a:noFill/>
+          </a:ln>
+        </p:spPr>
+        <p:style>
+          <a:lnRef idx="2">
+            <a:schemeClr val="accent1">
+              <a:shade val="50000"/>
+            </a:schemeClr>
+          </a:lnRef>
+          <a:fillRef idx="1">
+            <a:schemeClr val="accent1"/>
+          </a:fillRef>
+          <a:effectRef idx="0">
+            <a:schemeClr val="accent1"/>
+          </a:effectRef>
+          <a:fontRef idx="minor">
+            <a:schemeClr val="lt1"/>
+          </a:fontRef>
+        </p:style>
+      </p:sp>
     </p:spTree>
     <p:extLst>
       <p:ext uri="{BB962C8B-B14F-4D97-AF65-F5344CB8AC3E}">
-        <p14:creationId xmlns:p14="http://schemas.microsoft.com/office/powerpoint/2010/main" val="831872793"/>
+        <p14:creationId xmlns:p14="http://schemas.microsoft.com/office/powerpoint/2010/main" val="671541807"/>
       </p:ext>
     </p:extLst>
   </p:cSld>
   <p:clrMapOvr>
-    <a:masterClrMapping/>
+    <a:overrideClrMapping bg1="dk1" tx1="lt1" bg2="dk2" tx2="lt2" accent1="accent1" accent2="accent2" accent3="accent3" accent4="accent4" accent5="accent5" accent6="accent6" hlink="hlink" folHlink="folHlink"/>
   </p:clrMapOvr>
 </p:sldLayout>
 </file>
@@ -354,13 +426,7 @@
       </p:grpSpPr>
       <p:sp>
         <p:nvSpPr>
-          <p:cNvPr id="2" name="Title 1">
-            <a:extLst>
-              <a:ext uri="{FF2B5EF4-FFF2-40B4-BE49-F238E27FC236}">
-                <a16:creationId xmlns:a16="http://schemas.microsoft.com/office/drawing/2014/main" id="{EBF7BCB0-FF54-5B1C-4CE3-90D1B68CC756}"/>
-              </a:ext>
-            </a:extLst>
-          </p:cNvPr>
+          <p:cNvPr id="2" name="Title 1"/>
           <p:cNvSpPr>
             <a:spLocks noGrp="1"/>
           </p:cNvSpPr>
@@ -377,18 +443,13 @@
               <a:rPr lang="en-US"/>
               <a:t>Click to edit Master title style</a:t>
             </a:r>
-          </a:p>
-        </p:txBody>
-      </p:sp>
-      <p:sp>
-        <p:nvSpPr>
-          <p:cNvPr id="3" name="Vertical Text Placeholder 2">
-            <a:extLst>
-              <a:ext uri="{FF2B5EF4-FFF2-40B4-BE49-F238E27FC236}">
-                <a16:creationId xmlns:a16="http://schemas.microsoft.com/office/drawing/2014/main" id="{8F6EB591-3F15-DE7C-405A-F6B6C1C334DB}"/>
-              </a:ext>
-            </a:extLst>
-          </p:cNvPr>
+            <a:endParaRPr lang="en-US" dirty="0"/>
+          </a:p>
+        </p:txBody>
+      </p:sp>
+      <p:sp>
+        <p:nvSpPr>
+          <p:cNvPr id="3" name="Vertical Text Placeholder 2"/>
           <p:cNvSpPr>
             <a:spLocks noGrp="1"/>
           </p:cNvSpPr>
@@ -434,18 +495,13 @@
               <a:rPr lang="en-US"/>
               <a:t>Fifth level</a:t>
             </a:r>
-          </a:p>
-        </p:txBody>
-      </p:sp>
-      <p:sp>
-        <p:nvSpPr>
-          <p:cNvPr id="4" name="Date Placeholder 3">
-            <a:extLst>
-              <a:ext uri="{FF2B5EF4-FFF2-40B4-BE49-F238E27FC236}">
-                <a16:creationId xmlns:a16="http://schemas.microsoft.com/office/drawing/2014/main" id="{322752C3-A50D-3B1A-DCE4-A44153D5FA0B}"/>
-              </a:ext>
-            </a:extLst>
-          </p:cNvPr>
+            <a:endParaRPr lang="en-US" dirty="0"/>
+          </a:p>
+        </p:txBody>
+      </p:sp>
+      <p:sp>
+        <p:nvSpPr>
+          <p:cNvPr id="4" name="Date Placeholder 3"/>
           <p:cNvSpPr>
             <a:spLocks noGrp="1"/>
           </p:cNvSpPr>
@@ -460,7 +516,7 @@
           <a:p>
             <a:fld id="{DC95CDE6-62DB-428F-99F2-652E4EED0446}" type="datetimeFigureOut">
               <a:rPr lang="en-US" smtClean="0"/>
-              <a:t>6/11/2025</a:t>
+              <a:t>6/12/2025</a:t>
             </a:fld>
             <a:endParaRPr lang="en-US"/>
           </a:p>
@@ -468,13 +524,7 @@
       </p:sp>
       <p:sp>
         <p:nvSpPr>
-          <p:cNvPr id="5" name="Footer Placeholder 4">
-            <a:extLst>
-              <a:ext uri="{FF2B5EF4-FFF2-40B4-BE49-F238E27FC236}">
-                <a16:creationId xmlns:a16="http://schemas.microsoft.com/office/drawing/2014/main" id="{DA5BF173-CE26-381B-79B7-9D1F0BD1B8BA}"/>
-              </a:ext>
-            </a:extLst>
-          </p:cNvPr>
+          <p:cNvPr id="5" name="Footer Placeholder 4"/>
           <p:cNvSpPr>
             <a:spLocks noGrp="1"/>
           </p:cNvSpPr>
@@ -493,13 +543,7 @@
       </p:sp>
       <p:sp>
         <p:nvSpPr>
-          <p:cNvPr id="6" name="Slide Number Placeholder 5">
-            <a:extLst>
-              <a:ext uri="{FF2B5EF4-FFF2-40B4-BE49-F238E27FC236}">
-                <a16:creationId xmlns:a16="http://schemas.microsoft.com/office/drawing/2014/main" id="{6889A6AA-B55F-37A1-9131-EF16BD2BA196}"/>
-              </a:ext>
-            </a:extLst>
-          </p:cNvPr>
+          <p:cNvPr id="6" name="Slide Number Placeholder 5"/>
           <p:cNvSpPr>
             <a:spLocks noGrp="1"/>
           </p:cNvSpPr>
@@ -523,7 +567,7 @@
     </p:spTree>
     <p:extLst>
       <p:ext uri="{BB962C8B-B14F-4D97-AF65-F5344CB8AC3E}">
-        <p14:creationId xmlns:p14="http://schemas.microsoft.com/office/powerpoint/2010/main" val="1896608618"/>
+        <p14:creationId xmlns:p14="http://schemas.microsoft.com/office/powerpoint/2010/main" val="144273337"/>
       </p:ext>
     </p:extLst>
   </p:cSld>
@@ -552,13 +596,7 @@
       </p:grpSpPr>
       <p:sp>
         <p:nvSpPr>
-          <p:cNvPr id="2" name="Vertical Title 1">
-            <a:extLst>
-              <a:ext uri="{FF2B5EF4-FFF2-40B4-BE49-F238E27FC236}">
-                <a16:creationId xmlns:a16="http://schemas.microsoft.com/office/drawing/2014/main" id="{EF28E221-8648-9BF3-220E-9735F95D07F3}"/>
-              </a:ext>
-            </a:extLst>
-          </p:cNvPr>
+          <p:cNvPr id="2" name="Vertical Title 1"/>
           <p:cNvSpPr>
             <a:spLocks noGrp="1"/>
           </p:cNvSpPr>
@@ -568,8 +606,8 @@
         </p:nvSpPr>
         <p:spPr>
           <a:xfrm>
-            <a:off x="8724900" y="365125"/>
-            <a:ext cx="2628900" cy="5811838"/>
+            <a:off x="8648700" y="381000"/>
+            <a:ext cx="2476500" cy="5897562"/>
           </a:xfrm>
         </p:spPr>
         <p:txBody>
@@ -580,18 +618,13 @@
               <a:rPr lang="en-US"/>
               <a:t>Click to edit Master title style</a:t>
             </a:r>
-          </a:p>
-        </p:txBody>
-      </p:sp>
-      <p:sp>
-        <p:nvSpPr>
-          <p:cNvPr id="3" name="Vertical Text Placeholder 2">
-            <a:extLst>
-              <a:ext uri="{FF2B5EF4-FFF2-40B4-BE49-F238E27FC236}">
-                <a16:creationId xmlns:a16="http://schemas.microsoft.com/office/drawing/2014/main" id="{F8C3B993-7814-BC01-E5E2-C4701C0A166D}"/>
-              </a:ext>
-            </a:extLst>
-          </p:cNvPr>
+            <a:endParaRPr lang="en-US" dirty="0"/>
+          </a:p>
+        </p:txBody>
+      </p:sp>
+      <p:sp>
+        <p:nvSpPr>
+          <p:cNvPr id="3" name="Vertical Text Placeholder 2"/>
           <p:cNvSpPr>
             <a:spLocks noGrp="1"/>
           </p:cNvSpPr>
@@ -601,8 +634,8 @@
         </p:nvSpPr>
         <p:spPr>
           <a:xfrm>
-            <a:off x="838200" y="365125"/>
-            <a:ext cx="7734300" cy="5811838"/>
+            <a:off x="762000" y="381000"/>
+            <a:ext cx="7734300" cy="5897562"/>
           </a:xfrm>
         </p:spPr>
         <p:txBody>
@@ -642,18 +675,13 @@
               <a:rPr lang="en-US"/>
               <a:t>Fifth level</a:t>
             </a:r>
-          </a:p>
-        </p:txBody>
-      </p:sp>
-      <p:sp>
-        <p:nvSpPr>
-          <p:cNvPr id="4" name="Date Placeholder 3">
-            <a:extLst>
-              <a:ext uri="{FF2B5EF4-FFF2-40B4-BE49-F238E27FC236}">
-                <a16:creationId xmlns:a16="http://schemas.microsoft.com/office/drawing/2014/main" id="{1ACB97D0-5AEB-906F-3DDE-98BF6D8DC46F}"/>
-              </a:ext>
-            </a:extLst>
-          </p:cNvPr>
+            <a:endParaRPr lang="en-US" dirty="0"/>
+          </a:p>
+        </p:txBody>
+      </p:sp>
+      <p:sp>
+        <p:nvSpPr>
+          <p:cNvPr id="4" name="Date Placeholder 3"/>
           <p:cNvSpPr>
             <a:spLocks noGrp="1"/>
           </p:cNvSpPr>
@@ -668,7 +696,7 @@
           <a:p>
             <a:fld id="{DC95CDE6-62DB-428F-99F2-652E4EED0446}" type="datetimeFigureOut">
               <a:rPr lang="en-US" smtClean="0"/>
-              <a:t>6/11/2025</a:t>
+              <a:t>6/12/2025</a:t>
             </a:fld>
             <a:endParaRPr lang="en-US"/>
           </a:p>
@@ -676,13 +704,7 @@
       </p:sp>
       <p:sp>
         <p:nvSpPr>
-          <p:cNvPr id="5" name="Footer Placeholder 4">
-            <a:extLst>
-              <a:ext uri="{FF2B5EF4-FFF2-40B4-BE49-F238E27FC236}">
-                <a16:creationId xmlns:a16="http://schemas.microsoft.com/office/drawing/2014/main" id="{1AAD2A80-6A35-8881-C6E3-7253E0829C28}"/>
-              </a:ext>
-            </a:extLst>
-          </p:cNvPr>
+          <p:cNvPr id="5" name="Footer Placeholder 4"/>
           <p:cNvSpPr>
             <a:spLocks noGrp="1"/>
           </p:cNvSpPr>
@@ -701,13 +723,7 @@
       </p:sp>
       <p:sp>
         <p:nvSpPr>
-          <p:cNvPr id="6" name="Slide Number Placeholder 5">
-            <a:extLst>
-              <a:ext uri="{FF2B5EF4-FFF2-40B4-BE49-F238E27FC236}">
-                <a16:creationId xmlns:a16="http://schemas.microsoft.com/office/drawing/2014/main" id="{35B432E7-07A3-1798-ECD9-882D0341FB0D}"/>
-              </a:ext>
-            </a:extLst>
-          </p:cNvPr>
+          <p:cNvPr id="6" name="Slide Number Placeholder 5"/>
           <p:cNvSpPr>
             <a:spLocks noGrp="1"/>
           </p:cNvSpPr>
@@ -731,7 +747,7 @@
     </p:spTree>
     <p:extLst>
       <p:ext uri="{BB962C8B-B14F-4D97-AF65-F5344CB8AC3E}">
-        <p14:creationId xmlns:p14="http://schemas.microsoft.com/office/powerpoint/2010/main" val="3743119379"/>
+        <p14:creationId xmlns:p14="http://schemas.microsoft.com/office/powerpoint/2010/main" val="1717833491"/>
       </p:ext>
     </p:extLst>
   </p:cSld>
@@ -760,13 +776,7 @@
       </p:grpSpPr>
       <p:sp>
         <p:nvSpPr>
-          <p:cNvPr id="2" name="Title 1">
-            <a:extLst>
-              <a:ext uri="{FF2B5EF4-FFF2-40B4-BE49-F238E27FC236}">
-                <a16:creationId xmlns:a16="http://schemas.microsoft.com/office/drawing/2014/main" id="{E8464AAC-0C63-BF38-F577-584966A780A8}"/>
-              </a:ext>
-            </a:extLst>
-          </p:cNvPr>
+          <p:cNvPr id="2" name="Title 1"/>
           <p:cNvSpPr>
             <a:spLocks noGrp="1"/>
           </p:cNvSpPr>
@@ -783,18 +793,13 @@
               <a:rPr lang="en-US"/>
               <a:t>Click to edit Master title style</a:t>
             </a:r>
-          </a:p>
-        </p:txBody>
-      </p:sp>
-      <p:sp>
-        <p:nvSpPr>
-          <p:cNvPr id="3" name="Content Placeholder 2">
-            <a:extLst>
-              <a:ext uri="{FF2B5EF4-FFF2-40B4-BE49-F238E27FC236}">
-                <a16:creationId xmlns:a16="http://schemas.microsoft.com/office/drawing/2014/main" id="{C4CDDCE8-2140-8320-7E25-25159257E7A9}"/>
-              </a:ext>
-            </a:extLst>
-          </p:cNvPr>
+            <a:endParaRPr lang="en-US" dirty="0"/>
+          </a:p>
+        </p:txBody>
+      </p:sp>
+      <p:sp>
+        <p:nvSpPr>
+          <p:cNvPr id="3" name="Content Placeholder 2"/>
           <p:cNvSpPr>
             <a:spLocks noGrp="1"/>
           </p:cNvSpPr>
@@ -840,18 +845,13 @@
               <a:rPr lang="en-US"/>
               <a:t>Fifth level</a:t>
             </a:r>
-          </a:p>
-        </p:txBody>
-      </p:sp>
-      <p:sp>
-        <p:nvSpPr>
-          <p:cNvPr id="4" name="Date Placeholder 3">
-            <a:extLst>
-              <a:ext uri="{FF2B5EF4-FFF2-40B4-BE49-F238E27FC236}">
-                <a16:creationId xmlns:a16="http://schemas.microsoft.com/office/drawing/2014/main" id="{AD5B8B49-5262-5838-7725-9A667779E731}"/>
-              </a:ext>
-            </a:extLst>
-          </p:cNvPr>
+            <a:endParaRPr lang="en-US" dirty="0"/>
+          </a:p>
+        </p:txBody>
+      </p:sp>
+      <p:sp>
+        <p:nvSpPr>
+          <p:cNvPr id="4" name="Date Placeholder 3"/>
           <p:cNvSpPr>
             <a:spLocks noGrp="1"/>
           </p:cNvSpPr>
@@ -866,7 +866,7 @@
           <a:p>
             <a:fld id="{DC95CDE6-62DB-428F-99F2-652E4EED0446}" type="datetimeFigureOut">
               <a:rPr lang="en-US" smtClean="0"/>
-              <a:t>6/11/2025</a:t>
+              <a:t>6/12/2025</a:t>
             </a:fld>
             <a:endParaRPr lang="en-US"/>
           </a:p>
@@ -874,13 +874,7 @@
       </p:sp>
       <p:sp>
         <p:nvSpPr>
-          <p:cNvPr id="5" name="Footer Placeholder 4">
-            <a:extLst>
-              <a:ext uri="{FF2B5EF4-FFF2-40B4-BE49-F238E27FC236}">
-                <a16:creationId xmlns:a16="http://schemas.microsoft.com/office/drawing/2014/main" id="{03C4D036-B0A8-4269-2646-A13E96D6C208}"/>
-              </a:ext>
-            </a:extLst>
-          </p:cNvPr>
+          <p:cNvPr id="5" name="Footer Placeholder 4"/>
           <p:cNvSpPr>
             <a:spLocks noGrp="1"/>
           </p:cNvSpPr>
@@ -899,13 +893,7 @@
       </p:sp>
       <p:sp>
         <p:nvSpPr>
-          <p:cNvPr id="6" name="Slide Number Placeholder 5">
-            <a:extLst>
-              <a:ext uri="{FF2B5EF4-FFF2-40B4-BE49-F238E27FC236}">
-                <a16:creationId xmlns:a16="http://schemas.microsoft.com/office/drawing/2014/main" id="{970C2ABF-423F-A4EE-6BEC-E2079DB8826D}"/>
-              </a:ext>
-            </a:extLst>
-          </p:cNvPr>
+          <p:cNvPr id="6" name="Slide Number Placeholder 5"/>
           <p:cNvSpPr>
             <a:spLocks noGrp="1"/>
           </p:cNvSpPr>
@@ -929,7 +917,7 @@
     </p:spTree>
     <p:extLst>
       <p:ext uri="{BB962C8B-B14F-4D97-AF65-F5344CB8AC3E}">
-        <p14:creationId xmlns:p14="http://schemas.microsoft.com/office/powerpoint/2010/main" val="2201124660"/>
+        <p14:creationId xmlns:p14="http://schemas.microsoft.com/office/powerpoint/2010/main" val="1376298832"/>
       </p:ext>
     </p:extLst>
   </p:cSld>
@@ -958,13 +946,7 @@
       </p:grpSpPr>
       <p:sp>
         <p:nvSpPr>
-          <p:cNvPr id="2" name="Title 1">
-            <a:extLst>
-              <a:ext uri="{FF2B5EF4-FFF2-40B4-BE49-F238E27FC236}">
-                <a16:creationId xmlns:a16="http://schemas.microsoft.com/office/drawing/2014/main" id="{49E6B71A-100B-498A-D444-9526CFFDC8A5}"/>
-              </a:ext>
-            </a:extLst>
-          </p:cNvPr>
+          <p:cNvPr id="2" name="Title 1"/>
           <p:cNvSpPr>
             <a:spLocks noGrp="1"/>
           </p:cNvSpPr>
@@ -974,15 +956,20 @@
         </p:nvSpPr>
         <p:spPr>
           <a:xfrm>
-            <a:off x="831850" y="1709738"/>
-            <a:ext cx="10515600" cy="2852737"/>
+            <a:off x="1261872" y="758952"/>
+            <a:ext cx="9418320" cy="4041648"/>
           </a:xfrm>
         </p:spPr>
         <p:txBody>
-          <a:bodyPr anchor="b"/>
+          <a:bodyPr anchor="b">
+            <a:normAutofit/>
+          </a:bodyPr>
           <a:lstStyle>
             <a:lvl1pPr>
-              <a:defRPr sz="6000"/>
+              <a:lnSpc>
+                <a:spcPct val="85000"/>
+              </a:lnSpc>
+              <a:defRPr sz="7200" b="0"/>
             </a:lvl1pPr>
           </a:lstStyle>
           <a:p>
@@ -990,18 +977,13 @@
               <a:rPr lang="en-US"/>
               <a:t>Click to edit Master title style</a:t>
             </a:r>
-          </a:p>
-        </p:txBody>
-      </p:sp>
-      <p:sp>
-        <p:nvSpPr>
-          <p:cNvPr id="3" name="Text Placeholder 2">
-            <a:extLst>
-              <a:ext uri="{FF2B5EF4-FFF2-40B4-BE49-F238E27FC236}">
-                <a16:creationId xmlns:a16="http://schemas.microsoft.com/office/drawing/2014/main" id="{76980A65-C93D-E3E3-FBEB-D43323522F85}"/>
-              </a:ext>
-            </a:extLst>
-          </p:cNvPr>
+            <a:endParaRPr lang="en-US" dirty="0"/>
+          </a:p>
+        </p:txBody>
+      </p:sp>
+      <p:sp>
+        <p:nvSpPr>
+          <p:cNvPr id="3" name="Text Placeholder 2"/>
           <p:cNvSpPr>
             <a:spLocks noGrp="1"/>
           </p:cNvSpPr>
@@ -1011,26 +993,29 @@
         </p:nvSpPr>
         <p:spPr>
           <a:xfrm>
-            <a:off x="831850" y="4589463"/>
-            <a:ext cx="10515600" cy="1500187"/>
+            <a:off x="1261872" y="4800600"/>
+            <a:ext cx="9418320" cy="1691640"/>
           </a:xfrm>
         </p:spPr>
         <p:txBody>
-          <a:bodyPr/>
+          <a:bodyPr anchor="t">
+            <a:normAutofit/>
+          </a:bodyPr>
           <a:lstStyle>
             <a:lvl1pPr marL="0" indent="0">
               <a:buNone/>
-              <a:defRPr sz="2400">
+              <a:defRPr sz="2200">
                 <a:solidFill>
                   <a:schemeClr val="tx1">
-                    <a:tint val="75000"/>
+                    <a:lumMod val="65000"/>
+                    <a:lumOff val="35000"/>
                   </a:schemeClr>
                 </a:solidFill>
               </a:defRPr>
             </a:lvl1pPr>
             <a:lvl2pPr marL="457200" indent="0">
               <a:buNone/>
-              <a:defRPr sz="2000">
+              <a:defRPr sz="1800">
                 <a:solidFill>
                   <a:schemeClr val="tx1">
                     <a:tint val="75000"/>
@@ -1040,7 +1025,7 @@
             </a:lvl2pPr>
             <a:lvl3pPr marL="914400" indent="0">
               <a:buNone/>
-              <a:defRPr sz="1800">
+              <a:defRPr sz="1600">
                 <a:solidFill>
                   <a:schemeClr val="tx1">
                     <a:tint val="75000"/>
@@ -1050,7 +1035,7 @@
             </a:lvl3pPr>
             <a:lvl4pPr marL="1371600" indent="0">
               <a:buNone/>
-              <a:defRPr sz="1600">
+              <a:defRPr sz="1400">
                 <a:solidFill>
                   <a:schemeClr val="tx1">
                     <a:tint val="75000"/>
@@ -1060,7 +1045,7 @@
             </a:lvl4pPr>
             <a:lvl5pPr marL="1828800" indent="0">
               <a:buNone/>
-              <a:defRPr sz="1600">
+              <a:defRPr sz="1400">
                 <a:solidFill>
                   <a:schemeClr val="tx1">
                     <a:tint val="75000"/>
@@ -1070,7 +1055,7 @@
             </a:lvl5pPr>
             <a:lvl6pPr marL="2286000" indent="0">
               <a:buNone/>
-              <a:defRPr sz="1600">
+              <a:defRPr sz="1400">
                 <a:solidFill>
                   <a:schemeClr val="tx1">
                     <a:tint val="75000"/>
@@ -1080,7 +1065,7 @@
             </a:lvl6pPr>
             <a:lvl7pPr marL="2743200" indent="0">
               <a:buNone/>
-              <a:defRPr sz="1600">
+              <a:defRPr sz="1400">
                 <a:solidFill>
                   <a:schemeClr val="tx1">
                     <a:tint val="75000"/>
@@ -1090,7 +1075,7 @@
             </a:lvl7pPr>
             <a:lvl8pPr marL="3200400" indent="0">
               <a:buNone/>
-              <a:defRPr sz="1600">
+              <a:defRPr sz="1400">
                 <a:solidFill>
                   <a:schemeClr val="tx1">
                     <a:tint val="75000"/>
@@ -1100,7 +1085,7 @@
             </a:lvl8pPr>
             <a:lvl9pPr marL="3657600" indent="0">
               <a:buNone/>
-              <a:defRPr sz="1600">
+              <a:defRPr sz="1400">
                 <a:solidFill>
                   <a:schemeClr val="tx1">
                     <a:tint val="75000"/>
@@ -1120,13 +1105,7 @@
       </p:sp>
       <p:sp>
         <p:nvSpPr>
-          <p:cNvPr id="4" name="Date Placeholder 3">
-            <a:extLst>
-              <a:ext uri="{FF2B5EF4-FFF2-40B4-BE49-F238E27FC236}">
-                <a16:creationId xmlns:a16="http://schemas.microsoft.com/office/drawing/2014/main" id="{5AD406E3-282C-E60B-1A30-4E070175052B}"/>
-              </a:ext>
-            </a:extLst>
-          </p:cNvPr>
+          <p:cNvPr id="4" name="Date Placeholder 3"/>
           <p:cNvSpPr>
             <a:spLocks noGrp="1"/>
           </p:cNvSpPr>
@@ -1141,7 +1120,7 @@
           <a:p>
             <a:fld id="{DC95CDE6-62DB-428F-99F2-652E4EED0446}" type="datetimeFigureOut">
               <a:rPr lang="en-US" smtClean="0"/>
-              <a:t>6/11/2025</a:t>
+              <a:t>6/12/2025</a:t>
             </a:fld>
             <a:endParaRPr lang="en-US"/>
           </a:p>
@@ -1149,13 +1128,7 @@
       </p:sp>
       <p:sp>
         <p:nvSpPr>
-          <p:cNvPr id="5" name="Footer Placeholder 4">
-            <a:extLst>
-              <a:ext uri="{FF2B5EF4-FFF2-40B4-BE49-F238E27FC236}">
-                <a16:creationId xmlns:a16="http://schemas.microsoft.com/office/drawing/2014/main" id="{85DB3C72-DB5A-605A-52FC-94D0A4A8D360}"/>
-              </a:ext>
-            </a:extLst>
-          </p:cNvPr>
+          <p:cNvPr id="5" name="Footer Placeholder 4"/>
           <p:cNvSpPr>
             <a:spLocks noGrp="1"/>
           </p:cNvSpPr>
@@ -1174,13 +1147,7 @@
       </p:sp>
       <p:sp>
         <p:nvSpPr>
-          <p:cNvPr id="6" name="Slide Number Placeholder 5">
-            <a:extLst>
-              <a:ext uri="{FF2B5EF4-FFF2-40B4-BE49-F238E27FC236}">
-                <a16:creationId xmlns:a16="http://schemas.microsoft.com/office/drawing/2014/main" id="{91F494B2-33A0-FBDB-3E93-EE348E3AB334}"/>
-              </a:ext>
-            </a:extLst>
-          </p:cNvPr>
+          <p:cNvPr id="6" name="Slide Number Placeholder 5"/>
           <p:cNvSpPr>
             <a:spLocks noGrp="1"/>
           </p:cNvSpPr>
@@ -1201,10 +1168,48 @@
           </a:p>
         </p:txBody>
       </p:sp>
+      <p:sp>
+        <p:nvSpPr>
+          <p:cNvPr id="7" name="Rectangle 6"/>
+          <p:cNvSpPr/>
+          <p:nvPr/>
+        </p:nvSpPr>
+        <p:spPr>
+          <a:xfrm>
+            <a:off x="0" y="0"/>
+            <a:ext cx="457200" cy="6858000"/>
+          </a:xfrm>
+          <a:prstGeom prst="rect">
+            <a:avLst/>
+          </a:prstGeom>
+          <a:solidFill>
+            <a:schemeClr val="accent1"/>
+          </a:solidFill>
+          <a:ln>
+            <a:noFill/>
+          </a:ln>
+        </p:spPr>
+        <p:style>
+          <a:lnRef idx="2">
+            <a:schemeClr val="accent1">
+              <a:shade val="50000"/>
+            </a:schemeClr>
+          </a:lnRef>
+          <a:fillRef idx="1">
+            <a:schemeClr val="accent1"/>
+          </a:fillRef>
+          <a:effectRef idx="0">
+            <a:schemeClr val="accent1"/>
+          </a:effectRef>
+          <a:fontRef idx="minor">
+            <a:schemeClr val="lt1"/>
+          </a:fontRef>
+        </p:style>
+      </p:sp>
     </p:spTree>
     <p:extLst>
       <p:ext uri="{BB962C8B-B14F-4D97-AF65-F5344CB8AC3E}">
-        <p14:creationId xmlns:p14="http://schemas.microsoft.com/office/powerpoint/2010/main" val="4155992667"/>
+        <p14:creationId xmlns:p14="http://schemas.microsoft.com/office/powerpoint/2010/main" val="3476891333"/>
       </p:ext>
     </p:extLst>
   </p:cSld>
@@ -1233,13 +1238,7 @@
       </p:grpSpPr>
       <p:sp>
         <p:nvSpPr>
-          <p:cNvPr id="2" name="Title 1">
-            <a:extLst>
-              <a:ext uri="{FF2B5EF4-FFF2-40B4-BE49-F238E27FC236}">
-                <a16:creationId xmlns:a16="http://schemas.microsoft.com/office/drawing/2014/main" id="{41C5A679-95CC-F70E-BCC2-D7259413E8D9}"/>
-              </a:ext>
-            </a:extLst>
-          </p:cNvPr>
+          <p:cNvPr id="2" name="Title 1"/>
           <p:cNvSpPr>
             <a:spLocks noGrp="1"/>
           </p:cNvSpPr>
@@ -1256,18 +1255,13 @@
               <a:rPr lang="en-US"/>
               <a:t>Click to edit Master title style</a:t>
             </a:r>
-          </a:p>
-        </p:txBody>
-      </p:sp>
-      <p:sp>
-        <p:nvSpPr>
-          <p:cNvPr id="3" name="Content Placeholder 2">
-            <a:extLst>
-              <a:ext uri="{FF2B5EF4-FFF2-40B4-BE49-F238E27FC236}">
-                <a16:creationId xmlns:a16="http://schemas.microsoft.com/office/drawing/2014/main" id="{D183AF02-D7B8-6D94-835A-EA9E3990329D}"/>
-              </a:ext>
-            </a:extLst>
-          </p:cNvPr>
+            <a:endParaRPr lang="en-US" dirty="0"/>
+          </a:p>
+        </p:txBody>
+      </p:sp>
+      <p:sp>
+        <p:nvSpPr>
+          <p:cNvPr id="3" name="Content Placeholder 2"/>
           <p:cNvSpPr>
             <a:spLocks noGrp="1"/>
           </p:cNvSpPr>
@@ -1277,13 +1271,41 @@
         </p:nvSpPr>
         <p:spPr>
           <a:xfrm>
-            <a:off x="838200" y="1825625"/>
-            <a:ext cx="5181600" cy="4351338"/>
+            <a:off x="1261872" y="1828800"/>
+            <a:ext cx="4480560" cy="4351337"/>
           </a:xfrm>
         </p:spPr>
         <p:txBody>
           <a:bodyPr/>
-          <a:lstStyle/>
+          <a:lstStyle>
+            <a:lvl1pPr>
+              <a:defRPr sz="1800"/>
+            </a:lvl1pPr>
+            <a:lvl2pPr>
+              <a:defRPr sz="1600"/>
+            </a:lvl2pPr>
+            <a:lvl3pPr>
+              <a:defRPr sz="1400"/>
+            </a:lvl3pPr>
+            <a:lvl4pPr>
+              <a:defRPr sz="1400"/>
+            </a:lvl4pPr>
+            <a:lvl5pPr>
+              <a:defRPr sz="1400"/>
+            </a:lvl5pPr>
+            <a:lvl6pPr>
+              <a:defRPr sz="1400"/>
+            </a:lvl6pPr>
+            <a:lvl7pPr>
+              <a:defRPr sz="1400"/>
+            </a:lvl7pPr>
+            <a:lvl8pPr>
+              <a:defRPr sz="1400"/>
+            </a:lvl8pPr>
+            <a:lvl9pPr>
+              <a:defRPr sz="1400"/>
+            </a:lvl9pPr>
+          </a:lstStyle>
           <a:p>
             <a:pPr lvl="0"/>
             <a:r>
@@ -1318,18 +1340,13 @@
               <a:rPr lang="en-US"/>
               <a:t>Fifth level</a:t>
             </a:r>
-          </a:p>
-        </p:txBody>
-      </p:sp>
-      <p:sp>
-        <p:nvSpPr>
-          <p:cNvPr id="4" name="Content Placeholder 3">
-            <a:extLst>
-              <a:ext uri="{FF2B5EF4-FFF2-40B4-BE49-F238E27FC236}">
-                <a16:creationId xmlns:a16="http://schemas.microsoft.com/office/drawing/2014/main" id="{F73BEF33-E65E-CE57-92B3-F5C2AF4AB4C6}"/>
-              </a:ext>
-            </a:extLst>
-          </p:cNvPr>
+            <a:endParaRPr lang="en-US" dirty="0"/>
+          </a:p>
+        </p:txBody>
+      </p:sp>
+      <p:sp>
+        <p:nvSpPr>
+          <p:cNvPr id="4" name="Content Placeholder 3"/>
           <p:cNvSpPr>
             <a:spLocks noGrp="1"/>
           </p:cNvSpPr>
@@ -1339,13 +1356,41 @@
         </p:nvSpPr>
         <p:spPr>
           <a:xfrm>
-            <a:off x="6172200" y="1825625"/>
-            <a:ext cx="5181600" cy="4351338"/>
+            <a:off x="6126480" y="1828800"/>
+            <a:ext cx="4480560" cy="4351337"/>
           </a:xfrm>
         </p:spPr>
         <p:txBody>
           <a:bodyPr/>
-          <a:lstStyle/>
+          <a:lstStyle>
+            <a:lvl1pPr>
+              <a:defRPr sz="1800"/>
+            </a:lvl1pPr>
+            <a:lvl2pPr>
+              <a:defRPr sz="1600"/>
+            </a:lvl2pPr>
+            <a:lvl3pPr>
+              <a:defRPr sz="1400"/>
+            </a:lvl3pPr>
+            <a:lvl4pPr>
+              <a:defRPr sz="1400"/>
+            </a:lvl4pPr>
+            <a:lvl5pPr>
+              <a:defRPr sz="1400"/>
+            </a:lvl5pPr>
+            <a:lvl6pPr>
+              <a:defRPr sz="1400"/>
+            </a:lvl6pPr>
+            <a:lvl7pPr>
+              <a:defRPr sz="1400"/>
+            </a:lvl7pPr>
+            <a:lvl8pPr>
+              <a:defRPr sz="1400"/>
+            </a:lvl8pPr>
+            <a:lvl9pPr>
+              <a:defRPr sz="1400"/>
+            </a:lvl9pPr>
+          </a:lstStyle>
           <a:p>
             <a:pPr lvl="0"/>
             <a:r>
@@ -1380,18 +1425,13 @@
               <a:rPr lang="en-US"/>
               <a:t>Fifth level</a:t>
             </a:r>
-          </a:p>
-        </p:txBody>
-      </p:sp>
-      <p:sp>
-        <p:nvSpPr>
-          <p:cNvPr id="5" name="Date Placeholder 4">
-            <a:extLst>
-              <a:ext uri="{FF2B5EF4-FFF2-40B4-BE49-F238E27FC236}">
-                <a16:creationId xmlns:a16="http://schemas.microsoft.com/office/drawing/2014/main" id="{18B7107D-88C4-F2D5-7D9F-5587DBB38082}"/>
-              </a:ext>
-            </a:extLst>
-          </p:cNvPr>
+            <a:endParaRPr lang="en-US" dirty="0"/>
+          </a:p>
+        </p:txBody>
+      </p:sp>
+      <p:sp>
+        <p:nvSpPr>
+          <p:cNvPr id="5" name="Date Placeholder 4"/>
           <p:cNvSpPr>
             <a:spLocks noGrp="1"/>
           </p:cNvSpPr>
@@ -1406,7 +1446,7 @@
           <a:p>
             <a:fld id="{DC95CDE6-62DB-428F-99F2-652E4EED0446}" type="datetimeFigureOut">
               <a:rPr lang="en-US" smtClean="0"/>
-              <a:t>6/11/2025</a:t>
+              <a:t>6/12/2025</a:t>
             </a:fld>
             <a:endParaRPr lang="en-US"/>
           </a:p>
@@ -1414,13 +1454,7 @@
       </p:sp>
       <p:sp>
         <p:nvSpPr>
-          <p:cNvPr id="6" name="Footer Placeholder 5">
-            <a:extLst>
-              <a:ext uri="{FF2B5EF4-FFF2-40B4-BE49-F238E27FC236}">
-                <a16:creationId xmlns:a16="http://schemas.microsoft.com/office/drawing/2014/main" id="{6722E6E1-2750-6A90-74CD-A2273C77DDC0}"/>
-              </a:ext>
-            </a:extLst>
-          </p:cNvPr>
+          <p:cNvPr id="6" name="Footer Placeholder 5"/>
           <p:cNvSpPr>
             <a:spLocks noGrp="1"/>
           </p:cNvSpPr>
@@ -1439,13 +1473,7 @@
       </p:sp>
       <p:sp>
         <p:nvSpPr>
-          <p:cNvPr id="7" name="Slide Number Placeholder 6">
-            <a:extLst>
-              <a:ext uri="{FF2B5EF4-FFF2-40B4-BE49-F238E27FC236}">
-                <a16:creationId xmlns:a16="http://schemas.microsoft.com/office/drawing/2014/main" id="{CA1006AD-DCBF-EEE2-2250-85A714032046}"/>
-              </a:ext>
-            </a:extLst>
-          </p:cNvPr>
+          <p:cNvPr id="7" name="Slide Number Placeholder 6"/>
           <p:cNvSpPr>
             <a:spLocks noGrp="1"/>
           </p:cNvSpPr>
@@ -1469,7 +1497,7 @@
     </p:spTree>
     <p:extLst>
       <p:ext uri="{BB962C8B-B14F-4D97-AF65-F5344CB8AC3E}">
-        <p14:creationId xmlns:p14="http://schemas.microsoft.com/office/powerpoint/2010/main" val="1455955433"/>
+        <p14:creationId xmlns:p14="http://schemas.microsoft.com/office/powerpoint/2010/main" val="1304089726"/>
       </p:ext>
     </p:extLst>
   </p:cSld>
@@ -1498,65 +1526,58 @@
       </p:grpSpPr>
       <p:sp>
         <p:nvSpPr>
-          <p:cNvPr id="2" name="Title 1">
-            <a:extLst>
-              <a:ext uri="{FF2B5EF4-FFF2-40B4-BE49-F238E27FC236}">
-                <a16:creationId xmlns:a16="http://schemas.microsoft.com/office/drawing/2014/main" id="{2D62675A-199E-C6E5-1FCF-5591DC848C04}"/>
-              </a:ext>
-            </a:extLst>
-          </p:cNvPr>
+          <p:cNvPr id="10" name="Title 9"/>
           <p:cNvSpPr>
             <a:spLocks noGrp="1"/>
           </p:cNvSpPr>
           <p:nvPr>
             <p:ph type="title"/>
+          </p:nvPr>
+        </p:nvSpPr>
+        <p:spPr/>
+        <p:txBody>
+          <a:bodyPr/>
+          <a:lstStyle/>
+          <a:p>
+            <a:r>
+              <a:rPr lang="en-US"/>
+              <a:t>Click to edit Master title style</a:t>
+            </a:r>
+            <a:endParaRPr lang="en-US" dirty="0"/>
+          </a:p>
+        </p:txBody>
+      </p:sp>
+      <p:sp>
+        <p:nvSpPr>
+          <p:cNvPr id="3" name="Text Placeholder 2"/>
+          <p:cNvSpPr>
+            <a:spLocks noGrp="1"/>
+          </p:cNvSpPr>
+          <p:nvPr>
+            <p:ph type="body" idx="1"/>
           </p:nvPr>
         </p:nvSpPr>
         <p:spPr>
           <a:xfrm>
-            <a:off x="839788" y="365125"/>
-            <a:ext cx="10515600" cy="1325563"/>
+            <a:off x="1261872" y="1713655"/>
+            <a:ext cx="4480560" cy="731520"/>
           </a:xfrm>
         </p:spPr>
         <p:txBody>
-          <a:bodyPr/>
-          <a:lstStyle/>
-          <a:p>
-            <a:r>
-              <a:rPr lang="en-US"/>
-              <a:t>Click to edit Master title style</a:t>
-            </a:r>
-          </a:p>
-        </p:txBody>
-      </p:sp>
-      <p:sp>
-        <p:nvSpPr>
-          <p:cNvPr id="3" name="Text Placeholder 2">
-            <a:extLst>
-              <a:ext uri="{FF2B5EF4-FFF2-40B4-BE49-F238E27FC236}">
-                <a16:creationId xmlns:a16="http://schemas.microsoft.com/office/drawing/2014/main" id="{AECC717B-1510-83C1-CBDD-EE98F8D39E51}"/>
-              </a:ext>
-            </a:extLst>
-          </p:cNvPr>
-          <p:cNvSpPr>
-            <a:spLocks noGrp="1"/>
-          </p:cNvSpPr>
-          <p:nvPr>
-            <p:ph type="body" idx="1"/>
-          </p:nvPr>
-        </p:nvSpPr>
-        <p:spPr>
-          <a:xfrm>
-            <a:off x="839788" y="1681163"/>
-            <a:ext cx="5157787" cy="823912"/>
-          </a:xfrm>
-        </p:spPr>
-        <p:txBody>
-          <a:bodyPr anchor="b"/>
+          <a:bodyPr anchor="b">
+            <a:normAutofit/>
+          </a:bodyPr>
           <a:lstStyle>
             <a:lvl1pPr marL="0" indent="0">
-              <a:buNone/>
-              <a:defRPr sz="2400" b="1"/>
+              <a:spcBef>
+                <a:spcPts val="0"/>
+              </a:spcBef>
+              <a:buNone/>
+              <a:defRPr sz="2000" b="0">
+                <a:solidFill>
+                  <a:schemeClr val="tx2"/>
+                </a:solidFill>
+              </a:defRPr>
             </a:lvl1pPr>
             <a:lvl2pPr marL="457200" indent="0">
               <a:buNone/>
@@ -1602,13 +1623,7 @@
       </p:sp>
       <p:sp>
         <p:nvSpPr>
-          <p:cNvPr id="4" name="Content Placeholder 3">
-            <a:extLst>
-              <a:ext uri="{FF2B5EF4-FFF2-40B4-BE49-F238E27FC236}">
-                <a16:creationId xmlns:a16="http://schemas.microsoft.com/office/drawing/2014/main" id="{A02978AF-042E-FC94-51EE-9C064111694A}"/>
-              </a:ext>
-            </a:extLst>
-          </p:cNvPr>
+          <p:cNvPr id="4" name="Content Placeholder 3"/>
           <p:cNvSpPr>
             <a:spLocks noGrp="1"/>
           </p:cNvSpPr>
@@ -1618,13 +1633,41 @@
         </p:nvSpPr>
         <p:spPr>
           <a:xfrm>
-            <a:off x="839788" y="2505075"/>
-            <a:ext cx="5157787" cy="3684588"/>
+            <a:off x="1261872" y="2507550"/>
+            <a:ext cx="4480560" cy="3664650"/>
           </a:xfrm>
         </p:spPr>
         <p:txBody>
           <a:bodyPr/>
-          <a:lstStyle/>
+          <a:lstStyle>
+            <a:lvl1pPr>
+              <a:defRPr sz="1800"/>
+            </a:lvl1pPr>
+            <a:lvl2pPr>
+              <a:defRPr sz="1600"/>
+            </a:lvl2pPr>
+            <a:lvl3pPr>
+              <a:defRPr sz="1400"/>
+            </a:lvl3pPr>
+            <a:lvl4pPr>
+              <a:defRPr sz="1400"/>
+            </a:lvl4pPr>
+            <a:lvl5pPr>
+              <a:defRPr sz="1400"/>
+            </a:lvl5pPr>
+            <a:lvl6pPr>
+              <a:defRPr sz="1400"/>
+            </a:lvl6pPr>
+            <a:lvl7pPr>
+              <a:defRPr sz="1400"/>
+            </a:lvl7pPr>
+            <a:lvl8pPr>
+              <a:defRPr sz="1400"/>
+            </a:lvl8pPr>
+            <a:lvl9pPr>
+              <a:defRPr sz="1400"/>
+            </a:lvl9pPr>
+          </a:lstStyle>
           <a:p>
             <a:pPr lvl="0"/>
             <a:r>
@@ -1659,18 +1702,13 @@
               <a:rPr lang="en-US"/>
               <a:t>Fifth level</a:t>
             </a:r>
-          </a:p>
-        </p:txBody>
-      </p:sp>
-      <p:sp>
-        <p:nvSpPr>
-          <p:cNvPr id="5" name="Text Placeholder 4">
-            <a:extLst>
-              <a:ext uri="{FF2B5EF4-FFF2-40B4-BE49-F238E27FC236}">
-                <a16:creationId xmlns:a16="http://schemas.microsoft.com/office/drawing/2014/main" id="{A3722817-A328-79E9-2CBC-776530768650}"/>
-              </a:ext>
-            </a:extLst>
-          </p:cNvPr>
+            <a:endParaRPr lang="en-US" dirty="0"/>
+          </a:p>
+        </p:txBody>
+      </p:sp>
+      <p:sp>
+        <p:nvSpPr>
+          <p:cNvPr id="5" name="Text Placeholder 4"/>
           <p:cNvSpPr>
             <a:spLocks noGrp="1"/>
           </p:cNvSpPr>
@@ -1680,16 +1718,31 @@
         </p:nvSpPr>
         <p:spPr>
           <a:xfrm>
-            <a:off x="6172200" y="1681163"/>
-            <a:ext cx="5183188" cy="823912"/>
+            <a:off x="6126480" y="1713655"/>
+            <a:ext cx="4480560" cy="731520"/>
           </a:xfrm>
         </p:spPr>
         <p:txBody>
-          <a:bodyPr anchor="b"/>
+          <a:bodyPr anchor="b">
+            <a:normAutofit/>
+          </a:bodyPr>
           <a:lstStyle>
             <a:lvl1pPr marL="0" indent="0">
-              <a:buNone/>
-              <a:defRPr sz="2400" b="1"/>
+              <a:lnSpc>
+                <a:spcPct val="95000"/>
+              </a:lnSpc>
+              <a:spcBef>
+                <a:spcPts val="0"/>
+              </a:spcBef>
+              <a:buNone/>
+              <a:defRPr lang="en-US" sz="2000" b="0" kern="1200" dirty="0">
+                <a:solidFill>
+                  <a:schemeClr val="tx2"/>
+                </a:solidFill>
+                <a:latin typeface="+mn-lt"/>
+                <a:ea typeface="+mn-ea"/>
+                <a:cs typeface="+mn-cs"/>
+              </a:defRPr>
             </a:lvl1pPr>
             <a:lvl2pPr marL="457200" indent="0">
               <a:buNone/>
@@ -1725,7 +1778,16 @@
             </a:lvl9pPr>
           </a:lstStyle>
           <a:p>
-            <a:pPr lvl="0"/>
+            <a:pPr marL="0" lvl="0" indent="0" algn="l" defTabSz="914400" rtl="0" eaLnBrk="1" latinLnBrk="0" hangingPunct="1">
+              <a:lnSpc>
+                <a:spcPct val="90000"/>
+              </a:lnSpc>
+              <a:spcBef>
+                <a:spcPts val="2000"/>
+              </a:spcBef>
+              <a:buFontTx/>
+              <a:buNone/>
+            </a:pPr>
             <a:r>
               <a:rPr lang="en-US"/>
               <a:t>Click to edit Master text styles</a:t>
@@ -1735,13 +1797,7 @@
       </p:sp>
       <p:sp>
         <p:nvSpPr>
-          <p:cNvPr id="6" name="Content Placeholder 5">
-            <a:extLst>
-              <a:ext uri="{FF2B5EF4-FFF2-40B4-BE49-F238E27FC236}">
-                <a16:creationId xmlns:a16="http://schemas.microsoft.com/office/drawing/2014/main" id="{E21B753E-105C-A495-64CC-896DAC83B22E}"/>
-              </a:ext>
-            </a:extLst>
-          </p:cNvPr>
+          <p:cNvPr id="6" name="Content Placeholder 5"/>
           <p:cNvSpPr>
             <a:spLocks noGrp="1"/>
           </p:cNvSpPr>
@@ -1751,13 +1807,41 @@
         </p:nvSpPr>
         <p:spPr>
           <a:xfrm>
-            <a:off x="6172200" y="2505075"/>
-            <a:ext cx="5183188" cy="3684588"/>
+            <a:off x="6126480" y="2507550"/>
+            <a:ext cx="4480560" cy="3664650"/>
           </a:xfrm>
         </p:spPr>
         <p:txBody>
           <a:bodyPr/>
-          <a:lstStyle/>
+          <a:lstStyle>
+            <a:lvl1pPr>
+              <a:defRPr sz="1800"/>
+            </a:lvl1pPr>
+            <a:lvl2pPr>
+              <a:defRPr sz="1600"/>
+            </a:lvl2pPr>
+            <a:lvl3pPr>
+              <a:defRPr sz="1400"/>
+            </a:lvl3pPr>
+            <a:lvl4pPr>
+              <a:defRPr sz="1400"/>
+            </a:lvl4pPr>
+            <a:lvl5pPr>
+              <a:defRPr sz="1400"/>
+            </a:lvl5pPr>
+            <a:lvl6pPr>
+              <a:defRPr sz="1400"/>
+            </a:lvl6pPr>
+            <a:lvl7pPr>
+              <a:defRPr sz="1400"/>
+            </a:lvl7pPr>
+            <a:lvl8pPr>
+              <a:defRPr sz="1400"/>
+            </a:lvl8pPr>
+            <a:lvl9pPr>
+              <a:defRPr sz="1400"/>
+            </a:lvl9pPr>
+          </a:lstStyle>
           <a:p>
             <a:pPr lvl="0"/>
             <a:r>
@@ -1792,18 +1876,13 @@
               <a:rPr lang="en-US"/>
               <a:t>Fifth level</a:t>
             </a:r>
-          </a:p>
-        </p:txBody>
-      </p:sp>
-      <p:sp>
-        <p:nvSpPr>
-          <p:cNvPr id="7" name="Date Placeholder 6">
-            <a:extLst>
-              <a:ext uri="{FF2B5EF4-FFF2-40B4-BE49-F238E27FC236}">
-                <a16:creationId xmlns:a16="http://schemas.microsoft.com/office/drawing/2014/main" id="{0972C4CA-E1E1-B269-46DF-940A2547D423}"/>
-              </a:ext>
-            </a:extLst>
-          </p:cNvPr>
+            <a:endParaRPr lang="en-US" dirty="0"/>
+          </a:p>
+        </p:txBody>
+      </p:sp>
+      <p:sp>
+        <p:nvSpPr>
+          <p:cNvPr id="7" name="Date Placeholder 6"/>
           <p:cNvSpPr>
             <a:spLocks noGrp="1"/>
           </p:cNvSpPr>
@@ -1818,7 +1897,7 @@
           <a:p>
             <a:fld id="{DC95CDE6-62DB-428F-99F2-652E4EED0446}" type="datetimeFigureOut">
               <a:rPr lang="en-US" smtClean="0"/>
-              <a:t>6/11/2025</a:t>
+              <a:t>6/12/2025</a:t>
             </a:fld>
             <a:endParaRPr lang="en-US"/>
           </a:p>
@@ -1826,13 +1905,7 @@
       </p:sp>
       <p:sp>
         <p:nvSpPr>
-          <p:cNvPr id="8" name="Footer Placeholder 7">
-            <a:extLst>
-              <a:ext uri="{FF2B5EF4-FFF2-40B4-BE49-F238E27FC236}">
-                <a16:creationId xmlns:a16="http://schemas.microsoft.com/office/drawing/2014/main" id="{A7DD656D-4199-1556-A4D5-4C007A72916A}"/>
-              </a:ext>
-            </a:extLst>
-          </p:cNvPr>
+          <p:cNvPr id="8" name="Footer Placeholder 7"/>
           <p:cNvSpPr>
             <a:spLocks noGrp="1"/>
           </p:cNvSpPr>
@@ -1851,13 +1924,7 @@
       </p:sp>
       <p:sp>
         <p:nvSpPr>
-          <p:cNvPr id="9" name="Slide Number Placeholder 8">
-            <a:extLst>
-              <a:ext uri="{FF2B5EF4-FFF2-40B4-BE49-F238E27FC236}">
-                <a16:creationId xmlns:a16="http://schemas.microsoft.com/office/drawing/2014/main" id="{6BC55077-B165-1701-6BAE-D727CB68B556}"/>
-              </a:ext>
-            </a:extLst>
-          </p:cNvPr>
+          <p:cNvPr id="9" name="Slide Number Placeholder 8"/>
           <p:cNvSpPr>
             <a:spLocks noGrp="1"/>
           </p:cNvSpPr>
@@ -1881,7 +1948,7 @@
     </p:spTree>
     <p:extLst>
       <p:ext uri="{BB962C8B-B14F-4D97-AF65-F5344CB8AC3E}">
-        <p14:creationId xmlns:p14="http://schemas.microsoft.com/office/powerpoint/2010/main" val="145927476"/>
+        <p14:creationId xmlns:p14="http://schemas.microsoft.com/office/powerpoint/2010/main" val="1169433395"/>
       </p:ext>
     </p:extLst>
   </p:cSld>
@@ -1910,13 +1977,7 @@
       </p:grpSpPr>
       <p:sp>
         <p:nvSpPr>
-          <p:cNvPr id="2" name="Title 1">
-            <a:extLst>
-              <a:ext uri="{FF2B5EF4-FFF2-40B4-BE49-F238E27FC236}">
-                <a16:creationId xmlns:a16="http://schemas.microsoft.com/office/drawing/2014/main" id="{3CFEE940-A177-FD89-EE47-D80777222876}"/>
-              </a:ext>
-            </a:extLst>
-          </p:cNvPr>
+          <p:cNvPr id="6" name="Title 5"/>
           <p:cNvSpPr>
             <a:spLocks noGrp="1"/>
           </p:cNvSpPr>
@@ -1933,18 +1994,13 @@
               <a:rPr lang="en-US"/>
               <a:t>Click to edit Master title style</a:t>
             </a:r>
-          </a:p>
-        </p:txBody>
-      </p:sp>
-      <p:sp>
-        <p:nvSpPr>
-          <p:cNvPr id="3" name="Date Placeholder 2">
-            <a:extLst>
-              <a:ext uri="{FF2B5EF4-FFF2-40B4-BE49-F238E27FC236}">
-                <a16:creationId xmlns:a16="http://schemas.microsoft.com/office/drawing/2014/main" id="{23B0C2A4-2211-66BC-E31F-438654E0302A}"/>
-              </a:ext>
-            </a:extLst>
-          </p:cNvPr>
+            <a:endParaRPr lang="en-US" dirty="0"/>
+          </a:p>
+        </p:txBody>
+      </p:sp>
+      <p:sp>
+        <p:nvSpPr>
+          <p:cNvPr id="3" name="Date Placeholder 2"/>
           <p:cNvSpPr>
             <a:spLocks noGrp="1"/>
           </p:cNvSpPr>
@@ -1959,7 +2015,7 @@
           <a:p>
             <a:fld id="{DC95CDE6-62DB-428F-99F2-652E4EED0446}" type="datetimeFigureOut">
               <a:rPr lang="en-US" smtClean="0"/>
-              <a:t>6/11/2025</a:t>
+              <a:t>6/12/2025</a:t>
             </a:fld>
             <a:endParaRPr lang="en-US"/>
           </a:p>
@@ -1967,13 +2023,7 @@
       </p:sp>
       <p:sp>
         <p:nvSpPr>
-          <p:cNvPr id="4" name="Footer Placeholder 3">
-            <a:extLst>
-              <a:ext uri="{FF2B5EF4-FFF2-40B4-BE49-F238E27FC236}">
-                <a16:creationId xmlns:a16="http://schemas.microsoft.com/office/drawing/2014/main" id="{80EA4CF9-4B5E-83A4-95A9-921BA9793A6D}"/>
-              </a:ext>
-            </a:extLst>
-          </p:cNvPr>
+          <p:cNvPr id="4" name="Footer Placeholder 3"/>
           <p:cNvSpPr>
             <a:spLocks noGrp="1"/>
           </p:cNvSpPr>
@@ -1992,13 +2042,7 @@
       </p:sp>
       <p:sp>
         <p:nvSpPr>
-          <p:cNvPr id="5" name="Slide Number Placeholder 4">
-            <a:extLst>
-              <a:ext uri="{FF2B5EF4-FFF2-40B4-BE49-F238E27FC236}">
-                <a16:creationId xmlns:a16="http://schemas.microsoft.com/office/drawing/2014/main" id="{982BE664-4B07-545E-8B1B-42DBB213F8DD}"/>
-              </a:ext>
-            </a:extLst>
-          </p:cNvPr>
+          <p:cNvPr id="5" name="Slide Number Placeholder 4"/>
           <p:cNvSpPr>
             <a:spLocks noGrp="1"/>
           </p:cNvSpPr>
@@ -2022,7 +2066,7 @@
     </p:spTree>
     <p:extLst>
       <p:ext uri="{BB962C8B-B14F-4D97-AF65-F5344CB8AC3E}">
-        <p14:creationId xmlns:p14="http://schemas.microsoft.com/office/powerpoint/2010/main" val="271272001"/>
+        <p14:creationId xmlns:p14="http://schemas.microsoft.com/office/powerpoint/2010/main" val="1785421090"/>
       </p:ext>
     </p:extLst>
   </p:cSld>
@@ -2051,13 +2095,7 @@
       </p:grpSpPr>
       <p:sp>
         <p:nvSpPr>
-          <p:cNvPr id="2" name="Date Placeholder 1">
-            <a:extLst>
-              <a:ext uri="{FF2B5EF4-FFF2-40B4-BE49-F238E27FC236}">
-                <a16:creationId xmlns:a16="http://schemas.microsoft.com/office/drawing/2014/main" id="{E7BAE297-2688-25CA-7AD2-86BA56453F9B}"/>
-              </a:ext>
-            </a:extLst>
-          </p:cNvPr>
+          <p:cNvPr id="2" name="Date Placeholder 1"/>
           <p:cNvSpPr>
             <a:spLocks noGrp="1"/>
           </p:cNvSpPr>
@@ -2072,7 +2110,7 @@
           <a:p>
             <a:fld id="{DC95CDE6-62DB-428F-99F2-652E4EED0446}" type="datetimeFigureOut">
               <a:rPr lang="en-US" smtClean="0"/>
-              <a:t>6/11/2025</a:t>
+              <a:t>6/12/2025</a:t>
             </a:fld>
             <a:endParaRPr lang="en-US"/>
           </a:p>
@@ -2080,13 +2118,7 @@
       </p:sp>
       <p:sp>
         <p:nvSpPr>
-          <p:cNvPr id="3" name="Footer Placeholder 2">
-            <a:extLst>
-              <a:ext uri="{FF2B5EF4-FFF2-40B4-BE49-F238E27FC236}">
-                <a16:creationId xmlns:a16="http://schemas.microsoft.com/office/drawing/2014/main" id="{119AF723-B225-9568-02F5-C7E804A422CD}"/>
-              </a:ext>
-            </a:extLst>
-          </p:cNvPr>
+          <p:cNvPr id="3" name="Footer Placeholder 2"/>
           <p:cNvSpPr>
             <a:spLocks noGrp="1"/>
           </p:cNvSpPr>
@@ -2105,13 +2137,7 @@
       </p:sp>
       <p:sp>
         <p:nvSpPr>
-          <p:cNvPr id="4" name="Slide Number Placeholder 3">
-            <a:extLst>
-              <a:ext uri="{FF2B5EF4-FFF2-40B4-BE49-F238E27FC236}">
-                <a16:creationId xmlns:a16="http://schemas.microsoft.com/office/drawing/2014/main" id="{C7D287AC-9777-CF3A-0256-E2123FA0CC75}"/>
-              </a:ext>
-            </a:extLst>
-          </p:cNvPr>
+          <p:cNvPr id="4" name="Slide Number Placeholder 3"/>
           <p:cNvSpPr>
             <a:spLocks noGrp="1"/>
           </p:cNvSpPr>
@@ -2135,7 +2161,7 @@
     </p:spTree>
     <p:extLst>
       <p:ext uri="{BB962C8B-B14F-4D97-AF65-F5344CB8AC3E}">
-        <p14:creationId xmlns:p14="http://schemas.microsoft.com/office/powerpoint/2010/main" val="2395471273"/>
+        <p14:creationId xmlns:p14="http://schemas.microsoft.com/office/powerpoint/2010/main" val="1784503453"/>
       </p:ext>
     </p:extLst>
   </p:cSld>
@@ -2164,13 +2190,7 @@
       </p:grpSpPr>
       <p:sp>
         <p:nvSpPr>
-          <p:cNvPr id="2" name="Title 1">
-            <a:extLst>
-              <a:ext uri="{FF2B5EF4-FFF2-40B4-BE49-F238E27FC236}">
-                <a16:creationId xmlns:a16="http://schemas.microsoft.com/office/drawing/2014/main" id="{026908E1-80D9-C902-7C26-CFD39FF058B7}"/>
-              </a:ext>
-            </a:extLst>
-          </p:cNvPr>
+          <p:cNvPr id="2" name="Title 1"/>
           <p:cNvSpPr>
             <a:spLocks noGrp="1"/>
           </p:cNvSpPr>
@@ -2180,15 +2200,17 @@
         </p:nvSpPr>
         <p:spPr>
           <a:xfrm>
-            <a:off x="839788" y="457200"/>
-            <a:ext cx="3932237" cy="1600200"/>
+            <a:off x="841248" y="457200"/>
+            <a:ext cx="3200400" cy="1600197"/>
           </a:xfrm>
         </p:spPr>
         <p:txBody>
-          <a:bodyPr anchor="b"/>
+          <a:bodyPr anchor="b">
+            <a:normAutofit/>
+          </a:bodyPr>
           <a:lstStyle>
             <a:lvl1pPr>
-              <a:defRPr sz="3200"/>
+              <a:defRPr sz="3200" b="0" baseline="0"/>
             </a:lvl1pPr>
           </a:lstStyle>
           <a:p>
@@ -2196,18 +2218,13 @@
               <a:rPr lang="en-US"/>
               <a:t>Click to edit Master title style</a:t>
             </a:r>
-          </a:p>
-        </p:txBody>
-      </p:sp>
-      <p:sp>
-        <p:nvSpPr>
-          <p:cNvPr id="3" name="Content Placeholder 2">
-            <a:extLst>
-              <a:ext uri="{FF2B5EF4-FFF2-40B4-BE49-F238E27FC236}">
-                <a16:creationId xmlns:a16="http://schemas.microsoft.com/office/drawing/2014/main" id="{F3074AE6-71F0-C983-33CB-13BDDC1D54A2}"/>
-              </a:ext>
-            </a:extLst>
-          </p:cNvPr>
+            <a:endParaRPr lang="en-US" dirty="0"/>
+          </a:p>
+        </p:txBody>
+      </p:sp>
+      <p:sp>
+        <p:nvSpPr>
+          <p:cNvPr id="3" name="Content Placeholder 2"/>
           <p:cNvSpPr>
             <a:spLocks noGrp="1"/>
           </p:cNvSpPr>
@@ -2217,39 +2234,39 @@
         </p:nvSpPr>
         <p:spPr>
           <a:xfrm>
-            <a:off x="5183188" y="987425"/>
-            <a:ext cx="6172200" cy="4873625"/>
+            <a:off x="4504267" y="685800"/>
+            <a:ext cx="6079066" cy="5486400"/>
           </a:xfrm>
         </p:spPr>
         <p:txBody>
           <a:bodyPr/>
           <a:lstStyle>
             <a:lvl1pPr>
-              <a:defRPr sz="3200"/>
+              <a:defRPr sz="2000"/>
             </a:lvl1pPr>
             <a:lvl2pPr>
-              <a:defRPr sz="2800"/>
+              <a:defRPr sz="1800"/>
             </a:lvl2pPr>
             <a:lvl3pPr>
-              <a:defRPr sz="2400"/>
+              <a:defRPr sz="1600"/>
             </a:lvl3pPr>
             <a:lvl4pPr>
-              <a:defRPr sz="2000"/>
+              <a:defRPr sz="1400"/>
             </a:lvl4pPr>
             <a:lvl5pPr>
-              <a:defRPr sz="2000"/>
+              <a:defRPr sz="1400"/>
             </a:lvl5pPr>
             <a:lvl6pPr>
-              <a:defRPr sz="2000"/>
+              <a:defRPr sz="1400"/>
             </a:lvl6pPr>
             <a:lvl7pPr>
-              <a:defRPr sz="2000"/>
+              <a:defRPr sz="1400"/>
             </a:lvl7pPr>
             <a:lvl8pPr>
-              <a:defRPr sz="2000"/>
+              <a:defRPr sz="1400"/>
             </a:lvl8pPr>
             <a:lvl9pPr>
-              <a:defRPr sz="2000"/>
+              <a:defRPr sz="1400"/>
             </a:lvl9pPr>
           </a:lstStyle>
           <a:p>
@@ -2286,18 +2303,13 @@
               <a:rPr lang="en-US"/>
               <a:t>Fifth level</a:t>
             </a:r>
-          </a:p>
-        </p:txBody>
-      </p:sp>
-      <p:sp>
-        <p:nvSpPr>
-          <p:cNvPr id="4" name="Text Placeholder 3">
-            <a:extLst>
-              <a:ext uri="{FF2B5EF4-FFF2-40B4-BE49-F238E27FC236}">
-                <a16:creationId xmlns:a16="http://schemas.microsoft.com/office/drawing/2014/main" id="{34AD0532-CBC7-9B43-6B1A-F7D1C6884C7D}"/>
-              </a:ext>
-            </a:extLst>
-          </p:cNvPr>
+            <a:endParaRPr lang="en-US" dirty="0"/>
+          </a:p>
+        </p:txBody>
+      </p:sp>
+      <p:sp>
+        <p:nvSpPr>
+          <p:cNvPr id="4" name="Text Placeholder 3"/>
           <p:cNvSpPr>
             <a:spLocks noGrp="1"/>
           </p:cNvSpPr>
@@ -2307,48 +2319,56 @@
         </p:nvSpPr>
         <p:spPr>
           <a:xfrm>
-            <a:off x="839788" y="2057400"/>
-            <a:ext cx="3932237" cy="3811588"/>
+            <a:off x="841248" y="2099734"/>
+            <a:ext cx="3200400" cy="3810001"/>
           </a:xfrm>
         </p:spPr>
         <p:txBody>
-          <a:bodyPr/>
+          <a:bodyPr>
+            <a:normAutofit/>
+          </a:bodyPr>
           <a:lstStyle>
             <a:lvl1pPr marL="0" indent="0">
-              <a:buNone/>
-              <a:defRPr sz="1600"/>
+              <a:lnSpc>
+                <a:spcPct val="114000"/>
+              </a:lnSpc>
+              <a:spcBef>
+                <a:spcPts val="800"/>
+              </a:spcBef>
+              <a:buNone/>
+              <a:defRPr sz="1300"/>
             </a:lvl1pPr>
             <a:lvl2pPr marL="457200" indent="0">
               <a:buNone/>
-              <a:defRPr sz="1400"/>
+              <a:defRPr sz="1200"/>
             </a:lvl2pPr>
             <a:lvl3pPr marL="914400" indent="0">
               <a:buNone/>
-              <a:defRPr sz="1200"/>
+              <a:defRPr sz="1000"/>
             </a:lvl3pPr>
             <a:lvl4pPr marL="1371600" indent="0">
               <a:buNone/>
-              <a:defRPr sz="1000"/>
+              <a:defRPr sz="900"/>
             </a:lvl4pPr>
             <a:lvl5pPr marL="1828800" indent="0">
               <a:buNone/>
-              <a:defRPr sz="1000"/>
+              <a:defRPr sz="900"/>
             </a:lvl5pPr>
             <a:lvl6pPr marL="2286000" indent="0">
               <a:buNone/>
-              <a:defRPr sz="1000"/>
+              <a:defRPr sz="900"/>
             </a:lvl6pPr>
             <a:lvl7pPr marL="2743200" indent="0">
               <a:buNone/>
-              <a:defRPr sz="1000"/>
+              <a:defRPr sz="900"/>
             </a:lvl7pPr>
             <a:lvl8pPr marL="3200400" indent="0">
               <a:buNone/>
-              <a:defRPr sz="1000"/>
+              <a:defRPr sz="900"/>
             </a:lvl8pPr>
             <a:lvl9pPr marL="3657600" indent="0">
               <a:buNone/>
-              <a:defRPr sz="1000"/>
+              <a:defRPr sz="900"/>
             </a:lvl9pPr>
           </a:lstStyle>
           <a:p>
@@ -2362,13 +2382,7 @@
       </p:sp>
       <p:sp>
         <p:nvSpPr>
-          <p:cNvPr id="5" name="Date Placeholder 4">
-            <a:extLst>
-              <a:ext uri="{FF2B5EF4-FFF2-40B4-BE49-F238E27FC236}">
-                <a16:creationId xmlns:a16="http://schemas.microsoft.com/office/drawing/2014/main" id="{4F30E355-E84F-D4C7-B8AD-F8AD114CB76E}"/>
-              </a:ext>
-            </a:extLst>
-          </p:cNvPr>
+          <p:cNvPr id="5" name="Date Placeholder 4"/>
           <p:cNvSpPr>
             <a:spLocks noGrp="1"/>
           </p:cNvSpPr>
@@ -2383,7 +2397,7 @@
           <a:p>
             <a:fld id="{DC95CDE6-62DB-428F-99F2-652E4EED0446}" type="datetimeFigureOut">
               <a:rPr lang="en-US" smtClean="0"/>
-              <a:t>6/11/2025</a:t>
+              <a:t>6/12/2025</a:t>
             </a:fld>
             <a:endParaRPr lang="en-US"/>
           </a:p>
@@ -2391,13 +2405,7 @@
       </p:sp>
       <p:sp>
         <p:nvSpPr>
-          <p:cNvPr id="6" name="Footer Placeholder 5">
-            <a:extLst>
-              <a:ext uri="{FF2B5EF4-FFF2-40B4-BE49-F238E27FC236}">
-                <a16:creationId xmlns:a16="http://schemas.microsoft.com/office/drawing/2014/main" id="{8A8377EA-63DE-B346-8C23-48F6E845C70D}"/>
-              </a:ext>
-            </a:extLst>
-          </p:cNvPr>
+          <p:cNvPr id="6" name="Footer Placeholder 5"/>
           <p:cNvSpPr>
             <a:spLocks noGrp="1"/>
           </p:cNvSpPr>
@@ -2416,13 +2424,7 @@
       </p:sp>
       <p:sp>
         <p:nvSpPr>
-          <p:cNvPr id="7" name="Slide Number Placeholder 6">
-            <a:extLst>
-              <a:ext uri="{FF2B5EF4-FFF2-40B4-BE49-F238E27FC236}">
-                <a16:creationId xmlns:a16="http://schemas.microsoft.com/office/drawing/2014/main" id="{82517897-E4E0-5684-8922-E6616032AE95}"/>
-              </a:ext>
-            </a:extLst>
-          </p:cNvPr>
+          <p:cNvPr id="7" name="Slide Number Placeholder 6"/>
           <p:cNvSpPr>
             <a:spLocks noGrp="1"/>
           </p:cNvSpPr>
@@ -2446,7 +2448,7 @@
     </p:spTree>
     <p:extLst>
       <p:ext uri="{BB962C8B-B14F-4D97-AF65-F5344CB8AC3E}">
-        <p14:creationId xmlns:p14="http://schemas.microsoft.com/office/powerpoint/2010/main" val="2172571740"/>
+        <p14:creationId xmlns:p14="http://schemas.microsoft.com/office/powerpoint/2010/main" val="3813825099"/>
       </p:ext>
     </p:extLst>
   </p:cSld>
@@ -2475,31 +2477,69 @@
       </p:grpSpPr>
       <p:sp>
         <p:nvSpPr>
-          <p:cNvPr id="2" name="Title 1">
-            <a:extLst>
-              <a:ext uri="{FF2B5EF4-FFF2-40B4-BE49-F238E27FC236}">
-                <a16:creationId xmlns:a16="http://schemas.microsoft.com/office/drawing/2014/main" id="{1C707E97-0114-2ACB-5C98-438828F69022}"/>
-              </a:ext>
-            </a:extLst>
-          </p:cNvPr>
-          <p:cNvSpPr>
-            <a:spLocks noGrp="1"/>
-          </p:cNvSpPr>
-          <p:nvPr>
-            <p:ph type="title"/>
-          </p:nvPr>
+          <p:cNvPr id="8" name="Rectangle 7"/>
+          <p:cNvSpPr/>
+          <p:nvPr/>
         </p:nvSpPr>
         <p:spPr>
           <a:xfrm>
-            <a:off x="839788" y="457200"/>
-            <a:ext cx="3932237" cy="1600200"/>
+            <a:off x="0" y="5105400"/>
+            <a:ext cx="11292840" cy="1752600"/>
+          </a:xfrm>
+          <a:prstGeom prst="rect">
+            <a:avLst/>
+          </a:prstGeom>
+          <a:solidFill>
+            <a:srgbClr val="000000"/>
+          </a:solidFill>
+          <a:ln>
+            <a:noFill/>
+          </a:ln>
+        </p:spPr>
+        <p:style>
+          <a:lnRef idx="2">
+            <a:schemeClr val="accent1">
+              <a:shade val="50000"/>
+            </a:schemeClr>
+          </a:lnRef>
+          <a:fillRef idx="1">
+            <a:schemeClr val="accent1"/>
+          </a:fillRef>
+          <a:effectRef idx="0">
+            <a:schemeClr val="accent1"/>
+          </a:effectRef>
+          <a:fontRef idx="minor">
+            <a:schemeClr val="lt1"/>
+          </a:fontRef>
+        </p:style>
+      </p:sp>
+      <p:sp>
+        <p:nvSpPr>
+          <p:cNvPr id="2" name="Title 1"/>
+          <p:cNvSpPr>
+            <a:spLocks noGrp="1"/>
+          </p:cNvSpPr>
+          <p:nvPr>
+            <p:ph type="title"/>
+          </p:nvPr>
+        </p:nvSpPr>
+        <p:spPr>
+          <a:xfrm>
+            <a:off x="914400" y="5257800"/>
+            <a:ext cx="9982200" cy="914400"/>
           </a:xfrm>
         </p:spPr>
         <p:txBody>
-          <a:bodyPr anchor="b"/>
+          <a:bodyPr anchor="b">
+            <a:normAutofit/>
+          </a:bodyPr>
           <a:lstStyle>
             <a:lvl1pPr>
-              <a:defRPr sz="3200"/>
+              <a:defRPr sz="2800" b="0">
+                <a:solidFill>
+                  <a:schemeClr val="bg1"/>
+                </a:solidFill>
+              </a:defRPr>
             </a:lvl1pPr>
           </a:lstStyle>
           <a:p>
@@ -2507,20 +2547,15 @@
               <a:rPr lang="en-US"/>
               <a:t>Click to edit Master title style</a:t>
             </a:r>
-          </a:p>
-        </p:txBody>
-      </p:sp>
-      <p:sp>
-        <p:nvSpPr>
-          <p:cNvPr id="3" name="Picture Placeholder 2">
-            <a:extLst>
-              <a:ext uri="{FF2B5EF4-FFF2-40B4-BE49-F238E27FC236}">
-                <a16:creationId xmlns:a16="http://schemas.microsoft.com/office/drawing/2014/main" id="{EAD00BD8-08C4-0DE7-2510-5D5E1E9CF649}"/>
-              </a:ext>
-            </a:extLst>
-          </p:cNvPr>
-          <p:cNvSpPr>
-            <a:spLocks noGrp="1"/>
+            <a:endParaRPr lang="en-US" dirty="0"/>
+          </a:p>
+        </p:txBody>
+      </p:sp>
+      <p:sp>
+        <p:nvSpPr>
+          <p:cNvPr id="3" name="Picture Placeholder 2"/>
+          <p:cNvSpPr>
+            <a:spLocks noGrp="1" noChangeAspect="1"/>
           </p:cNvSpPr>
           <p:nvPr>
             <p:ph type="pic" idx="1"/>
@@ -2528,16 +2563,23 @@
         </p:nvSpPr>
         <p:spPr>
           <a:xfrm>
-            <a:off x="5183188" y="987425"/>
-            <a:ext cx="6172200" cy="4873625"/>
+            <a:off x="0" y="0"/>
+            <a:ext cx="11292840" cy="5128923"/>
           </a:xfrm>
+          <a:solidFill>
+            <a:schemeClr val="accent1"/>
+          </a:solidFill>
         </p:spPr>
         <p:txBody>
-          <a:bodyPr/>
+          <a:bodyPr anchor="t"/>
           <a:lstStyle>
             <a:lvl1pPr marL="0" indent="0">
               <a:buNone/>
-              <a:defRPr sz="3200"/>
+              <a:defRPr sz="3200">
+                <a:solidFill>
+                  <a:schemeClr val="bg1"/>
+                </a:solidFill>
+              </a:defRPr>
             </a:lvl1pPr>
             <a:lvl2pPr marL="457200" indent="0">
               <a:buNone/>
@@ -2573,19 +2615,17 @@
             </a:lvl9pPr>
           </a:lstStyle>
           <a:p>
-            <a:endParaRPr lang="en-US"/>
-          </a:p>
-        </p:txBody>
-      </p:sp>
-      <p:sp>
-        <p:nvSpPr>
-          <p:cNvPr id="4" name="Text Placeholder 3">
-            <a:extLst>
-              <a:ext uri="{FF2B5EF4-FFF2-40B4-BE49-F238E27FC236}">
-                <a16:creationId xmlns:a16="http://schemas.microsoft.com/office/drawing/2014/main" id="{CFFCEDBA-7967-D4FE-647B-94FD940BBAC2}"/>
-              </a:ext>
-            </a:extLst>
-          </p:cNvPr>
+            <a:r>
+              <a:rPr lang="en-US"/>
+              <a:t>Click icon to add picture</a:t>
+            </a:r>
+            <a:endParaRPr lang="en-US" dirty="0"/>
+          </a:p>
+        </p:txBody>
+      </p:sp>
+      <p:sp>
+        <p:nvSpPr>
+          <p:cNvPr id="4" name="Text Placeholder 3"/>
           <p:cNvSpPr>
             <a:spLocks noGrp="1"/>
           </p:cNvSpPr>
@@ -2595,48 +2635,62 @@
         </p:nvSpPr>
         <p:spPr>
           <a:xfrm>
-            <a:off x="839788" y="2057400"/>
-            <a:ext cx="3932237" cy="3811588"/>
+            <a:off x="914400" y="6108589"/>
+            <a:ext cx="9982200" cy="597011"/>
           </a:xfrm>
         </p:spPr>
         <p:txBody>
-          <a:bodyPr/>
+          <a:bodyPr>
+            <a:normAutofit/>
+          </a:bodyPr>
           <a:lstStyle>
             <a:lvl1pPr marL="0" indent="0">
-              <a:buNone/>
-              <a:defRPr sz="1600"/>
+              <a:lnSpc>
+                <a:spcPct val="100000"/>
+              </a:lnSpc>
+              <a:spcBef>
+                <a:spcPts val="800"/>
+              </a:spcBef>
+              <a:buNone/>
+              <a:defRPr sz="1300">
+                <a:solidFill>
+                  <a:schemeClr val="bg1">
+                    <a:lumMod val="85000"/>
+                  </a:schemeClr>
+                </a:solidFill>
+              </a:defRPr>
             </a:lvl1pPr>
             <a:lvl2pPr marL="457200" indent="0">
               <a:buNone/>
-              <a:defRPr sz="1400"/>
+              <a:defRPr sz="1200"/>
             </a:lvl2pPr>
             <a:lvl3pPr marL="914400" indent="0">
               <a:buNone/>
-              <a:defRPr sz="1200"/>
+              <a:defRPr sz="1000"/>
             </a:lvl3pPr>
             <a:lvl4pPr marL="1371600" indent="0">
               <a:buNone/>
-              <a:defRPr sz="1000"/>
+              <a:defRPr sz="900"/>
             </a:lvl4pPr>
             <a:lvl5pPr marL="1828800" indent="0">
               <a:buNone/>
-              <a:defRPr sz="1000"/>
+              <a:defRPr sz="900"/>
             </a:lvl5pPr>
             <a:lvl6pPr marL="2286000" indent="0">
               <a:buNone/>
-              <a:defRPr sz="1000"/>
+              <a:defRPr sz="900"/>
             </a:lvl6pPr>
             <a:lvl7pPr marL="2743200" indent="0">
               <a:buNone/>
-              <a:defRPr sz="1000"/>
+              <a:defRPr sz="900"/>
             </a:lvl7pPr>
             <a:lvl8pPr marL="3200400" indent="0">
               <a:buNone/>
-              <a:defRPr sz="1000"/>
+              <a:defRPr sz="900"/>
             </a:lvl8pPr>
             <a:lvl9pPr marL="3657600" indent="0">
               <a:buNone/>
-              <a:defRPr sz="1000"/>
+              <a:defRPr sz="900"/>
             </a:lvl9pPr>
           </a:lstStyle>
           <a:p>
@@ -2650,13 +2704,7 @@
       </p:sp>
       <p:sp>
         <p:nvSpPr>
-          <p:cNvPr id="5" name="Date Placeholder 4">
-            <a:extLst>
-              <a:ext uri="{FF2B5EF4-FFF2-40B4-BE49-F238E27FC236}">
-                <a16:creationId xmlns:a16="http://schemas.microsoft.com/office/drawing/2014/main" id="{F7810D34-62BA-5351-1CEA-06C1BE3896B6}"/>
-              </a:ext>
-            </a:extLst>
-          </p:cNvPr>
+          <p:cNvPr id="5" name="Date Placeholder 4"/>
           <p:cNvSpPr>
             <a:spLocks noGrp="1"/>
           </p:cNvSpPr>
@@ -2671,7 +2719,7 @@
           <a:p>
             <a:fld id="{DC95CDE6-62DB-428F-99F2-652E4EED0446}" type="datetimeFigureOut">
               <a:rPr lang="en-US" smtClean="0"/>
-              <a:t>6/11/2025</a:t>
+              <a:t>6/12/2025</a:t>
             </a:fld>
             <a:endParaRPr lang="en-US"/>
           </a:p>
@@ -2679,13 +2727,7 @@
       </p:sp>
       <p:sp>
         <p:nvSpPr>
-          <p:cNvPr id="6" name="Footer Placeholder 5">
-            <a:extLst>
-              <a:ext uri="{FF2B5EF4-FFF2-40B4-BE49-F238E27FC236}">
-                <a16:creationId xmlns:a16="http://schemas.microsoft.com/office/drawing/2014/main" id="{5A32E9F8-64DE-AAA4-8889-0FD7F5179101}"/>
-              </a:ext>
-            </a:extLst>
-          </p:cNvPr>
+          <p:cNvPr id="6" name="Footer Placeholder 5"/>
           <p:cNvSpPr>
             <a:spLocks noGrp="1"/>
           </p:cNvSpPr>
@@ -2704,13 +2746,7 @@
       </p:sp>
       <p:sp>
         <p:nvSpPr>
-          <p:cNvPr id="7" name="Slide Number Placeholder 6">
-            <a:extLst>
-              <a:ext uri="{FF2B5EF4-FFF2-40B4-BE49-F238E27FC236}">
-                <a16:creationId xmlns:a16="http://schemas.microsoft.com/office/drawing/2014/main" id="{6752BC76-810F-060A-7DC1-31A1091B020E}"/>
-              </a:ext>
-            </a:extLst>
-          </p:cNvPr>
+          <p:cNvPr id="7" name="Slide Number Placeholder 6"/>
           <p:cNvSpPr>
             <a:spLocks noGrp="1"/>
           </p:cNvSpPr>
@@ -2734,7 +2770,7 @@
     </p:spTree>
     <p:extLst>
       <p:ext uri="{BB962C8B-B14F-4D97-AF65-F5344CB8AC3E}">
-        <p14:creationId xmlns:p14="http://schemas.microsoft.com/office/powerpoint/2010/main" val="3534418250"/>
+        <p14:creationId xmlns:p14="http://schemas.microsoft.com/office/powerpoint/2010/main" val="2853521639"/>
       </p:ext>
     </p:extLst>
   </p:cSld>
@@ -2768,31 +2804,65 @@
       </p:grpSpPr>
       <p:sp>
         <p:nvSpPr>
-          <p:cNvPr id="2" name="Title Placeholder 1">
-            <a:extLst>
-              <a:ext uri="{FF2B5EF4-FFF2-40B4-BE49-F238E27FC236}">
-                <a16:creationId xmlns:a16="http://schemas.microsoft.com/office/drawing/2014/main" id="{17D00705-0ACA-9408-01F9-51A4A4757D1E}"/>
-              </a:ext>
-            </a:extLst>
-          </p:cNvPr>
-          <p:cNvSpPr>
-            <a:spLocks noGrp="1"/>
-          </p:cNvSpPr>
-          <p:nvPr>
-            <p:ph type="title"/>
-          </p:nvPr>
+          <p:cNvPr id="7" name="Rectangle 6"/>
+          <p:cNvSpPr/>
+          <p:nvPr/>
         </p:nvSpPr>
         <p:spPr>
           <a:xfrm>
-            <a:off x="838200" y="365125"/>
-            <a:ext cx="10515600" cy="1325563"/>
+            <a:off x="11292840" y="0"/>
+            <a:ext cx="914400" cy="6858000"/>
+          </a:xfrm>
+          <a:prstGeom prst="rect">
+            <a:avLst/>
+          </a:prstGeom>
+          <a:solidFill>
+            <a:schemeClr val="tx2">
+              <a:lumMod val="75000"/>
+            </a:schemeClr>
+          </a:solidFill>
+          <a:ln>
+            <a:noFill/>
+          </a:ln>
+        </p:spPr>
+        <p:style>
+          <a:lnRef idx="2">
+            <a:schemeClr val="accent1">
+              <a:shade val="50000"/>
+            </a:schemeClr>
+          </a:lnRef>
+          <a:fillRef idx="1">
+            <a:schemeClr val="accent1"/>
+          </a:fillRef>
+          <a:effectRef idx="0">
+            <a:schemeClr val="accent1"/>
+          </a:effectRef>
+          <a:fontRef idx="minor">
+            <a:schemeClr val="lt1"/>
+          </a:fontRef>
+        </p:style>
+      </p:sp>
+      <p:sp>
+        <p:nvSpPr>
+          <p:cNvPr id="2" name="Title Placeholder 1"/>
+          <p:cNvSpPr>
+            <a:spLocks noGrp="1"/>
+          </p:cNvSpPr>
+          <p:nvPr>
+            <p:ph type="title"/>
+          </p:nvPr>
+        </p:nvSpPr>
+        <p:spPr>
+          <a:xfrm>
+            <a:off x="1261872" y="365760"/>
+            <a:ext cx="9692640" cy="1325562"/>
           </a:xfrm>
           <a:prstGeom prst="rect">
             <a:avLst/>
           </a:prstGeom>
         </p:spPr>
         <p:txBody>
-          <a:bodyPr vert="horz" lIns="91440" tIns="45720" rIns="91440" bIns="45720" rtlCol="0" anchor="ctr">
+          <a:bodyPr vert="horz" lIns="91440" tIns="45720" rIns="91440" bIns="45720" rtlCol="0" anchor="b">
             <a:normAutofit/>
           </a:bodyPr>
           <a:lstStyle/>
@@ -2801,18 +2871,13 @@
               <a:rPr lang="en-US"/>
               <a:t>Click to edit Master title style</a:t>
             </a:r>
-          </a:p>
-        </p:txBody>
-      </p:sp>
-      <p:sp>
-        <p:nvSpPr>
-          <p:cNvPr id="3" name="Text Placeholder 2">
-            <a:extLst>
-              <a:ext uri="{FF2B5EF4-FFF2-40B4-BE49-F238E27FC236}">
-                <a16:creationId xmlns:a16="http://schemas.microsoft.com/office/drawing/2014/main" id="{802A4844-BE41-CCA9-2FF6-647BA3AD4BC8}"/>
-              </a:ext>
-            </a:extLst>
-          </p:cNvPr>
+            <a:endParaRPr lang="en-US" dirty="0"/>
+          </a:p>
+        </p:txBody>
+      </p:sp>
+      <p:sp>
+        <p:nvSpPr>
+          <p:cNvPr id="3" name="Text Placeholder 2"/>
           <p:cNvSpPr>
             <a:spLocks noGrp="1"/>
           </p:cNvSpPr>
@@ -2822,8 +2887,8 @@
         </p:nvSpPr>
         <p:spPr>
           <a:xfrm>
-            <a:off x="838200" y="1825625"/>
-            <a:ext cx="10515600" cy="4351338"/>
+            <a:off x="1261872" y="1828800"/>
+            <a:ext cx="8595360" cy="4351337"/>
           </a:xfrm>
           <a:prstGeom prst="rect">
             <a:avLst/>
@@ -2868,18 +2933,13 @@
               <a:rPr lang="en-US"/>
               <a:t>Fifth level</a:t>
             </a:r>
-          </a:p>
-        </p:txBody>
-      </p:sp>
-      <p:sp>
-        <p:nvSpPr>
-          <p:cNvPr id="4" name="Date Placeholder 3">
-            <a:extLst>
-              <a:ext uri="{FF2B5EF4-FFF2-40B4-BE49-F238E27FC236}">
-                <a16:creationId xmlns:a16="http://schemas.microsoft.com/office/drawing/2014/main" id="{1EF97EB1-8540-2B4F-7494-F6C31A0399EC}"/>
-              </a:ext>
-            </a:extLst>
-          </p:cNvPr>
+            <a:endParaRPr lang="en-US" dirty="0"/>
+          </a:p>
+        </p:txBody>
+      </p:sp>
+      <p:sp>
+        <p:nvSpPr>
+          <p:cNvPr id="4" name="Date Placeholder 3"/>
           <p:cNvSpPr>
             <a:spLocks noGrp="1"/>
           </p:cNvSpPr>
@@ -2888,9 +2948,9 @@
           </p:nvPr>
         </p:nvSpPr>
         <p:spPr>
-          <a:xfrm>
-            <a:off x="838200" y="6356350"/>
-            <a:ext cx="2743200" cy="365125"/>
+          <a:xfrm rot="16200000">
+            <a:off x="10797542" y="998537"/>
+            <a:ext cx="1904999" cy="365125"/>
           </a:xfrm>
           <a:prstGeom prst="rect">
             <a:avLst/>
@@ -2899,11 +2959,12 @@
         <p:txBody>
           <a:bodyPr vert="horz" lIns="91440" tIns="45720" rIns="91440" bIns="45720" rtlCol="0" anchor="ctr"/>
           <a:lstStyle>
-            <a:lvl1pPr algn="l">
-              <a:defRPr sz="1200">
+            <a:lvl1pPr algn="r">
+              <a:defRPr sz="1050" b="0">
                 <a:solidFill>
-                  <a:schemeClr val="tx1">
-                    <a:tint val="75000"/>
+                  <a:schemeClr val="tx2">
+                    <a:lumMod val="20000"/>
+                    <a:lumOff val="80000"/>
                   </a:schemeClr>
                 </a:solidFill>
               </a:defRPr>
@@ -2912,7 +2973,7 @@
           <a:p>
             <a:fld id="{DC95CDE6-62DB-428F-99F2-652E4EED0446}" type="datetimeFigureOut">
               <a:rPr lang="en-US" smtClean="0"/>
-              <a:t>6/11/2025</a:t>
+              <a:t>6/12/2025</a:t>
             </a:fld>
             <a:endParaRPr lang="en-US"/>
           </a:p>
@@ -2920,13 +2981,7 @@
       </p:sp>
       <p:sp>
         <p:nvSpPr>
-          <p:cNvPr id="5" name="Footer Placeholder 4">
-            <a:extLst>
-              <a:ext uri="{FF2B5EF4-FFF2-40B4-BE49-F238E27FC236}">
-                <a16:creationId xmlns:a16="http://schemas.microsoft.com/office/drawing/2014/main" id="{A8709853-16F3-8D62-2B37-D519E1E1638E}"/>
-              </a:ext>
-            </a:extLst>
-          </p:cNvPr>
+          <p:cNvPr id="5" name="Footer Placeholder 4"/>
           <p:cNvSpPr>
             <a:spLocks noGrp="1"/>
           </p:cNvSpPr>
@@ -2935,9 +2990,9 @@
           </p:nvPr>
         </p:nvSpPr>
         <p:spPr>
-          <a:xfrm>
-            <a:off x="4038600" y="6356350"/>
-            <a:ext cx="4114800" cy="365125"/>
+          <a:xfrm rot="16200000">
+            <a:off x="9959341" y="4046537"/>
+            <a:ext cx="3581400" cy="365125"/>
           </a:xfrm>
           <a:prstGeom prst="rect">
             <a:avLst/>
@@ -2946,11 +3001,12 @@
         <p:txBody>
           <a:bodyPr vert="horz" lIns="91440" tIns="45720" rIns="91440" bIns="45720" rtlCol="0" anchor="ctr"/>
           <a:lstStyle>
-            <a:lvl1pPr algn="ctr">
-              <a:defRPr sz="1200">
+            <a:lvl1pPr algn="l">
+              <a:defRPr sz="1050">
                 <a:solidFill>
-                  <a:schemeClr val="tx1">
-                    <a:tint val="75000"/>
+                  <a:schemeClr val="tx2">
+                    <a:lumMod val="20000"/>
+                    <a:lumOff val="80000"/>
                   </a:schemeClr>
                 </a:solidFill>
               </a:defRPr>
@@ -2963,13 +3019,7 @@
       </p:sp>
       <p:sp>
         <p:nvSpPr>
-          <p:cNvPr id="6" name="Slide Number Placeholder 5">
-            <a:extLst>
-              <a:ext uri="{FF2B5EF4-FFF2-40B4-BE49-F238E27FC236}">
-                <a16:creationId xmlns:a16="http://schemas.microsoft.com/office/drawing/2014/main" id="{88518C14-C593-4C02-602F-559735DD3D82}"/>
-              </a:ext>
-            </a:extLst>
-          </p:cNvPr>
+          <p:cNvPr id="6" name="Slide Number Placeholder 5"/>
           <p:cNvSpPr>
             <a:spLocks noGrp="1"/>
           </p:cNvSpPr>
@@ -2979,21 +3029,24 @@
         </p:nvSpPr>
         <p:spPr>
           <a:xfrm>
-            <a:off x="8610600" y="6356350"/>
-            <a:ext cx="2743200" cy="365125"/>
+            <a:off x="11292840" y="6172200"/>
+            <a:ext cx="914400" cy="593725"/>
           </a:xfrm>
           <a:prstGeom prst="rect">
             <a:avLst/>
           </a:prstGeom>
         </p:spPr>
         <p:txBody>
-          <a:bodyPr vert="horz" lIns="91440" tIns="45720" rIns="91440" bIns="45720" rtlCol="0" anchor="ctr"/>
+          <a:bodyPr vert="horz" lIns="45720" tIns="45720" rIns="45720" bIns="45720" rtlCol="0" anchor="ctr">
+            <a:normAutofit/>
+          </a:bodyPr>
           <a:lstStyle>
-            <a:lvl1pPr algn="r">
-              <a:defRPr sz="1200">
+            <a:lvl1pPr algn="ctr">
+              <a:defRPr sz="3600">
                 <a:solidFill>
-                  <a:schemeClr val="tx1">
-                    <a:tint val="75000"/>
+                  <a:schemeClr val="tx2">
+                    <a:lumMod val="60000"/>
+                    <a:lumOff val="40000"/>
                   </a:schemeClr>
                 </a:solidFill>
               </a:defRPr>
@@ -3011,23 +3064,23 @@
     </p:spTree>
     <p:extLst>
       <p:ext uri="{BB962C8B-B14F-4D97-AF65-F5344CB8AC3E}">
-        <p14:creationId xmlns:p14="http://schemas.microsoft.com/office/powerpoint/2010/main" val="2824429804"/>
+        <p14:creationId xmlns:p14="http://schemas.microsoft.com/office/powerpoint/2010/main" val="1016710214"/>
       </p:ext>
     </p:extLst>
   </p:cSld>
   <p:clrMap bg1="lt1" tx1="dk1" bg2="lt2" tx2="dk2" accent1="accent1" accent2="accent2" accent3="accent3" accent4="accent4" accent5="accent5" accent6="accent6" hlink="hlink" folHlink="folHlink"/>
   <p:sldLayoutIdLst>
-    <p:sldLayoutId id="2147483649" r:id="rId1"/>
-    <p:sldLayoutId id="2147483650" r:id="rId2"/>
-    <p:sldLayoutId id="2147483651" r:id="rId3"/>
-    <p:sldLayoutId id="2147483652" r:id="rId4"/>
-    <p:sldLayoutId id="2147483653" r:id="rId5"/>
-    <p:sldLayoutId id="2147483654" r:id="rId6"/>
-    <p:sldLayoutId id="2147483655" r:id="rId7"/>
-    <p:sldLayoutId id="2147483656" r:id="rId8"/>
-    <p:sldLayoutId id="2147483657" r:id="rId9"/>
-    <p:sldLayoutId id="2147483658" r:id="rId10"/>
-    <p:sldLayoutId id="2147483659" r:id="rId11"/>
+    <p:sldLayoutId id="2147483691" r:id="rId1"/>
+    <p:sldLayoutId id="2147483692" r:id="rId2"/>
+    <p:sldLayoutId id="2147483693" r:id="rId3"/>
+    <p:sldLayoutId id="2147483694" r:id="rId4"/>
+    <p:sldLayoutId id="2147483695" r:id="rId5"/>
+    <p:sldLayoutId id="2147483696" r:id="rId6"/>
+    <p:sldLayoutId id="2147483697" r:id="rId7"/>
+    <p:sldLayoutId id="2147483698" r:id="rId8"/>
+    <p:sldLayoutId id="2147483699" r:id="rId9"/>
+    <p:sldLayoutId id="2147483700" r:id="rId10"/>
+    <p:sldLayoutId id="2147483701" r:id="rId11"/>
   </p:sldLayoutIdLst>
   <p:txStyles>
     <p:titleStyle>
@@ -3039,7 +3092,7 @@
           <a:spcPct val="0"/>
         </a:spcBef>
         <a:buNone/>
-        <a:defRPr sz="4400" kern="1200">
+        <a:defRPr sz="4400" kern="1200" spc="-50" baseline="0">
           <a:solidFill>
             <a:schemeClr val="tx1"/>
           </a:solidFill>
@@ -3050,16 +3103,23 @@
       </a:lvl1pPr>
     </p:titleStyle>
     <p:bodyStyle>
-      <a:lvl1pPr marL="228600" indent="-228600" algn="l" defTabSz="914400" rtl="0" eaLnBrk="1" latinLnBrk="0" hangingPunct="1">
+      <a:lvl1pPr marL="182880" indent="-182880" algn="l" defTabSz="914400" rtl="0" eaLnBrk="1" latinLnBrk="0" hangingPunct="1">
         <a:lnSpc>
-          <a:spcPct val="90000"/>
+          <a:spcPct val="95000"/>
         </a:lnSpc>
         <a:spcBef>
-          <a:spcPts val="1000"/>
+          <a:spcPts val="1400"/>
         </a:spcBef>
-        <a:buFont typeface="Arial" panose="020B0604020202020204" pitchFamily="34" charset="0"/>
+        <a:spcAft>
+          <a:spcPts val="200"/>
+        </a:spcAft>
+        <a:buClr>
+          <a:schemeClr val="accent1"/>
+        </a:buClr>
+        <a:buSzPct val="80000"/>
+        <a:buFont typeface="Arial" pitchFamily="34" charset="0"/>
         <a:buChar char="•"/>
-        <a:defRPr sz="2800" kern="1200">
+        <a:defRPr sz="1800" kern="1200" spc="10" baseline="0">
           <a:solidFill>
             <a:schemeClr val="tx1"/>
           </a:solidFill>
@@ -3068,144 +3128,216 @@
           <a:cs typeface="+mn-cs"/>
         </a:defRPr>
       </a:lvl1pPr>
-      <a:lvl2pPr marL="685800" indent="-228600" algn="l" defTabSz="914400" rtl="0" eaLnBrk="1" latinLnBrk="0" hangingPunct="1">
+      <a:lvl2pPr marL="457200" indent="-182880" algn="l" defTabSz="914400" rtl="0" eaLnBrk="1" latinLnBrk="0" hangingPunct="1">
         <a:lnSpc>
           <a:spcPct val="90000"/>
         </a:lnSpc>
         <a:spcBef>
-          <a:spcPts val="500"/>
+          <a:spcPts val="300"/>
         </a:spcBef>
-        <a:buFont typeface="Arial" panose="020B0604020202020204" pitchFamily="34" charset="0"/>
-        <a:buChar char="•"/>
-        <a:defRPr sz="2400" kern="1200">
+        <a:spcAft>
+          <a:spcPts val="300"/>
+        </a:spcAft>
+        <a:buClr>
+          <a:schemeClr val="accent1"/>
+        </a:buClr>
+        <a:buFont typeface="Wingdings 2" pitchFamily="18" charset="2"/>
+        <a:buChar char=""/>
+        <a:defRPr sz="1600" kern="1200">
           <a:solidFill>
-            <a:schemeClr val="tx1"/>
+            <a:schemeClr val="tx1">
+              <a:lumMod val="85000"/>
+              <a:lumOff val="15000"/>
+            </a:schemeClr>
           </a:solidFill>
           <a:latin typeface="+mn-lt"/>
           <a:ea typeface="+mn-ea"/>
           <a:cs typeface="+mn-cs"/>
         </a:defRPr>
       </a:lvl2pPr>
-      <a:lvl3pPr marL="1143000" indent="-228600" algn="l" defTabSz="914400" rtl="0" eaLnBrk="1" latinLnBrk="0" hangingPunct="1">
+      <a:lvl3pPr marL="731520" indent="-182880" algn="l" defTabSz="914400" rtl="0" eaLnBrk="1" latinLnBrk="0" hangingPunct="1">
         <a:lnSpc>
           <a:spcPct val="90000"/>
         </a:lnSpc>
         <a:spcBef>
-          <a:spcPts val="500"/>
+          <a:spcPts val="300"/>
         </a:spcBef>
-        <a:buFont typeface="Arial" panose="020B0604020202020204" pitchFamily="34" charset="0"/>
-        <a:buChar char="•"/>
-        <a:defRPr sz="2000" kern="1200">
+        <a:spcAft>
+          <a:spcPts val="300"/>
+        </a:spcAft>
+        <a:buClr>
+          <a:schemeClr val="accent1"/>
+        </a:buClr>
+        <a:buFont typeface="Wingdings 2" pitchFamily="18" charset="2"/>
+        <a:buChar char=""/>
+        <a:defRPr sz="1400" kern="1200">
           <a:solidFill>
-            <a:schemeClr val="tx1"/>
+            <a:schemeClr val="tx1">
+              <a:lumMod val="85000"/>
+              <a:lumOff val="15000"/>
+            </a:schemeClr>
           </a:solidFill>
           <a:latin typeface="+mn-lt"/>
           <a:ea typeface="+mn-ea"/>
           <a:cs typeface="+mn-cs"/>
         </a:defRPr>
       </a:lvl3pPr>
-      <a:lvl4pPr marL="1600200" indent="-228600" algn="l" defTabSz="914400" rtl="0" eaLnBrk="1" latinLnBrk="0" hangingPunct="1">
+      <a:lvl4pPr marL="1005840" indent="-182880" algn="l" defTabSz="914400" rtl="0" eaLnBrk="1" latinLnBrk="0" hangingPunct="1">
         <a:lnSpc>
           <a:spcPct val="90000"/>
         </a:lnSpc>
         <a:spcBef>
-          <a:spcPts val="500"/>
+          <a:spcPts val="300"/>
         </a:spcBef>
-        <a:buFont typeface="Arial" panose="020B0604020202020204" pitchFamily="34" charset="0"/>
-        <a:buChar char="•"/>
-        <a:defRPr sz="1800" kern="1200">
+        <a:spcAft>
+          <a:spcPts val="300"/>
+        </a:spcAft>
+        <a:buClr>
+          <a:schemeClr val="accent1"/>
+        </a:buClr>
+        <a:buFont typeface="Wingdings 2" pitchFamily="18" charset="2"/>
+        <a:buChar char=""/>
+        <a:defRPr sz="1400" kern="1200">
           <a:solidFill>
-            <a:schemeClr val="tx1"/>
+            <a:schemeClr val="tx1">
+              <a:lumMod val="85000"/>
+              <a:lumOff val="15000"/>
+            </a:schemeClr>
           </a:solidFill>
           <a:latin typeface="+mn-lt"/>
           <a:ea typeface="+mn-ea"/>
           <a:cs typeface="+mn-cs"/>
         </a:defRPr>
       </a:lvl4pPr>
-      <a:lvl5pPr marL="2057400" indent="-228600" algn="l" defTabSz="914400" rtl="0" eaLnBrk="1" latinLnBrk="0" hangingPunct="1">
+      <a:lvl5pPr marL="1280160" indent="-182880" algn="l" defTabSz="914400" rtl="0" eaLnBrk="1" latinLnBrk="0" hangingPunct="1">
         <a:lnSpc>
           <a:spcPct val="90000"/>
         </a:lnSpc>
         <a:spcBef>
-          <a:spcPts val="500"/>
+          <a:spcPts val="300"/>
         </a:spcBef>
-        <a:buFont typeface="Arial" panose="020B0604020202020204" pitchFamily="34" charset="0"/>
-        <a:buChar char="•"/>
-        <a:defRPr sz="1800" kern="1200">
+        <a:spcAft>
+          <a:spcPts val="300"/>
+        </a:spcAft>
+        <a:buClr>
+          <a:schemeClr val="accent1"/>
+        </a:buClr>
+        <a:buFont typeface="Wingdings 2" pitchFamily="18" charset="2"/>
+        <a:buChar char=""/>
+        <a:defRPr sz="1400" kern="1200">
           <a:solidFill>
-            <a:schemeClr val="tx1"/>
+            <a:schemeClr val="tx1">
+              <a:lumMod val="85000"/>
+              <a:lumOff val="15000"/>
+            </a:schemeClr>
           </a:solidFill>
           <a:latin typeface="+mn-lt"/>
           <a:ea typeface="+mn-ea"/>
           <a:cs typeface="+mn-cs"/>
         </a:defRPr>
       </a:lvl5pPr>
-      <a:lvl6pPr marL="2514600" indent="-228600" algn="l" defTabSz="914400" rtl="0" eaLnBrk="1" latinLnBrk="0" hangingPunct="1">
+      <a:lvl6pPr marL="1600000" indent="-228600" algn="l" defTabSz="914400" rtl="0" eaLnBrk="1" latinLnBrk="0" hangingPunct="1">
         <a:lnSpc>
           <a:spcPct val="90000"/>
         </a:lnSpc>
         <a:spcBef>
-          <a:spcPts val="500"/>
+          <a:spcPts val="300"/>
         </a:spcBef>
-        <a:buFont typeface="Arial" panose="020B0604020202020204" pitchFamily="34" charset="0"/>
-        <a:buChar char="•"/>
-        <a:defRPr sz="1800" kern="1200">
+        <a:spcAft>
+          <a:spcPts val="300"/>
+        </a:spcAft>
+        <a:buClr>
+          <a:schemeClr val="accent1"/>
+        </a:buClr>
+        <a:buFont typeface="Wingdings 2" pitchFamily="18" charset="2"/>
+        <a:buChar char=""/>
+        <a:defRPr sz="1400" kern="1200">
           <a:solidFill>
-            <a:schemeClr val="tx1"/>
+            <a:schemeClr val="tx1">
+              <a:lumMod val="85000"/>
+              <a:lumOff val="15000"/>
+            </a:schemeClr>
           </a:solidFill>
           <a:latin typeface="+mn-lt"/>
           <a:ea typeface="+mn-ea"/>
           <a:cs typeface="+mn-cs"/>
         </a:defRPr>
       </a:lvl6pPr>
-      <a:lvl7pPr marL="2971800" indent="-228600" algn="l" defTabSz="914400" rtl="0" eaLnBrk="1" latinLnBrk="0" hangingPunct="1">
+      <a:lvl7pPr marL="1900000" indent="-228600" algn="l" defTabSz="914400" rtl="0" eaLnBrk="1" latinLnBrk="0" hangingPunct="1">
         <a:lnSpc>
           <a:spcPct val="90000"/>
         </a:lnSpc>
         <a:spcBef>
-          <a:spcPts val="500"/>
+          <a:spcPts val="300"/>
         </a:spcBef>
-        <a:buFont typeface="Arial" panose="020B0604020202020204" pitchFamily="34" charset="0"/>
-        <a:buChar char="•"/>
-        <a:defRPr sz="1800" kern="1200">
+        <a:spcAft>
+          <a:spcPts val="300"/>
+        </a:spcAft>
+        <a:buClr>
+          <a:schemeClr val="accent1"/>
+        </a:buClr>
+        <a:buFont typeface="Wingdings 2" pitchFamily="18" charset="2"/>
+        <a:buChar char=""/>
+        <a:defRPr sz="1400" kern="1200">
           <a:solidFill>
-            <a:schemeClr val="tx1"/>
+            <a:schemeClr val="tx1">
+              <a:lumMod val="85000"/>
+              <a:lumOff val="15000"/>
+            </a:schemeClr>
           </a:solidFill>
           <a:latin typeface="+mn-lt"/>
           <a:ea typeface="+mn-ea"/>
           <a:cs typeface="+mn-cs"/>
         </a:defRPr>
       </a:lvl7pPr>
-      <a:lvl8pPr marL="3429000" indent="-228600" algn="l" defTabSz="914400" rtl="0" eaLnBrk="1" latinLnBrk="0" hangingPunct="1">
+      <a:lvl8pPr marL="2200000" indent="-228600" algn="l" defTabSz="914400" rtl="0" eaLnBrk="1" latinLnBrk="0" hangingPunct="1">
         <a:lnSpc>
           <a:spcPct val="90000"/>
         </a:lnSpc>
         <a:spcBef>
-          <a:spcPts val="500"/>
+          <a:spcPts val="300"/>
         </a:spcBef>
-        <a:buFont typeface="Arial" panose="020B0604020202020204" pitchFamily="34" charset="0"/>
-        <a:buChar char="•"/>
-        <a:defRPr sz="1800" kern="1200">
+        <a:spcAft>
+          <a:spcPts val="300"/>
+        </a:spcAft>
+        <a:buClr>
+          <a:schemeClr val="accent1"/>
+        </a:buClr>
+        <a:buFont typeface="Wingdings 2" pitchFamily="18" charset="2"/>
+        <a:buChar char=""/>
+        <a:defRPr sz="1400" kern="1200">
           <a:solidFill>
-            <a:schemeClr val="tx1"/>
+            <a:schemeClr val="tx1">
+              <a:lumMod val="85000"/>
+              <a:lumOff val="15000"/>
+            </a:schemeClr>
           </a:solidFill>
           <a:latin typeface="+mn-lt"/>
           <a:ea typeface="+mn-ea"/>
           <a:cs typeface="+mn-cs"/>
         </a:defRPr>
       </a:lvl8pPr>
-      <a:lvl9pPr marL="3886200" indent="-228600" algn="l" defTabSz="914400" rtl="0" eaLnBrk="1" latinLnBrk="0" hangingPunct="1">
+      <a:lvl9pPr marL="2500000" indent="-228600" algn="l" defTabSz="914400" rtl="0" eaLnBrk="1" latinLnBrk="0" hangingPunct="1">
         <a:lnSpc>
           <a:spcPct val="90000"/>
         </a:lnSpc>
         <a:spcBef>
-          <a:spcPts val="500"/>
+          <a:spcPts val="300"/>
         </a:spcBef>
-        <a:buFont typeface="Arial" panose="020B0604020202020204" pitchFamily="34" charset="0"/>
-        <a:buChar char="•"/>
-        <a:defRPr sz="1800" kern="1200">
+        <a:spcAft>
+          <a:spcPts val="300"/>
+        </a:spcAft>
+        <a:buClr>
+          <a:schemeClr val="accent1"/>
+        </a:buClr>
+        <a:buFont typeface="Wingdings 2" pitchFamily="18" charset="2"/>
+        <a:buChar char=""/>
+        <a:defRPr sz="1400" kern="1200">
           <a:solidFill>
-            <a:schemeClr val="tx1"/>
+            <a:schemeClr val="tx1">
+              <a:lumMod val="85000"/>
+              <a:lumOff val="15000"/>
+            </a:schemeClr>
           </a:solidFill>
           <a:latin typeface="+mn-lt"/>
           <a:ea typeface="+mn-ea"/>
@@ -3345,15 +3477,32 @@
             <p:ph type="ctrTitle"/>
           </p:nvPr>
         </p:nvSpPr>
-        <p:spPr/>
-        <p:txBody>
-          <a:bodyPr/>
-          <a:lstStyle/>
-          <a:p>
-            <a:r>
-              <a:rPr lang="en-US" b="1" dirty="0"/>
+        <p:spPr>
+          <a:xfrm>
+            <a:off x="870858" y="2487385"/>
+            <a:ext cx="11157857" cy="1883229"/>
+          </a:xfrm>
+        </p:spPr>
+        <p:txBody>
+          <a:bodyPr>
+            <a:normAutofit/>
+          </a:bodyPr>
+          <a:lstStyle/>
+          <a:p>
+            <a:r>
+              <a:rPr lang="en-US" sz="4000" b="1" dirty="0">
+                <a:latin typeface="+mn-lt"/>
+              </a:rPr>
               <a:t>Understanding Movie Performance Through Data</a:t>
             </a:r>
+            <a:br>
+              <a:rPr lang="en-US" sz="4000" b="1" dirty="0">
+                <a:latin typeface="+mn-lt"/>
+              </a:rPr>
+            </a:br>
+            <a:endParaRPr lang="en-US" sz="4000" b="1" dirty="0">
+              <a:latin typeface="+mn-lt"/>
+            </a:endParaRPr>
           </a:p>
         </p:txBody>
       </p:sp>
@@ -3401,8 +3550,8 @@
         </p:nvSpPr>
         <p:spPr>
           <a:xfrm>
-            <a:off x="1447799" y="940752"/>
-            <a:ext cx="9808029" cy="3693319"/>
+            <a:off x="370114" y="1621972"/>
+            <a:ext cx="11451771" cy="4801314"/>
           </a:xfrm>
           <a:prstGeom prst="rect">
             <a:avLst/>
@@ -3415,18 +3564,18 @@
           </a:bodyPr>
           <a:lstStyle/>
           <a:p>
-            <a:pPr>
-              <a:buNone/>
-            </a:pPr>
-            <a:r>
-              <a:rPr lang="en-US" b="1" dirty="0"/>
-              <a:t>Overview</a:t>
-            </a:r>
-          </a:p>
-          <a:p>
             <a:r>
               <a:rPr lang="en-US" dirty="0"/>
-              <a:t>This project explores the movie industry using data to understand what makes a movie successful in terms of profit and popularity. We used five different movie-related datasets to examine how production budgets, audience opinions, and critic reviews influence box office performance.</a:t>
+              <a:t>This project explores the movie industry using data to understand what makes a movie successful in terms of profit and popularity. </a:t>
+            </a:r>
+          </a:p>
+          <a:p>
+            <a:endParaRPr lang="en-US" dirty="0"/>
+          </a:p>
+          <a:p>
+            <a:r>
+              <a:rPr lang="en-US" dirty="0"/>
+              <a:t>I have used five different movie-related datasets to examine how production budgets, audience opinions, and critic reviews influence box office performance.</a:t>
             </a:r>
           </a:p>
           <a:p>
@@ -3445,24 +3594,56 @@
             </a:r>
           </a:p>
           <a:p>
+            <a:endParaRPr lang="en-US" dirty="0"/>
+          </a:p>
+          <a:p>
+            <a:pPr marL="285750" indent="-285750">
+              <a:buFont typeface="Arial" panose="020B0604020202020204" pitchFamily="34" charset="0"/>
+              <a:buChar char="•"/>
+            </a:pPr>
             <a:r>
               <a:rPr lang="en-US" dirty="0"/>
               <a:t>What kinds of movies make the most profit?</a:t>
             </a:r>
           </a:p>
           <a:p>
+            <a:pPr marL="285750" indent="-285750">
+              <a:buFont typeface="Arial" panose="020B0604020202020204" pitchFamily="34" charset="0"/>
+              <a:buChar char="•"/>
+            </a:pPr>
+            <a:endParaRPr lang="en-US" dirty="0"/>
+          </a:p>
+          <a:p>
+            <a:pPr marL="285750" indent="-285750">
+              <a:buFont typeface="Arial" panose="020B0604020202020204" pitchFamily="34" charset="0"/>
+              <a:buChar char="•"/>
+            </a:pPr>
             <a:r>
               <a:rPr lang="en-US" dirty="0"/>
               <a:t>How does a movie's budget relate to its financial return?</a:t>
             </a:r>
           </a:p>
           <a:p>
+            <a:pPr marL="285750" indent="-285750">
+              <a:buFont typeface="Arial" panose="020B0604020202020204" pitchFamily="34" charset="0"/>
+              <a:buChar char="•"/>
+            </a:pPr>
+            <a:endParaRPr lang="en-US" dirty="0"/>
+          </a:p>
+          <a:p>
+            <a:pPr marL="285750" indent="-285750">
+              <a:buFont typeface="Arial" panose="020B0604020202020204" pitchFamily="34" charset="0"/>
+              <a:buChar char="•"/>
+            </a:pPr>
             <a:r>
               <a:rPr lang="en-US" dirty="0"/>
               <a:t>Do audience and critic reviews impact a movie’s success?</a:t>
             </a:r>
           </a:p>
           <a:p>
+            <a:endParaRPr lang="en-US" dirty="0"/>
+          </a:p>
+          <a:p>
             <a:r>
               <a:rPr lang="en-US" dirty="0"/>
               <a:t>This analysis helps studios, investors, and marketing teams make better, data-driven decisions.</a:t>
@@ -3470,6 +3651,41 @@
           </a:p>
           <a:p>
             <a:endParaRPr lang="en-US" dirty="0"/>
+          </a:p>
+        </p:txBody>
+      </p:sp>
+      <p:sp>
+        <p:nvSpPr>
+          <p:cNvPr id="2" name="TextBox 1">
+            <a:extLst>
+              <a:ext uri="{FF2B5EF4-FFF2-40B4-BE49-F238E27FC236}">
+                <a16:creationId xmlns:a16="http://schemas.microsoft.com/office/drawing/2014/main" id="{3910123D-0E65-CDEA-0304-AC601219EF08}"/>
+              </a:ext>
+            </a:extLst>
+          </p:cNvPr>
+          <p:cNvSpPr txBox="1"/>
+          <p:nvPr/>
+        </p:nvSpPr>
+        <p:spPr>
+          <a:xfrm>
+            <a:off x="370114" y="707571"/>
+            <a:ext cx="5257800" cy="523220"/>
+          </a:xfrm>
+          <a:prstGeom prst="rect">
+            <a:avLst/>
+          </a:prstGeom>
+          <a:noFill/>
+        </p:spPr>
+        <p:txBody>
+          <a:bodyPr wrap="square" rtlCol="0">
+            <a:spAutoFit/>
+          </a:bodyPr>
+          <a:lstStyle/>
+          <a:p>
+            <a:r>
+              <a:rPr lang="en-US" sz="2800" b="1" dirty="0"/>
+              <a:t>Overview</a:t>
+            </a:r>
           </a:p>
         </p:txBody>
       </p:sp>
@@ -3517,8 +3733,8 @@
         </p:nvSpPr>
         <p:spPr>
           <a:xfrm>
-            <a:off x="1099457" y="1226815"/>
-            <a:ext cx="6096000" cy="3416320"/>
+            <a:off x="511628" y="1509844"/>
+            <a:ext cx="9144000" cy="4438074"/>
           </a:xfrm>
           <a:prstGeom prst="rect">
             <a:avLst/>
@@ -3531,18 +3747,22 @@
           </a:bodyPr>
           <a:lstStyle/>
           <a:p>
-            <a:r>
-              <a:rPr lang="en-US" b="1" dirty="0"/>
-              <a:t>Data Understanding</a:t>
-            </a:r>
-          </a:p>
-          <a:p>
+            <a:pPr>
+              <a:lnSpc>
+                <a:spcPct val="200000"/>
+              </a:lnSpc>
+            </a:pPr>
             <a:r>
               <a:rPr lang="en-US" dirty="0"/>
-              <a:t>We worked with five datasets, each providing different insights:</a:t>
-            </a:r>
-          </a:p>
-          <a:p>
+              <a:t>I have worked with five datasets, each providing different insights:</a:t>
+            </a:r>
+          </a:p>
+          <a:p>
+            <a:pPr>
+              <a:lnSpc>
+                <a:spcPct val="200000"/>
+              </a:lnSpc>
+            </a:pPr>
             <a:r>
               <a:rPr lang="en-US" b="1" dirty="0"/>
               <a:t>Box Office Data</a:t>
@@ -3553,6 +3773,11 @@
             </a:r>
           </a:p>
           <a:p>
+            <a:pPr>
+              <a:lnSpc>
+                <a:spcPct val="200000"/>
+              </a:lnSpc>
+            </a:pPr>
             <a:r>
               <a:rPr lang="en-US" b="1" dirty="0"/>
               <a:t>Movie Info</a:t>
@@ -3563,6 +3788,11 @@
             </a:r>
           </a:p>
           <a:p>
+            <a:pPr>
+              <a:lnSpc>
+                <a:spcPct val="200000"/>
+              </a:lnSpc>
+            </a:pPr>
             <a:r>
               <a:rPr lang="en-US" b="1" dirty="0"/>
               <a:t>Critic Reviews</a:t>
@@ -3573,6 +3803,11 @@
             </a:r>
           </a:p>
           <a:p>
+            <a:pPr>
+              <a:lnSpc>
+                <a:spcPct val="200000"/>
+              </a:lnSpc>
+            </a:pPr>
             <a:r>
               <a:rPr lang="en-US" b="1" dirty="0"/>
               <a:t>Audience Metrics</a:t>
@@ -3583,6 +3818,11 @@
             </a:r>
           </a:p>
           <a:p>
+            <a:pPr>
+              <a:lnSpc>
+                <a:spcPct val="200000"/>
+              </a:lnSpc>
+            </a:pPr>
             <a:r>
               <a:rPr lang="en-US" b="1" dirty="0"/>
               <a:t>Production Budgets</a:t>
@@ -3593,6 +3833,11 @@
             </a:r>
           </a:p>
           <a:p>
+            <a:pPr>
+              <a:lnSpc>
+                <a:spcPct val="200000"/>
+              </a:lnSpc>
+            </a:pPr>
             <a:r>
               <a:rPr lang="en-US" dirty="0"/>
               <a:t>We cleaned and merged these datasets to create one large view for analysis.</a:t>
@@ -3600,6 +3845,9 @@
           </a:p>
           <a:p>
             <a:pPr algn="l">
+              <a:lnSpc>
+                <a:spcPct val="200000"/>
+              </a:lnSpc>
               <a:spcAft>
                 <a:spcPts val="450"/>
               </a:spcAft>
@@ -3613,6 +3861,41 @@
               <a:effectLst/>
               <a:latin typeface="Lato Extended"/>
             </a:endParaRPr>
+          </a:p>
+        </p:txBody>
+      </p:sp>
+      <p:sp>
+        <p:nvSpPr>
+          <p:cNvPr id="2" name="TextBox 1">
+            <a:extLst>
+              <a:ext uri="{FF2B5EF4-FFF2-40B4-BE49-F238E27FC236}">
+                <a16:creationId xmlns:a16="http://schemas.microsoft.com/office/drawing/2014/main" id="{1800C86C-8992-AA3A-54D5-D059D2820F38}"/>
+              </a:ext>
+            </a:extLst>
+          </p:cNvPr>
+          <p:cNvSpPr txBox="1"/>
+          <p:nvPr/>
+        </p:nvSpPr>
+        <p:spPr>
+          <a:xfrm>
+            <a:off x="511628" y="457201"/>
+            <a:ext cx="5312229" cy="523220"/>
+          </a:xfrm>
+          <a:prstGeom prst="rect">
+            <a:avLst/>
+          </a:prstGeom>
+          <a:noFill/>
+        </p:spPr>
+        <p:txBody>
+          <a:bodyPr wrap="square" rtlCol="0">
+            <a:spAutoFit/>
+          </a:bodyPr>
+          <a:lstStyle/>
+          <a:p>
+            <a:r>
+              <a:rPr lang="en-US" sz="2800" b="1" dirty="0"/>
+              <a:t>Data Understanding</a:t>
+            </a:r>
           </a:p>
         </p:txBody>
       </p:sp>
@@ -3660,8 +3943,8 @@
         </p:nvSpPr>
         <p:spPr>
           <a:xfrm>
-            <a:off x="1143000" y="805885"/>
-            <a:ext cx="6096000" cy="4524315"/>
+            <a:off x="620485" y="1208656"/>
+            <a:ext cx="9971314" cy="4611199"/>
           </a:xfrm>
           <a:prstGeom prst="rect">
             <a:avLst/>
@@ -3674,18 +3957,22 @@
           </a:bodyPr>
           <a:lstStyle/>
           <a:p>
-            <a:r>
-              <a:rPr lang="en-US" b="1" dirty="0"/>
-              <a:t>Data Analysis</a:t>
-            </a:r>
-          </a:p>
-          <a:p>
+            <a:pPr>
+              <a:lnSpc>
+                <a:spcPct val="150000"/>
+              </a:lnSpc>
+            </a:pPr>
             <a:r>
               <a:rPr lang="en-US" dirty="0"/>
               <a:t>We focused on three main areas:</a:t>
             </a:r>
           </a:p>
           <a:p>
+            <a:pPr>
+              <a:lnSpc>
+                <a:spcPct val="150000"/>
+              </a:lnSpc>
+            </a:pPr>
             <a:r>
               <a:rPr lang="en-US" b="1" dirty="0"/>
               <a:t>Profitability</a:t>
@@ -3693,20 +3980,33 @@
             <a:endParaRPr lang="en-US" dirty="0"/>
           </a:p>
           <a:p>
-            <a:pPr lvl="1"/>
+            <a:pPr lvl="1">
+              <a:lnSpc>
+                <a:spcPct val="150000"/>
+              </a:lnSpc>
+            </a:pPr>
             <a:r>
               <a:rPr lang="en-US" dirty="0"/>
               <a:t>Identified the most profitable movies and genres.</a:t>
             </a:r>
           </a:p>
           <a:p>
-            <a:pPr lvl="1"/>
+            <a:pPr lvl="1">
+              <a:lnSpc>
+                <a:spcPct val="150000"/>
+              </a:lnSpc>
+            </a:pPr>
             <a:r>
               <a:rPr lang="en-US" dirty="0"/>
               <a:t>Found that some movies made huge profits even with modest budgets.</a:t>
             </a:r>
           </a:p>
           <a:p>
+            <a:pPr>
+              <a:lnSpc>
+                <a:spcPct val="150000"/>
+              </a:lnSpc>
+            </a:pPr>
             <a:r>
               <a:rPr lang="en-US" b="1" dirty="0"/>
               <a:t>Budget vs. Revenue</a:t>
@@ -3714,20 +4014,33 @@
             <a:endParaRPr lang="en-US" dirty="0"/>
           </a:p>
           <a:p>
-            <a:pPr lvl="1"/>
+            <a:pPr lvl="1">
+              <a:lnSpc>
+                <a:spcPct val="150000"/>
+              </a:lnSpc>
+            </a:pPr>
             <a:r>
               <a:rPr lang="en-US" dirty="0"/>
               <a:t>Generally, movies with bigger budgets earned more—but not always more profit.</a:t>
             </a:r>
           </a:p>
           <a:p>
-            <a:pPr lvl="1"/>
+            <a:pPr lvl="1">
+              <a:lnSpc>
+                <a:spcPct val="150000"/>
+              </a:lnSpc>
+            </a:pPr>
             <a:r>
               <a:rPr lang="en-US" dirty="0"/>
               <a:t>Some low-budget films performed surprisingly well.</a:t>
             </a:r>
           </a:p>
           <a:p>
+            <a:pPr>
+              <a:lnSpc>
+                <a:spcPct val="150000"/>
+              </a:lnSpc>
+            </a:pPr>
             <a:r>
               <a:rPr lang="en-US" b="1" dirty="0"/>
               <a:t>Audience &amp; Critic Impact</a:t>
@@ -3735,14 +4048,22 @@
             <a:endParaRPr lang="en-US" dirty="0"/>
           </a:p>
           <a:p>
-            <a:pPr lvl="1"/>
+            <a:pPr lvl="1">
+              <a:lnSpc>
+                <a:spcPct val="150000"/>
+              </a:lnSpc>
+            </a:pPr>
             <a:r>
               <a:rPr lang="en-US" dirty="0"/>
               <a:t>Movies with high audience ratings usually did better at the box office.</a:t>
             </a:r>
           </a:p>
           <a:p>
-            <a:pPr lvl="1"/>
+            <a:pPr lvl="1">
+              <a:lnSpc>
+                <a:spcPct val="150000"/>
+              </a:lnSpc>
+            </a:pPr>
             <a:r>
               <a:rPr lang="en-US" dirty="0"/>
               <a:t>Critics had some influence, but audience reviews had a stronger connection to success</a:t>
@@ -3750,6 +4071,9 @@
           </a:p>
           <a:p>
             <a:pPr algn="l">
+              <a:lnSpc>
+                <a:spcPct val="150000"/>
+              </a:lnSpc>
               <a:spcAft>
                 <a:spcPts val="450"/>
               </a:spcAft>
@@ -3763,6 +4087,41 @@
               <a:effectLst/>
               <a:latin typeface="Lato Extended"/>
             </a:endParaRPr>
+          </a:p>
+        </p:txBody>
+      </p:sp>
+      <p:sp>
+        <p:nvSpPr>
+          <p:cNvPr id="2" name="TextBox 1">
+            <a:extLst>
+              <a:ext uri="{FF2B5EF4-FFF2-40B4-BE49-F238E27FC236}">
+                <a16:creationId xmlns:a16="http://schemas.microsoft.com/office/drawing/2014/main" id="{8D91D259-79AF-BA52-AE7D-886A9EAB52DB}"/>
+              </a:ext>
+            </a:extLst>
+          </p:cNvPr>
+          <p:cNvSpPr txBox="1"/>
+          <p:nvPr/>
+        </p:nvSpPr>
+        <p:spPr>
+          <a:xfrm>
+            <a:off x="620485" y="282665"/>
+            <a:ext cx="5508172" cy="523220"/>
+          </a:xfrm>
+          <a:prstGeom prst="rect">
+            <a:avLst/>
+          </a:prstGeom>
+          <a:noFill/>
+        </p:spPr>
+        <p:txBody>
+          <a:bodyPr wrap="square" rtlCol="0">
+            <a:spAutoFit/>
+          </a:bodyPr>
+          <a:lstStyle/>
+          <a:p>
+            <a:r>
+              <a:rPr lang="en-US" sz="2800" b="1" dirty="0"/>
+              <a:t>Data Analysis</a:t>
+            </a:r>
           </a:p>
         </p:txBody>
       </p:sp>
@@ -3796,6 +4155,71 @@
           <a:chExt cx="0" cy="0"/>
         </a:xfrm>
       </p:grpSpPr>
+      <p:pic>
+        <p:nvPicPr>
+          <p:cNvPr id="3" name="Picture 2">
+            <a:extLst>
+              <a:ext uri="{FF2B5EF4-FFF2-40B4-BE49-F238E27FC236}">
+                <a16:creationId xmlns:a16="http://schemas.microsoft.com/office/drawing/2014/main" id="{3B11E88B-A15C-4C98-45D8-14F68B0823A4}"/>
+              </a:ext>
+            </a:extLst>
+          </p:cNvPr>
+          <p:cNvPicPr>
+            <a:picLocks noChangeAspect="1"/>
+          </p:cNvPicPr>
+          <p:nvPr/>
+        </p:nvPicPr>
+        <p:blipFill>
+          <a:blip r:embed="rId2"/>
+          <a:stretch>
+            <a:fillRect/>
+          </a:stretch>
+        </p:blipFill>
+        <p:spPr>
+          <a:xfrm>
+            <a:off x="87086" y="999300"/>
+            <a:ext cx="11136085" cy="5096699"/>
+          </a:xfrm>
+          <a:prstGeom prst="rect">
+            <a:avLst/>
+          </a:prstGeom>
+        </p:spPr>
+      </p:pic>
+      <p:sp>
+        <p:nvSpPr>
+          <p:cNvPr id="5" name="TextBox 4">
+            <a:extLst>
+              <a:ext uri="{FF2B5EF4-FFF2-40B4-BE49-F238E27FC236}">
+                <a16:creationId xmlns:a16="http://schemas.microsoft.com/office/drawing/2014/main" id="{1E244E60-BD82-18C4-8734-B7F8499B4C18}"/>
+              </a:ext>
+            </a:extLst>
+          </p:cNvPr>
+          <p:cNvSpPr txBox="1"/>
+          <p:nvPr/>
+        </p:nvSpPr>
+        <p:spPr>
+          <a:xfrm>
+            <a:off x="1153886" y="283029"/>
+            <a:ext cx="4027714" cy="369332"/>
+          </a:xfrm>
+          <a:prstGeom prst="rect">
+            <a:avLst/>
+          </a:prstGeom>
+          <a:noFill/>
+        </p:spPr>
+        <p:txBody>
+          <a:bodyPr wrap="square" rtlCol="0">
+            <a:spAutoFit/>
+          </a:bodyPr>
+          <a:lstStyle/>
+          <a:p>
+            <a:r>
+              <a:rPr lang="en-US" dirty="0"/>
+              <a:t>Data Visualization</a:t>
+            </a:r>
+          </a:p>
+        </p:txBody>
+      </p:sp>
     </p:spTree>
     <p:extLst>
       <p:ext uri="{BB962C8B-B14F-4D97-AF65-F5344CB8AC3E}">
@@ -3826,6 +4250,36 @@
           <a:chExt cx="0" cy="0"/>
         </a:xfrm>
       </p:grpSpPr>
+      <p:pic>
+        <p:nvPicPr>
+          <p:cNvPr id="3" name="Picture 2">
+            <a:extLst>
+              <a:ext uri="{FF2B5EF4-FFF2-40B4-BE49-F238E27FC236}">
+                <a16:creationId xmlns:a16="http://schemas.microsoft.com/office/drawing/2014/main" id="{FE1477FA-5778-EF1C-D02F-DD661678FEF7}"/>
+              </a:ext>
+            </a:extLst>
+          </p:cNvPr>
+          <p:cNvPicPr>
+            <a:picLocks noChangeAspect="1"/>
+          </p:cNvPicPr>
+          <p:nvPr/>
+        </p:nvPicPr>
+        <p:blipFill>
+          <a:blip r:embed="rId2"/>
+          <a:stretch>
+            <a:fillRect/>
+          </a:stretch>
+        </p:blipFill>
+        <p:spPr>
+          <a:xfrm>
+            <a:off x="283029" y="522514"/>
+            <a:ext cx="10776857" cy="5366657"/>
+          </a:xfrm>
+          <a:prstGeom prst="rect">
+            <a:avLst/>
+          </a:prstGeom>
+        </p:spPr>
+      </p:pic>
     </p:spTree>
     <p:extLst>
       <p:ext uri="{BB962C8B-B14F-4D97-AF65-F5344CB8AC3E}">
@@ -3856,6 +4310,36 @@
           <a:chExt cx="0" cy="0"/>
         </a:xfrm>
       </p:grpSpPr>
+      <p:pic>
+        <p:nvPicPr>
+          <p:cNvPr id="3" name="Picture 2">
+            <a:extLst>
+              <a:ext uri="{FF2B5EF4-FFF2-40B4-BE49-F238E27FC236}">
+                <a16:creationId xmlns:a16="http://schemas.microsoft.com/office/drawing/2014/main" id="{60902AF2-B3F2-4A20-D638-790866E92B07}"/>
+              </a:ext>
+            </a:extLst>
+          </p:cNvPr>
+          <p:cNvPicPr>
+            <a:picLocks noChangeAspect="1"/>
+          </p:cNvPicPr>
+          <p:nvPr/>
+        </p:nvPicPr>
+        <p:blipFill>
+          <a:blip r:embed="rId2"/>
+          <a:stretch>
+            <a:fillRect/>
+          </a:stretch>
+        </p:blipFill>
+        <p:spPr>
+          <a:xfrm>
+            <a:off x="0" y="555171"/>
+            <a:ext cx="11081657" cy="5682343"/>
+          </a:xfrm>
+          <a:prstGeom prst="rect">
+            <a:avLst/>
+          </a:prstGeom>
+        </p:spPr>
+      </p:pic>
     </p:spTree>
     <p:extLst>
       <p:ext uri="{BB962C8B-B14F-4D97-AF65-F5344CB8AC3E}">
@@ -3900,8 +4384,8 @@
         </p:nvSpPr>
         <p:spPr>
           <a:xfrm>
-            <a:off x="751114" y="577334"/>
-            <a:ext cx="11114315" cy="4247317"/>
+            <a:off x="315685" y="773591"/>
+            <a:ext cx="11114315" cy="5866350"/>
           </a:xfrm>
           <a:prstGeom prst="rect">
             <a:avLst/>
@@ -3914,18 +4398,24 @@
           </a:bodyPr>
           <a:lstStyle/>
           <a:p>
-            <a:r>
-              <a:rPr lang="en-US" b="1" dirty="0"/>
-              <a:t>Recommendations</a:t>
-            </a:r>
-          </a:p>
-          <a:p>
+            <a:pPr>
+              <a:lnSpc>
+                <a:spcPct val="150000"/>
+              </a:lnSpc>
+            </a:pPr>
             <a:r>
               <a:rPr lang="en-US" dirty="0"/>
               <a:t>Based on our findings, we suggest the following:</a:t>
             </a:r>
           </a:p>
           <a:p>
+            <a:pPr marL="285750" indent="-285750">
+              <a:lnSpc>
+                <a:spcPct val="150000"/>
+              </a:lnSpc>
+              <a:buFont typeface="Arial" panose="020B0604020202020204" pitchFamily="34" charset="0"/>
+              <a:buChar char="•"/>
+            </a:pPr>
             <a:r>
               <a:rPr lang="en-US" b="1" dirty="0"/>
               <a:t>Focus on High-Performing Genres</a:t>
@@ -3939,6 +4429,13 @@
             </a:r>
           </a:p>
           <a:p>
+            <a:pPr marL="285750" indent="-285750">
+              <a:lnSpc>
+                <a:spcPct val="150000"/>
+              </a:lnSpc>
+              <a:buFont typeface="Arial" panose="020B0604020202020204" pitchFamily="34" charset="0"/>
+              <a:buChar char="•"/>
+            </a:pPr>
             <a:r>
               <a:rPr lang="en-US" b="1" dirty="0"/>
               <a:t>Control Production Budgets</a:t>
@@ -3952,6 +4449,13 @@
             </a:r>
           </a:p>
           <a:p>
+            <a:pPr marL="285750" indent="-285750">
+              <a:lnSpc>
+                <a:spcPct val="150000"/>
+              </a:lnSpc>
+              <a:buFont typeface="Arial" panose="020B0604020202020204" pitchFamily="34" charset="0"/>
+              <a:buChar char="•"/>
+            </a:pPr>
             <a:r>
               <a:rPr lang="en-US" b="1" dirty="0"/>
               <a:t>Use Reviews Strategically</a:t>
@@ -3965,6 +4469,11 @@
             </a:r>
           </a:p>
           <a:p>
+            <a:pPr>
+              <a:lnSpc>
+                <a:spcPct val="150000"/>
+              </a:lnSpc>
+            </a:pPr>
             <a:r>
               <a:rPr lang="en-US" b="1" dirty="0"/>
               <a:t>Make Data-Driven Decisions</a:t>
@@ -3978,27 +4487,82 @@
             </a:r>
           </a:p>
           <a:p>
+            <a:pPr>
+              <a:lnSpc>
+                <a:spcPct val="150000"/>
+              </a:lnSpc>
+            </a:pPr>
             <a:r>
               <a:rPr lang="en-US" b="1" dirty="0"/>
               <a:t>Next Steps</a:t>
             </a:r>
           </a:p>
           <a:p>
+            <a:pPr>
+              <a:lnSpc>
+                <a:spcPct val="150000"/>
+              </a:lnSpc>
+            </a:pPr>
             <a:r>
               <a:rPr lang="en-US" dirty="0"/>
               <a:t>Incorporate streaming data to understand long-term success.</a:t>
             </a:r>
           </a:p>
           <a:p>
+            <a:pPr>
+              <a:lnSpc>
+                <a:spcPct val="150000"/>
+              </a:lnSpc>
+            </a:pPr>
             <a:r>
               <a:rPr lang="en-US" dirty="0"/>
               <a:t>Build interactive dashboards for ongoing business monitoring.</a:t>
             </a:r>
           </a:p>
           <a:p>
+            <a:pPr>
+              <a:lnSpc>
+                <a:spcPct val="150000"/>
+              </a:lnSpc>
+            </a:pPr>
             <a:r>
               <a:rPr lang="en-US" dirty="0"/>
               <a:t>Use machine learning to predict future movie success.</a:t>
+            </a:r>
+          </a:p>
+        </p:txBody>
+      </p:sp>
+      <p:sp>
+        <p:nvSpPr>
+          <p:cNvPr id="2" name="TextBox 1">
+            <a:extLst>
+              <a:ext uri="{FF2B5EF4-FFF2-40B4-BE49-F238E27FC236}">
+                <a16:creationId xmlns:a16="http://schemas.microsoft.com/office/drawing/2014/main" id="{409925E2-1610-069F-74CE-0497CCCB5B54}"/>
+              </a:ext>
+            </a:extLst>
+          </p:cNvPr>
+          <p:cNvSpPr txBox="1"/>
+          <p:nvPr/>
+        </p:nvSpPr>
+        <p:spPr>
+          <a:xfrm>
+            <a:off x="315685" y="141514"/>
+            <a:ext cx="5965372" cy="523220"/>
+          </a:xfrm>
+          <a:prstGeom prst="rect">
+            <a:avLst/>
+          </a:prstGeom>
+          <a:noFill/>
+        </p:spPr>
+        <p:txBody>
+          <a:bodyPr wrap="square" rtlCol="0">
+            <a:spAutoFit/>
+          </a:bodyPr>
+          <a:lstStyle/>
+          <a:p>
+            <a:r>
+              <a:rPr lang="en-US" sz="2800" b="1" dirty="0"/>
+              <a:t>Recommendations</a:t>
             </a:r>
           </a:p>
         </p:txBody>
@@ -4047,8 +4611,8 @@
         </p:nvSpPr>
         <p:spPr>
           <a:xfrm>
-            <a:off x="838200" y="763565"/>
-            <a:ext cx="10885714" cy="4524315"/>
+            <a:off x="185057" y="632937"/>
+            <a:ext cx="10885714" cy="5909310"/>
           </a:xfrm>
           <a:prstGeom prst="rect">
             <a:avLst/>
@@ -4067,10 +4631,15 @@
             </a:r>
           </a:p>
           <a:p>
+            <a:endParaRPr lang="en-US" b="1" dirty="0"/>
+          </a:p>
+          <a:p>
             <a:r>
               <a:rPr lang="en-US" b="1" dirty="0"/>
-              <a:t>"Based on the insights shared, what factors do you think studios should prioritize most when greenlighting new movie projects—budget, genre, or audience feedback?"</a:t>
-            </a:r>
+              <a:t>"Based on the insights shared, what factors do you think studios should prioritize most when greenlighting new movie projects—budget, genre, or audience feedback?“</a:t>
+            </a:r>
+          </a:p>
+          <a:p>
             <a:endParaRPr lang="en-US" dirty="0"/>
           </a:p>
           <a:p>
@@ -4110,7 +4679,7 @@
           <a:p>
             <a:r>
               <a:rPr lang="en-US" dirty="0"/>
-              <a:t>Thank you for your time. This project shows how using data can improve decisions in the movie business. We're excited about what comes next and how this can shape smarter film production strategies</a:t>
+              <a:t>Thank you for your time. This project shows how using data can improve decisions in the movie business. I am excited about what comes next and how this can shape smarter film production strategies</a:t>
             </a:r>
           </a:p>
           <a:p>
@@ -4118,12 +4687,24 @@
           </a:p>
           <a:p>
             <a:r>
+              <a:rPr lang="en-US" b="1" dirty="0"/>
+              <a:t>LinkedIn: </a:t>
+            </a:r>
+          </a:p>
+          <a:p>
+            <a:endParaRPr lang="en-US" dirty="0"/>
+          </a:p>
+          <a:p>
+            <a:r>
+              <a:rPr lang="en-US" dirty="0">
+                <a:hlinkClick r:id="rId2"/>
+              </a:rPr>
+              <a:t>https://www.linkedin.com/in/kelvin-shilisia-2b289b108/</a:t>
+            </a:r>
+            <a:r>
               <a:rPr lang="en-US" dirty="0"/>
-              <a:t>LinkedIn: </a:t>
-            </a:r>
-          </a:p>
-          <a:p>
-            <a:endParaRPr lang="en-US" dirty="0"/>
+              <a:t> </a:t>
+            </a:r>
           </a:p>
           <a:p>
             <a:endParaRPr lang="en-US" dirty="0"/>
@@ -4150,110 +4731,58 @@
 </file>
 
 <file path=ppt/theme/theme1.xml><?xml version="1.0" encoding="utf-8"?>
-<a:theme xmlns:a="http://schemas.openxmlformats.org/drawingml/2006/main" name="Office Theme">
+<a:theme xmlns:a="http://schemas.openxmlformats.org/drawingml/2006/main" name="View">
   <a:themeElements>
-    <a:clrScheme name="Office">
+    <a:clrScheme name="View">
       <a:dk1>
-        <a:sysClr val="windowText" lastClr="000000"/>
+        <a:srgbClr val="000000"/>
       </a:dk1>
       <a:lt1>
-        <a:sysClr val="window" lastClr="FFFFFF"/>
+        <a:srgbClr val="FFFFFF"/>
       </a:lt1>
       <a:dk2>
-        <a:srgbClr val="44546A"/>
+        <a:srgbClr val="46464A"/>
       </a:dk2>
       <a:lt2>
-        <a:srgbClr val="E7E6E6"/>
+        <a:srgbClr val="D6D3CC"/>
       </a:lt2>
       <a:accent1>
-        <a:srgbClr val="4472C4"/>
+        <a:srgbClr val="6F6F74"/>
       </a:accent1>
       <a:accent2>
-        <a:srgbClr val="ED7D31"/>
+        <a:srgbClr val="92A9B9"/>
       </a:accent2>
       <a:accent3>
-        <a:srgbClr val="A5A5A5"/>
+        <a:srgbClr val="A7B789"/>
       </a:accent3>
       <a:accent4>
-        <a:srgbClr val="FFC000"/>
+        <a:srgbClr val="B9A489"/>
       </a:accent4>
       <a:accent5>
-        <a:srgbClr val="5B9BD5"/>
+        <a:srgbClr val="8D6374"/>
       </a:accent5>
       <a:accent6>
-        <a:srgbClr val="70AD47"/>
+        <a:srgbClr val="9B7362"/>
       </a:accent6>
       <a:hlink>
-        <a:srgbClr val="0563C1"/>
+        <a:srgbClr val="67AABF"/>
       </a:hlink>
       <a:folHlink>
-        <a:srgbClr val="954F72"/>
+        <a:srgbClr val="ABAFA5"/>
       </a:folHlink>
     </a:clrScheme>
-    <a:fontScheme name="Office">
+    <a:fontScheme name="View">
       <a:majorFont>
-        <a:latin typeface="Calibri Light" panose="020F0302020204030204"/>
+        <a:latin typeface="Century Schoolbook" panose="02040604050505020304"/>
         <a:ea typeface=""/>
         <a:cs typeface=""/>
-        <a:font script="Jpan" typeface="游ゴシック Light"/>
+        <a:font script="Jpan" typeface="ＭＳ ゴシック"/>
         <a:font script="Hang" typeface="맑은 고딕"/>
-        <a:font script="Hans" typeface="等线 Light"/>
+        <a:font script="Hans" typeface="宋体"/>
         <a:font script="Hant" typeface="新細明體"/>
-        <a:font script="Arab" typeface="Times New Roman"/>
-        <a:font script="Hebr" typeface="Times New Roman"/>
-        <a:font script="Thai" typeface="Angsana New"/>
-        <a:font script="Ethi" typeface="Nyala"/>
-        <a:font script="Beng" typeface="Vrinda"/>
-        <a:font script="Gujr" typeface="Shruti"/>
-        <a:font script="Khmr" typeface="MoolBoran"/>
-        <a:font script="Knda" typeface="Tunga"/>
-        <a:font script="Guru" typeface="Raavi"/>
-        <a:font script="Cans" typeface="Euphemia"/>
-        <a:font script="Cher" typeface="Plantagenet Cherokee"/>
-        <a:font script="Yiii" typeface="Microsoft Yi Baiti"/>
-        <a:font script="Tibt" typeface="Microsoft Himalaya"/>
-        <a:font script="Thaa" typeface="MV Boli"/>
-        <a:font script="Deva" typeface="Mangal"/>
-        <a:font script="Telu" typeface="Gautami"/>
-        <a:font script="Taml" typeface="Latha"/>
-        <a:font script="Syrc" typeface="Estrangelo Edessa"/>
-        <a:font script="Orya" typeface="Kalinga"/>
-        <a:font script="Mlym" typeface="Kartika"/>
-        <a:font script="Laoo" typeface="DokChampa"/>
-        <a:font script="Sinh" typeface="Iskoola Pota"/>
-        <a:font script="Mong" typeface="Mongolian Baiti"/>
-        <a:font script="Viet" typeface="Times New Roman"/>
-        <a:font script="Uigh" typeface="Microsoft Uighur"/>
-        <a:font script="Geor" typeface="Sylfaen"/>
-        <a:font script="Armn" typeface="Arial"/>
-        <a:font script="Bugi" typeface="Leelawadee UI"/>
-        <a:font script="Bopo" typeface="Microsoft JhengHei"/>
-        <a:font script="Java" typeface="Javanese Text"/>
-        <a:font script="Lisu" typeface="Segoe UI"/>
-        <a:font script="Mymr" typeface="Myanmar Text"/>
-        <a:font script="Nkoo" typeface="Ebrima"/>
-        <a:font script="Olck" typeface="Nirmala UI"/>
-        <a:font script="Osma" typeface="Ebrima"/>
-        <a:font script="Phag" typeface="Phagspa"/>
-        <a:font script="Syrn" typeface="Estrangelo Edessa"/>
-        <a:font script="Syrj" typeface="Estrangelo Edessa"/>
-        <a:font script="Syre" typeface="Estrangelo Edessa"/>
-        <a:font script="Sora" typeface="Nirmala UI"/>
-        <a:font script="Tale" typeface="Microsoft Tai Le"/>
-        <a:font script="Talu" typeface="Microsoft New Tai Lue"/>
-        <a:font script="Tfng" typeface="Ebrima"/>
-      </a:majorFont>
-      <a:minorFont>
-        <a:latin typeface="Calibri" panose="020F0502020204030204"/>
-        <a:ea typeface=""/>
-        <a:cs typeface=""/>
-        <a:font script="Jpan" typeface="游ゴシック"/>
-        <a:font script="Hang" typeface="맑은 고딕"/>
-        <a:font script="Hans" typeface="等线"/>
-        <a:font script="Hant" typeface="新細明體"/>
-        <a:font script="Arab" typeface="Arial"/>
-        <a:font script="Hebr" typeface="Arial"/>
-        <a:font script="Thai" typeface="Cordia New"/>
+        <a:font script="Arab" typeface="Tahoma"/>
+        <a:font script="Hebr" typeface="Gisha"/>
+        <a:font script="Thai" typeface="DilleniaUPC"/>
         <a:font script="Ethi" typeface="Nyala"/>
         <a:font script="Beng" typeface="Vrinda"/>
         <a:font script="Gujr" typeface="Shruti"/>
@@ -4274,107 +4803,86 @@
         <a:font script="Laoo" typeface="DokChampa"/>
         <a:font script="Sinh" typeface="Iskoola Pota"/>
         <a:font script="Mong" typeface="Mongolian Baiti"/>
-        <a:font script="Viet" typeface="Arial"/>
+        <a:font script="Viet" typeface="Tahoma"/>
         <a:font script="Uigh" typeface="Microsoft Uighur"/>
         <a:font script="Geor" typeface="Sylfaen"/>
-        <a:font script="Armn" typeface="Arial"/>
-        <a:font script="Bugi" typeface="Leelawadee UI"/>
-        <a:font script="Bopo" typeface="Microsoft JhengHei"/>
-        <a:font script="Java" typeface="Javanese Text"/>
-        <a:font script="Lisu" typeface="Segoe UI"/>
-        <a:font script="Mymr" typeface="Myanmar Text"/>
-        <a:font script="Nkoo" typeface="Ebrima"/>
-        <a:font script="Olck" typeface="Nirmala UI"/>
-        <a:font script="Osma" typeface="Ebrima"/>
-        <a:font script="Phag" typeface="Phagspa"/>
-        <a:font script="Syrn" typeface="Estrangelo Edessa"/>
-        <a:font script="Syrj" typeface="Estrangelo Edessa"/>
-        <a:font script="Syre" typeface="Estrangelo Edessa"/>
-        <a:font script="Sora" typeface="Nirmala UI"/>
-        <a:font script="Tale" typeface="Microsoft Tai Le"/>
-        <a:font script="Talu" typeface="Microsoft New Tai Lue"/>
-        <a:font script="Tfng" typeface="Ebrima"/>
+      </a:majorFont>
+      <a:minorFont>
+        <a:latin typeface="Century Schoolbook" panose="02040604050505020304"/>
+        <a:ea typeface=""/>
+        <a:cs typeface=""/>
+        <a:font script="Jpan" typeface="ＭＳ ゴシック"/>
+        <a:font script="Hang" typeface="맑은 고딕"/>
+        <a:font script="Hans" typeface="宋体"/>
+        <a:font script="Hant" typeface="新細明體"/>
+        <a:font script="Arab" typeface="Tahoma"/>
+        <a:font script="Hebr" typeface="Gisha"/>
+        <a:font script="Thai" typeface="DilleniaUPC"/>
+        <a:font script="Ethi" typeface="Nyala"/>
+        <a:font script="Beng" typeface="Vrinda"/>
+        <a:font script="Gujr" typeface="Shruti"/>
+        <a:font script="Khmr" typeface="DaunPenh"/>
+        <a:font script="Knda" typeface="Tunga"/>
+        <a:font script="Guru" typeface="Raavi"/>
+        <a:font script="Cans" typeface="Euphemia"/>
+        <a:font script="Cher" typeface="Plantagenet Cherokee"/>
+        <a:font script="Yiii" typeface="Microsoft Yi Baiti"/>
+        <a:font script="Tibt" typeface="Microsoft Himalaya"/>
+        <a:font script="Thaa" typeface="MV Boli"/>
+        <a:font script="Deva" typeface="Mangal"/>
+        <a:font script="Telu" typeface="Gautami"/>
+        <a:font script="Taml" typeface="Latha"/>
+        <a:font script="Syrc" typeface="Estrangelo Edessa"/>
+        <a:font script="Orya" typeface="Kalinga"/>
+        <a:font script="Mlym" typeface="Kartika"/>
+        <a:font script="Laoo" typeface="DokChampa"/>
+        <a:font script="Sinh" typeface="Iskoola Pota"/>
+        <a:font script="Mong" typeface="Mongolian Baiti"/>
+        <a:font script="Viet" typeface="Verdana"/>
+        <a:font script="Uigh" typeface="Microsoft Uighur"/>
+        <a:font script="Geor" typeface="Sylfaen"/>
       </a:minorFont>
     </a:fontScheme>
-    <a:fmtScheme name="Office">
+    <a:fmtScheme name="View">
       <a:fillStyleLst>
         <a:solidFill>
           <a:schemeClr val="phClr"/>
         </a:solidFill>
-        <a:gradFill rotWithShape="1">
-          <a:gsLst>
-            <a:gs pos="0">
-              <a:schemeClr val="phClr">
-                <a:lumMod val="110000"/>
-                <a:satMod val="105000"/>
-                <a:tint val="67000"/>
-              </a:schemeClr>
-            </a:gs>
-            <a:gs pos="50000">
-              <a:schemeClr val="phClr">
-                <a:lumMod val="105000"/>
-                <a:satMod val="103000"/>
-                <a:tint val="73000"/>
-              </a:schemeClr>
-            </a:gs>
-            <a:gs pos="100000">
-              <a:schemeClr val="phClr">
-                <a:lumMod val="105000"/>
-                <a:satMod val="109000"/>
-                <a:tint val="81000"/>
-              </a:schemeClr>
-            </a:gs>
-          </a:gsLst>
-          <a:lin ang="5400000" scaled="0"/>
-        </a:gradFill>
-        <a:gradFill rotWithShape="1">
-          <a:gsLst>
-            <a:gs pos="0">
-              <a:schemeClr val="phClr">
-                <a:satMod val="103000"/>
-                <a:lumMod val="102000"/>
-                <a:tint val="94000"/>
-              </a:schemeClr>
-            </a:gs>
-            <a:gs pos="50000">
-              <a:schemeClr val="phClr">
-                <a:satMod val="110000"/>
-                <a:lumMod val="100000"/>
-                <a:shade val="100000"/>
-              </a:schemeClr>
-            </a:gs>
-            <a:gs pos="100000">
-              <a:schemeClr val="phClr">
-                <a:lumMod val="99000"/>
-                <a:satMod val="120000"/>
-                <a:shade val="78000"/>
-              </a:schemeClr>
-            </a:gs>
-          </a:gsLst>
-          <a:lin ang="5400000" scaled="0"/>
-        </a:gradFill>
+        <a:solidFill>
+          <a:schemeClr val="phClr">
+            <a:tint val="60000"/>
+            <a:satMod val="120000"/>
+          </a:schemeClr>
+        </a:solidFill>
+        <a:solidFill>
+          <a:schemeClr val="phClr">
+            <a:shade val="75000"/>
+            <a:satMod val="160000"/>
+          </a:schemeClr>
+        </a:solidFill>
       </a:fillStyleLst>
       <a:lnStyleLst>
-        <a:ln w="6350" cap="flat" cmpd="sng" algn="ctr">
+        <a:ln w="9525" cap="flat" cmpd="sng" algn="ctr">
           <a:solidFill>
             <a:schemeClr val="phClr"/>
           </a:solidFill>
           <a:prstDash val="solid"/>
-          <a:miter lim="800000"/>
         </a:ln>
-        <a:ln w="12700" cap="flat" cmpd="sng" algn="ctr">
+        <a:ln w="13970" cap="flat" cmpd="sng" algn="ctr">
           <a:solidFill>
             <a:schemeClr val="phClr"/>
           </a:solidFill>
           <a:prstDash val="solid"/>
-          <a:miter lim="800000"/>
         </a:ln>
-        <a:ln w="19050" cap="flat" cmpd="sng" algn="ctr">
+        <a:ln w="17145" cap="flat" cmpd="sng" algn="ctr">
           <a:solidFill>
-            <a:schemeClr val="phClr"/>
+            <a:schemeClr val="phClr">
+              <a:shade val="95000"/>
+              <a:alpha val="95000"/>
+              <a:satMod val="150000"/>
+            </a:schemeClr>
           </a:solidFill>
           <a:prstDash val="solid"/>
-          <a:miter lim="800000"/>
         </a:ln>
       </a:lnStyleLst>
       <a:effectStyleLst>
@@ -4382,16 +4890,52 @@
           <a:effectLst/>
         </a:effectStyle>
         <a:effectStyle>
-          <a:effectLst/>
+          <a:effectLst>
+            <a:outerShdw blurRad="50800" dist="15240" dir="5400000" algn="tl" rotWithShape="0">
+              <a:srgbClr val="000000">
+                <a:alpha val="75000"/>
+              </a:srgbClr>
+            </a:outerShdw>
+          </a:effectLst>
+          <a:scene3d>
+            <a:camera prst="orthographicFront">
+              <a:rot lat="0" lon="0" rev="0"/>
+            </a:camera>
+            <a:lightRig rig="brightRoom" dir="tl"/>
+          </a:scene3d>
+          <a:sp3d contourW="9525" prstMaterial="flat">
+            <a:bevelT w="0" h="0" prst="coolSlant"/>
+            <a:contourClr>
+              <a:schemeClr val="phClr">
+                <a:shade val="35000"/>
+                <a:satMod val="130000"/>
+              </a:schemeClr>
+            </a:contourClr>
+          </a:sp3d>
         </a:effectStyle>
         <a:effectStyle>
           <a:effectLst>
-            <a:outerShdw blurRad="57150" dist="19050" dir="5400000" algn="ctr" rotWithShape="0">
+            <a:outerShdw blurRad="76200" dist="25400" dir="5400000" algn="tl" rotWithShape="0">
               <a:srgbClr val="000000">
-                <a:alpha val="63000"/>
+                <a:alpha val="55000"/>
               </a:srgbClr>
             </a:outerShdw>
           </a:effectLst>
+          <a:scene3d>
+            <a:camera prst="orthographicFront">
+              <a:rot lat="0" lon="0" rev="0"/>
+            </a:camera>
+            <a:lightRig rig="brightRoom" dir="tl"/>
+          </a:scene3d>
+          <a:sp3d contourW="19050" prstMaterial="flat">
+            <a:bevelT w="0" h="0" prst="coolSlant"/>
+            <a:contourClr>
+              <a:schemeClr val="phClr">
+                <a:shade val="25000"/>
+                <a:satMod val="140000"/>
+              </a:schemeClr>
+            </a:contourClr>
+          </a:sp3d>
         </a:effectStyle>
       </a:effectStyleLst>
       <a:bgFillStyleLst>
@@ -4408,28 +4952,23 @@
           <a:gsLst>
             <a:gs pos="0">
               <a:schemeClr val="phClr">
-                <a:tint val="93000"/>
-                <a:satMod val="150000"/>
+                <a:tint val="94000"/>
                 <a:shade val="98000"/>
+                <a:satMod val="130000"/>
                 <a:lumMod val="102000"/>
-              </a:schemeClr>
-            </a:gs>
-            <a:gs pos="50000">
-              <a:schemeClr val="phClr">
-                <a:tint val="98000"/>
-                <a:satMod val="130000"/>
-                <a:shade val="90000"/>
-                <a:lumMod val="103000"/>
               </a:schemeClr>
             </a:gs>
             <a:gs pos="100000">
               <a:schemeClr val="phClr">
-                <a:shade val="63000"/>
-                <a:satMod val="120000"/>
+                <a:tint val="98000"/>
+                <a:shade val="78000"/>
+                <a:satMod val="140000"/>
               </a:schemeClr>
             </a:gs>
           </a:gsLst>
-          <a:lin ang="5400000" scaled="0"/>
+          <a:path path="circle">
+            <a:fillToRect l="100000" t="100000" r="100000" b="100000"/>
+          </a:path>
         </a:gradFill>
       </a:bgFillStyleLst>
     </a:fmtScheme>
@@ -4438,7 +4977,7 @@
   <a:extraClrSchemeLst/>
   <a:extLst>
     <a:ext uri="{05A4C25C-085E-4340-85A3-A5531E510DB2}">
-      <thm15:themeFamily xmlns:thm15="http://schemas.microsoft.com/office/thememl/2012/main" name="Office Theme" id="{62F939B6-93AF-4DB8-9C6B-D6C7DFDC589F}" vid="{4A3C46E8-61CC-4603-A589-7422A47A8E4A}"/>
+      <thm15:themeFamily xmlns:thm15="http://schemas.microsoft.com/office/thememl/2012/main" name="View" id="{BA0EB5A6-F2D4-4F82-977B-64ADEE4A2A69}" vid="{3969A8A2-35DB-4E3B-8885-16FD20568674}"/>
     </a:ext>
   </a:extLst>
 </a:theme>

</xml_diff>